<commit_message>
Change the pom version form 2.0-SNAPSHOT to 2.0
</commit_message>
<xml_diff>
--- a/docs/Pathlet 设计简介.pptx
+++ b/docs/Pathlet 设计简介.pptx
@@ -3956,22 +3956,6 @@
     <dgm:pt modelId="{07B34F24-4F77-459F-824D-A67101850569}" type="pres">
       <dgm:prSet presAssocID="{D73918FA-C5C0-4D13-A09D-522A5ED06D3F}" presName="conn2-1" presStyleLbl="parChTrans1D3" presStyleIdx="2" presStyleCnt="6"/>
       <dgm:spPr/>
-    </dgm:pt>
-    <dgm:pt modelId="{C1E9E8A3-6F29-40EE-B281-02C9A1A75369}" type="pres">
-      <dgm:prSet presAssocID="{D73918FA-C5C0-4D13-A09D-522A5ED06D3F}" presName="connTx" presStyleLbl="parChTrans1D3" presStyleIdx="2" presStyleCnt="6"/>
-      <dgm:spPr/>
-    </dgm:pt>
-    <dgm:pt modelId="{A63F70E1-5F65-4886-9BAD-0138833B5389}" type="pres">
-      <dgm:prSet presAssocID="{07538976-0F4C-4342-8FDC-E82C1EA58CD6}" presName="root2" presStyleCnt="0"/>
-      <dgm:spPr/>
-    </dgm:pt>
-    <dgm:pt modelId="{10ECFEB4-C144-4CAB-9EAA-BC4EBBF42578}" type="pres">
-      <dgm:prSet presAssocID="{07538976-0F4C-4342-8FDC-E82C1EA58CD6}" presName="LevelTwoTextNode" presStyleLbl="node3" presStyleIdx="2" presStyleCnt="6" custScaleX="172437">
-        <dgm:presLayoutVars>
-          <dgm:chPref val="3"/>
-        </dgm:presLayoutVars>
-      </dgm:prSet>
-      <dgm:spPr/>
       <dgm:t>
         <a:bodyPr/>
         <a:lstStyle/>
@@ -3980,12 +3964,8 @@
         </a:p>
       </dgm:t>
     </dgm:pt>
-    <dgm:pt modelId="{0519FD58-CA0D-4836-9947-99E3B91AF56E}" type="pres">
-      <dgm:prSet presAssocID="{07538976-0F4C-4342-8FDC-E82C1EA58CD6}" presName="level3hierChild" presStyleCnt="0"/>
-      <dgm:spPr/>
-    </dgm:pt>
-    <dgm:pt modelId="{DBD412D3-9BE5-4901-90F2-6166781ACA75}" type="pres">
-      <dgm:prSet presAssocID="{F966C9A1-62A7-4A58-8732-563828EEE4FB}" presName="conn2-1" presStyleLbl="parChTrans1D3" presStyleIdx="3" presStyleCnt="6"/>
+    <dgm:pt modelId="{C1E9E8A3-6F29-40EE-B281-02C9A1A75369}" type="pres">
+      <dgm:prSet presAssocID="{D73918FA-C5C0-4D13-A09D-522A5ED06D3F}" presName="connTx" presStyleLbl="parChTrans1D3" presStyleIdx="2" presStyleCnt="6"/>
       <dgm:spPr/>
       <dgm:t>
         <a:bodyPr/>
@@ -3995,8 +3975,16 @@
         </a:p>
       </dgm:t>
     </dgm:pt>
-    <dgm:pt modelId="{AB121646-9C72-4176-A1C1-268325446FEB}" type="pres">
-      <dgm:prSet presAssocID="{F966C9A1-62A7-4A58-8732-563828EEE4FB}" presName="connTx" presStyleLbl="parChTrans1D3" presStyleIdx="3" presStyleCnt="6"/>
+    <dgm:pt modelId="{A63F70E1-5F65-4886-9BAD-0138833B5389}" type="pres">
+      <dgm:prSet presAssocID="{07538976-0F4C-4342-8FDC-E82C1EA58CD6}" presName="root2" presStyleCnt="0"/>
+      <dgm:spPr/>
+    </dgm:pt>
+    <dgm:pt modelId="{10ECFEB4-C144-4CAB-9EAA-BC4EBBF42578}" type="pres">
+      <dgm:prSet presAssocID="{07538976-0F4C-4342-8FDC-E82C1EA58CD6}" presName="LevelTwoTextNode" presStyleLbl="node3" presStyleIdx="2" presStyleCnt="6" custScaleX="172437">
+        <dgm:presLayoutVars>
+          <dgm:chPref val="3"/>
+        </dgm:presLayoutVars>
+      </dgm:prSet>
       <dgm:spPr/>
       <dgm:t>
         <a:bodyPr/>
@@ -4006,16 +3994,12 @@
         </a:p>
       </dgm:t>
     </dgm:pt>
-    <dgm:pt modelId="{6DC23157-7C4F-40FA-BE72-ADB39526BB21}" type="pres">
-      <dgm:prSet presAssocID="{C81824DD-00B7-45A8-8A5E-C9804F69D54E}" presName="root2" presStyleCnt="0"/>
-      <dgm:spPr/>
-    </dgm:pt>
-    <dgm:pt modelId="{715A27A3-2D4D-44C1-A35C-E3E0B3EAFBA1}" type="pres">
-      <dgm:prSet presAssocID="{C81824DD-00B7-45A8-8A5E-C9804F69D54E}" presName="LevelTwoTextNode" presStyleLbl="node3" presStyleIdx="3" presStyleCnt="6" custScaleX="172437">
-        <dgm:presLayoutVars>
-          <dgm:chPref val="3"/>
-        </dgm:presLayoutVars>
-      </dgm:prSet>
+    <dgm:pt modelId="{0519FD58-CA0D-4836-9947-99E3B91AF56E}" type="pres">
+      <dgm:prSet presAssocID="{07538976-0F4C-4342-8FDC-E82C1EA58CD6}" presName="level3hierChild" presStyleCnt="0"/>
+      <dgm:spPr/>
+    </dgm:pt>
+    <dgm:pt modelId="{DBD412D3-9BE5-4901-90F2-6166781ACA75}" type="pres">
+      <dgm:prSet presAssocID="{F966C9A1-62A7-4A58-8732-563828EEE4FB}" presName="conn2-1" presStyleLbl="parChTrans1D3" presStyleIdx="3" presStyleCnt="6"/>
       <dgm:spPr/>
       <dgm:t>
         <a:bodyPr/>
@@ -4025,12 +4009,8 @@
         </a:p>
       </dgm:t>
     </dgm:pt>
-    <dgm:pt modelId="{363AFA6E-4706-4E91-908F-87541BD34F54}" type="pres">
-      <dgm:prSet presAssocID="{C81824DD-00B7-45A8-8A5E-C9804F69D54E}" presName="level3hierChild" presStyleCnt="0"/>
-      <dgm:spPr/>
-    </dgm:pt>
-    <dgm:pt modelId="{CAE939C1-1F50-4515-A49C-BE8A483860C0}" type="pres">
-      <dgm:prSet presAssocID="{57025AFD-65C0-4565-AF79-783C08BE301B}" presName="conn2-1" presStyleLbl="parChTrans1D2" presStyleIdx="2" presStyleCnt="3"/>
+    <dgm:pt modelId="{AB121646-9C72-4176-A1C1-268325446FEB}" type="pres">
+      <dgm:prSet presAssocID="{F966C9A1-62A7-4A58-8732-563828EEE4FB}" presName="connTx" presStyleLbl="parChTrans1D3" presStyleIdx="3" presStyleCnt="6"/>
       <dgm:spPr/>
       <dgm:t>
         <a:bodyPr/>
@@ -4040,8 +4020,16 @@
         </a:p>
       </dgm:t>
     </dgm:pt>
-    <dgm:pt modelId="{AD4680DC-87B7-4418-BBEA-CD49D54C154D}" type="pres">
-      <dgm:prSet presAssocID="{57025AFD-65C0-4565-AF79-783C08BE301B}" presName="connTx" presStyleLbl="parChTrans1D2" presStyleIdx="2" presStyleCnt="3"/>
+    <dgm:pt modelId="{6DC23157-7C4F-40FA-BE72-ADB39526BB21}" type="pres">
+      <dgm:prSet presAssocID="{C81824DD-00B7-45A8-8A5E-C9804F69D54E}" presName="root2" presStyleCnt="0"/>
+      <dgm:spPr/>
+    </dgm:pt>
+    <dgm:pt modelId="{715A27A3-2D4D-44C1-A35C-E3E0B3EAFBA1}" type="pres">
+      <dgm:prSet presAssocID="{C81824DD-00B7-45A8-8A5E-C9804F69D54E}" presName="LevelTwoTextNode" presStyleLbl="node3" presStyleIdx="3" presStyleCnt="6" custScaleX="172437">
+        <dgm:presLayoutVars>
+          <dgm:chPref val="3"/>
+        </dgm:presLayoutVars>
+      </dgm:prSet>
       <dgm:spPr/>
       <dgm:t>
         <a:bodyPr/>
@@ -4051,16 +4039,12 @@
         </a:p>
       </dgm:t>
     </dgm:pt>
-    <dgm:pt modelId="{FEFACFE4-D717-4668-984E-3CC7071EB59E}" type="pres">
-      <dgm:prSet presAssocID="{A4A34430-1123-4E18-82C9-0859361AB1B4}" presName="root2" presStyleCnt="0"/>
-      <dgm:spPr/>
-    </dgm:pt>
-    <dgm:pt modelId="{97EAAE34-D75B-4BCD-9034-FA9ED5400BAF}" type="pres">
-      <dgm:prSet presAssocID="{A4A34430-1123-4E18-82C9-0859361AB1B4}" presName="LevelTwoTextNode" presStyleLbl="node2" presStyleIdx="2" presStyleCnt="3">
-        <dgm:presLayoutVars>
-          <dgm:chPref val="3"/>
-        </dgm:presLayoutVars>
-      </dgm:prSet>
+    <dgm:pt modelId="{363AFA6E-4706-4E91-908F-87541BD34F54}" type="pres">
+      <dgm:prSet presAssocID="{C81824DD-00B7-45A8-8A5E-C9804F69D54E}" presName="level3hierChild" presStyleCnt="0"/>
+      <dgm:spPr/>
+    </dgm:pt>
+    <dgm:pt modelId="{CAE939C1-1F50-4515-A49C-BE8A483860C0}" type="pres">
+      <dgm:prSet presAssocID="{57025AFD-65C0-4565-AF79-783C08BE301B}" presName="conn2-1" presStyleLbl="parChTrans1D2" presStyleIdx="2" presStyleCnt="3"/>
       <dgm:spPr/>
       <dgm:t>
         <a:bodyPr/>
@@ -4070,12 +4054,8 @@
         </a:p>
       </dgm:t>
     </dgm:pt>
-    <dgm:pt modelId="{CCF20893-7223-4519-AF8E-5014751F4B33}" type="pres">
-      <dgm:prSet presAssocID="{A4A34430-1123-4E18-82C9-0859361AB1B4}" presName="level3hierChild" presStyleCnt="0"/>
-      <dgm:spPr/>
-    </dgm:pt>
-    <dgm:pt modelId="{F6653A6B-87D2-4462-A330-757DF79CBEF2}" type="pres">
-      <dgm:prSet presAssocID="{9D3E5DB5-2BCD-4C1E-847C-B490A9F597D4}" presName="conn2-1" presStyleLbl="parChTrans1D3" presStyleIdx="4" presStyleCnt="6"/>
+    <dgm:pt modelId="{AD4680DC-87B7-4418-BBEA-CD49D54C154D}" type="pres">
+      <dgm:prSet presAssocID="{57025AFD-65C0-4565-AF79-783C08BE301B}" presName="connTx" presStyleLbl="parChTrans1D2" presStyleIdx="2" presStyleCnt="3"/>
       <dgm:spPr/>
       <dgm:t>
         <a:bodyPr/>
@@ -4085,8 +4065,16 @@
         </a:p>
       </dgm:t>
     </dgm:pt>
-    <dgm:pt modelId="{E377C5A3-0480-4D61-AE6C-8F073734A85C}" type="pres">
-      <dgm:prSet presAssocID="{9D3E5DB5-2BCD-4C1E-847C-B490A9F597D4}" presName="connTx" presStyleLbl="parChTrans1D3" presStyleIdx="4" presStyleCnt="6"/>
+    <dgm:pt modelId="{FEFACFE4-D717-4668-984E-3CC7071EB59E}" type="pres">
+      <dgm:prSet presAssocID="{A4A34430-1123-4E18-82C9-0859361AB1B4}" presName="root2" presStyleCnt="0"/>
+      <dgm:spPr/>
+    </dgm:pt>
+    <dgm:pt modelId="{97EAAE34-D75B-4BCD-9034-FA9ED5400BAF}" type="pres">
+      <dgm:prSet presAssocID="{A4A34430-1123-4E18-82C9-0859361AB1B4}" presName="LevelTwoTextNode" presStyleLbl="node2" presStyleIdx="2" presStyleCnt="3">
+        <dgm:presLayoutVars>
+          <dgm:chPref val="3"/>
+        </dgm:presLayoutVars>
+      </dgm:prSet>
       <dgm:spPr/>
       <dgm:t>
         <a:bodyPr/>
@@ -4096,16 +4084,12 @@
         </a:p>
       </dgm:t>
     </dgm:pt>
-    <dgm:pt modelId="{E811CCC9-CF04-4A3F-94E4-E9814EADC9DF}" type="pres">
-      <dgm:prSet presAssocID="{3CF8B261-7FB1-4211-AA20-6C87722C7D49}" presName="root2" presStyleCnt="0"/>
-      <dgm:spPr/>
-    </dgm:pt>
-    <dgm:pt modelId="{0A821ACB-079C-4AA8-8E64-04069F8B38CC}" type="pres">
-      <dgm:prSet presAssocID="{3CF8B261-7FB1-4211-AA20-6C87722C7D49}" presName="LevelTwoTextNode" presStyleLbl="node3" presStyleIdx="4" presStyleCnt="6" custScaleX="172437">
-        <dgm:presLayoutVars>
-          <dgm:chPref val="3"/>
-        </dgm:presLayoutVars>
-      </dgm:prSet>
+    <dgm:pt modelId="{CCF20893-7223-4519-AF8E-5014751F4B33}" type="pres">
+      <dgm:prSet presAssocID="{A4A34430-1123-4E18-82C9-0859361AB1B4}" presName="level3hierChild" presStyleCnt="0"/>
+      <dgm:spPr/>
+    </dgm:pt>
+    <dgm:pt modelId="{F6653A6B-87D2-4462-A330-757DF79CBEF2}" type="pres">
+      <dgm:prSet presAssocID="{9D3E5DB5-2BCD-4C1E-847C-B490A9F597D4}" presName="conn2-1" presStyleLbl="parChTrans1D3" presStyleIdx="4" presStyleCnt="6"/>
       <dgm:spPr/>
       <dgm:t>
         <a:bodyPr/>
@@ -4115,28 +4099,8 @@
         </a:p>
       </dgm:t>
     </dgm:pt>
-    <dgm:pt modelId="{D5EA6EB1-D143-49FC-8E3A-EF56E38B1164}" type="pres">
-      <dgm:prSet presAssocID="{3CF8B261-7FB1-4211-AA20-6C87722C7D49}" presName="level3hierChild" presStyleCnt="0"/>
-      <dgm:spPr/>
-    </dgm:pt>
-    <dgm:pt modelId="{AE08BE88-CE48-4984-96E9-DE27D8EC102B}" type="pres">
-      <dgm:prSet presAssocID="{865F1611-AEAB-47D5-B811-56C2588A38A5}" presName="conn2-1" presStyleLbl="parChTrans1D3" presStyleIdx="5" presStyleCnt="6"/>
-      <dgm:spPr/>
-    </dgm:pt>
-    <dgm:pt modelId="{87BDA03F-0015-4903-98B8-148EC667ACD1}" type="pres">
-      <dgm:prSet presAssocID="{865F1611-AEAB-47D5-B811-56C2588A38A5}" presName="connTx" presStyleLbl="parChTrans1D3" presStyleIdx="5" presStyleCnt="6"/>
-      <dgm:spPr/>
-    </dgm:pt>
-    <dgm:pt modelId="{64D003E1-04DD-4E97-9362-4E8111721161}" type="pres">
-      <dgm:prSet presAssocID="{9DAEE240-5485-48EF-A63D-83B00D883463}" presName="root2" presStyleCnt="0"/>
-      <dgm:spPr/>
-    </dgm:pt>
-    <dgm:pt modelId="{7AB66274-8C64-45FC-A7B1-664ACD7E105B}" type="pres">
-      <dgm:prSet presAssocID="{9DAEE240-5485-48EF-A63D-83B00D883463}" presName="LevelTwoTextNode" presStyleLbl="node3" presStyleIdx="5" presStyleCnt="6" custScaleX="172437">
-        <dgm:presLayoutVars>
-          <dgm:chPref val="3"/>
-        </dgm:presLayoutVars>
-      </dgm:prSet>
+    <dgm:pt modelId="{E377C5A3-0480-4D61-AE6C-8F073734A85C}" type="pres">
+      <dgm:prSet presAssocID="{9D3E5DB5-2BCD-4C1E-847C-B490A9F597D4}" presName="connTx" presStyleLbl="parChTrans1D3" presStyleIdx="4" presStyleCnt="6"/>
       <dgm:spPr/>
       <dgm:t>
         <a:bodyPr/>
@@ -4146,51 +4110,115 @@
         </a:p>
       </dgm:t>
     </dgm:pt>
+    <dgm:pt modelId="{E811CCC9-CF04-4A3F-94E4-E9814EADC9DF}" type="pres">
+      <dgm:prSet presAssocID="{3CF8B261-7FB1-4211-AA20-6C87722C7D49}" presName="root2" presStyleCnt="0"/>
+      <dgm:spPr/>
+    </dgm:pt>
+    <dgm:pt modelId="{0A821ACB-079C-4AA8-8E64-04069F8B38CC}" type="pres">
+      <dgm:prSet presAssocID="{3CF8B261-7FB1-4211-AA20-6C87722C7D49}" presName="LevelTwoTextNode" presStyleLbl="node3" presStyleIdx="4" presStyleCnt="6" custScaleX="172437">
+        <dgm:presLayoutVars>
+          <dgm:chPref val="3"/>
+        </dgm:presLayoutVars>
+      </dgm:prSet>
+      <dgm:spPr/>
+      <dgm:t>
+        <a:bodyPr/>
+        <a:lstStyle/>
+        <a:p>
+          <a:endParaRPr lang="zh-CN" altLang="en-US"/>
+        </a:p>
+      </dgm:t>
+    </dgm:pt>
+    <dgm:pt modelId="{D5EA6EB1-D143-49FC-8E3A-EF56E38B1164}" type="pres">
+      <dgm:prSet presAssocID="{3CF8B261-7FB1-4211-AA20-6C87722C7D49}" presName="level3hierChild" presStyleCnt="0"/>
+      <dgm:spPr/>
+    </dgm:pt>
+    <dgm:pt modelId="{AE08BE88-CE48-4984-96E9-DE27D8EC102B}" type="pres">
+      <dgm:prSet presAssocID="{865F1611-AEAB-47D5-B811-56C2588A38A5}" presName="conn2-1" presStyleLbl="parChTrans1D3" presStyleIdx="5" presStyleCnt="6"/>
+      <dgm:spPr/>
+      <dgm:t>
+        <a:bodyPr/>
+        <a:lstStyle/>
+        <a:p>
+          <a:endParaRPr lang="zh-CN" altLang="en-US"/>
+        </a:p>
+      </dgm:t>
+    </dgm:pt>
+    <dgm:pt modelId="{87BDA03F-0015-4903-98B8-148EC667ACD1}" type="pres">
+      <dgm:prSet presAssocID="{865F1611-AEAB-47D5-B811-56C2588A38A5}" presName="connTx" presStyleLbl="parChTrans1D3" presStyleIdx="5" presStyleCnt="6"/>
+      <dgm:spPr/>
+      <dgm:t>
+        <a:bodyPr/>
+        <a:lstStyle/>
+        <a:p>
+          <a:endParaRPr lang="zh-CN" altLang="en-US"/>
+        </a:p>
+      </dgm:t>
+    </dgm:pt>
+    <dgm:pt modelId="{64D003E1-04DD-4E97-9362-4E8111721161}" type="pres">
+      <dgm:prSet presAssocID="{9DAEE240-5485-48EF-A63D-83B00D883463}" presName="root2" presStyleCnt="0"/>
+      <dgm:spPr/>
+    </dgm:pt>
+    <dgm:pt modelId="{7AB66274-8C64-45FC-A7B1-664ACD7E105B}" type="pres">
+      <dgm:prSet presAssocID="{9DAEE240-5485-48EF-A63D-83B00D883463}" presName="LevelTwoTextNode" presStyleLbl="node3" presStyleIdx="5" presStyleCnt="6" custScaleX="172437">
+        <dgm:presLayoutVars>
+          <dgm:chPref val="3"/>
+        </dgm:presLayoutVars>
+      </dgm:prSet>
+      <dgm:spPr/>
+      <dgm:t>
+        <a:bodyPr/>
+        <a:lstStyle/>
+        <a:p>
+          <a:endParaRPr lang="zh-CN" altLang="en-US"/>
+        </a:p>
+      </dgm:t>
+    </dgm:pt>
     <dgm:pt modelId="{A7D340B8-22C7-47CD-9E99-C8C9EE4629A1}" type="pres">
       <dgm:prSet presAssocID="{9DAEE240-5485-48EF-A63D-83B00D883463}" presName="level3hierChild" presStyleCnt="0"/>
       <dgm:spPr/>
     </dgm:pt>
   </dgm:ptLst>
   <dgm:cxnLst>
+    <dgm:cxn modelId="{6FBC3801-255A-4FD7-B443-A58882D34DC5}" type="presOf" srcId="{431D98B8-B24A-4490-AA29-402867D60221}" destId="{3F4D243B-79A1-4566-A0BD-F655D00E76C1}" srcOrd="0" destOrd="0" presId="urn:microsoft.com/office/officeart/2005/8/layout/hierarchy2"/>
+    <dgm:cxn modelId="{179CAD59-D45A-4BF8-99D6-326364937B29}" type="presOf" srcId="{09DCDEBB-6616-4EE1-B7A8-9E199F250470}" destId="{D95A19FF-DA87-4264-A10F-A820CD98D342}" srcOrd="0" destOrd="0" presId="urn:microsoft.com/office/officeart/2005/8/layout/hierarchy2"/>
+    <dgm:cxn modelId="{BF1770FC-BC64-4C4D-9428-52DADFC416BA}" type="presOf" srcId="{7043CF0B-5F52-4194-A26B-1C6035F12FAC}" destId="{8F83FAF7-F58D-436B-BA3C-BEFA84893FCE}" srcOrd="0" destOrd="0" presId="urn:microsoft.com/office/officeart/2005/8/layout/hierarchy2"/>
+    <dgm:cxn modelId="{F8752CCF-5951-45ED-BE1A-8D216DD0231E}" srcId="{7043CF0B-5F52-4194-A26B-1C6035F12FAC}" destId="{07538976-0F4C-4342-8FDC-E82C1EA58CD6}" srcOrd="0" destOrd="0" parTransId="{D73918FA-C5C0-4D13-A09D-522A5ED06D3F}" sibTransId="{7FE7EC95-9715-4766-B415-A33C45B3D497}"/>
+    <dgm:cxn modelId="{E331A224-6C3C-4F38-B0FC-89DB7E189B93}" type="presOf" srcId="{57025AFD-65C0-4565-AF79-783C08BE301B}" destId="{AD4680DC-87B7-4418-BBEA-CD49D54C154D}" srcOrd="1" destOrd="0" presId="urn:microsoft.com/office/officeart/2005/8/layout/hierarchy2"/>
+    <dgm:cxn modelId="{C0F9533D-4F62-4779-B8AD-61058327A7D5}" type="presOf" srcId="{D73918FA-C5C0-4D13-A09D-522A5ED06D3F}" destId="{07B34F24-4F77-459F-824D-A67101850569}" srcOrd="0" destOrd="0" presId="urn:microsoft.com/office/officeart/2005/8/layout/hierarchy2"/>
+    <dgm:cxn modelId="{E248D617-7A19-481A-A022-99917E3C4367}" srcId="{60C028EB-4226-4D97-A6DA-8A71BB50F5E7}" destId="{0FED76A3-BE3A-4309-9DBD-053921E993D9}" srcOrd="0" destOrd="0" parTransId="{001F8E5E-4DAB-4088-BA65-A635AC343E55}" sibTransId="{5D207D04-23A7-4EAA-8AF8-4D979F52E7DF}"/>
+    <dgm:cxn modelId="{FEFD1A3B-DF17-4A8A-B8A4-24904BEA164D}" type="presOf" srcId="{CB0EA68D-1C52-4B45-8073-C8F294D0612A}" destId="{A0E278D8-00FE-4760-B985-D9965752C78A}" srcOrd="1" destOrd="0" presId="urn:microsoft.com/office/officeart/2005/8/layout/hierarchy2"/>
+    <dgm:cxn modelId="{E2ECCE49-4BC1-4CE3-9F31-8C57C64E9CAB}" type="presOf" srcId="{78FA30CF-F7F7-427A-851C-E0B03C77DEAD}" destId="{C70DD696-8EF2-4F5C-855D-1031C6880065}" srcOrd="0" destOrd="0" presId="urn:microsoft.com/office/officeart/2005/8/layout/hierarchy2"/>
+    <dgm:cxn modelId="{5E548964-88D2-4536-9281-54B27D010C14}" type="presOf" srcId="{9D3E5DB5-2BCD-4C1E-847C-B490A9F597D4}" destId="{F6653A6B-87D2-4462-A330-757DF79CBEF2}" srcOrd="0" destOrd="0" presId="urn:microsoft.com/office/officeart/2005/8/layout/hierarchy2"/>
+    <dgm:cxn modelId="{B15BF1AA-1CAE-4108-AB11-2E16DEA3672D}" type="presOf" srcId="{60C028EB-4226-4D97-A6DA-8A71BB50F5E7}" destId="{237F03C6-44F5-4ACC-9965-BCAE14A02312}" srcOrd="0" destOrd="0" presId="urn:microsoft.com/office/officeart/2005/8/layout/hierarchy2"/>
+    <dgm:cxn modelId="{E34F950F-D044-42B7-8214-AF4A2AC1EA89}" type="presOf" srcId="{3CF8B261-7FB1-4211-AA20-6C87722C7D49}" destId="{0A821ACB-079C-4AA8-8E64-04069F8B38CC}" srcOrd="0" destOrd="0" presId="urn:microsoft.com/office/officeart/2005/8/layout/hierarchy2"/>
+    <dgm:cxn modelId="{578E1162-3D16-431F-9F94-F089441A030A}" srcId="{7043CF0B-5F52-4194-A26B-1C6035F12FAC}" destId="{C81824DD-00B7-45A8-8A5E-C9804F69D54E}" srcOrd="1" destOrd="0" parTransId="{F966C9A1-62A7-4A58-8732-563828EEE4FB}" sibTransId="{D1C62FA9-2C2C-4F9F-84D0-E631735A67EE}"/>
+    <dgm:cxn modelId="{2A13E8C4-F9A9-4706-BDED-F348EDB35EBC}" type="presOf" srcId="{9D3E5DB5-2BCD-4C1E-847C-B490A9F597D4}" destId="{E377C5A3-0480-4D61-AE6C-8F073734A85C}" srcOrd="1" destOrd="0" presId="urn:microsoft.com/office/officeart/2005/8/layout/hierarchy2"/>
+    <dgm:cxn modelId="{D759E5C9-0B73-4964-8287-4A675A053659}" type="presOf" srcId="{8D4EE063-B0A6-4C76-9FCD-4AC854044413}" destId="{06AC581A-7061-4F57-9D3F-9844C1CFF174}" srcOrd="0" destOrd="0" presId="urn:microsoft.com/office/officeart/2005/8/layout/hierarchy2"/>
+    <dgm:cxn modelId="{B47A421B-07B7-4DC0-9E18-3A751ECA9B90}" type="presOf" srcId="{F966C9A1-62A7-4A58-8732-563828EEE4FB}" destId="{AB121646-9C72-4176-A1C1-268325446FEB}" srcOrd="1" destOrd="0" presId="urn:microsoft.com/office/officeart/2005/8/layout/hierarchy2"/>
+    <dgm:cxn modelId="{DBF5A680-B5CF-495A-8499-0072D1FF958A}" type="presOf" srcId="{3A427AA2-300A-4394-9DC3-6F3B47D42410}" destId="{5978F671-BFC2-4D4E-9F1C-2A2D04E66A6A}" srcOrd="0" destOrd="0" presId="urn:microsoft.com/office/officeart/2005/8/layout/hierarchy2"/>
+    <dgm:cxn modelId="{3EAE473B-BAFA-4F91-B75C-B36A7DA9E198}" type="presOf" srcId="{A4A34430-1123-4E18-82C9-0859361AB1B4}" destId="{97EAAE34-D75B-4BCD-9034-FA9ED5400BAF}" srcOrd="0" destOrd="0" presId="urn:microsoft.com/office/officeart/2005/8/layout/hierarchy2"/>
+    <dgm:cxn modelId="{6DE1CC87-1E12-4536-A8C9-218F9D9EE742}" srcId="{0FED76A3-BE3A-4309-9DBD-053921E993D9}" destId="{431D98B8-B24A-4490-AA29-402867D60221}" srcOrd="0" destOrd="0" parTransId="{F446E0B6-7B0C-4B92-BE98-157E3B7A5A47}" sibTransId="{B19BA0A5-5290-489D-9679-F6FEE950DF36}"/>
+    <dgm:cxn modelId="{D51147C0-D5D5-447B-BC4B-C85655DBFD79}" type="presOf" srcId="{07538976-0F4C-4342-8FDC-E82C1EA58CD6}" destId="{10ECFEB4-C144-4CAB-9EAA-BC4EBBF42578}" srcOrd="0" destOrd="0" presId="urn:microsoft.com/office/officeart/2005/8/layout/hierarchy2"/>
+    <dgm:cxn modelId="{E049F7D3-7E4E-48E1-9EBC-F93BD1848396}" type="presOf" srcId="{57025AFD-65C0-4565-AF79-783C08BE301B}" destId="{CAE939C1-1F50-4515-A49C-BE8A483860C0}" srcOrd="0" destOrd="0" presId="urn:microsoft.com/office/officeart/2005/8/layout/hierarchy2"/>
+    <dgm:cxn modelId="{BFCE27A8-E155-471B-8808-8E49D8AE74A2}" srcId="{A4A34430-1123-4E18-82C9-0859361AB1B4}" destId="{3CF8B261-7FB1-4211-AA20-6C87722C7D49}" srcOrd="0" destOrd="0" parTransId="{9D3E5DB5-2BCD-4C1E-847C-B490A9F597D4}" sibTransId="{C0345E00-954A-406B-BC6F-32BD1D7E7926}"/>
+    <dgm:cxn modelId="{BF0A9688-AA1C-44EE-861C-586C70BDD66F}" srcId="{431D98B8-B24A-4490-AA29-402867D60221}" destId="{8D4EE063-B0A6-4C76-9FCD-4AC854044413}" srcOrd="1" destOrd="0" parTransId="{3A427AA2-300A-4394-9DC3-6F3B47D42410}" sibTransId="{DA8994AF-A045-4967-A7B7-9A2DC3C0AB99}"/>
+    <dgm:cxn modelId="{CE200A29-1AF6-4410-92DA-6FC839625B6C}" type="presOf" srcId="{F446E0B6-7B0C-4B92-BE98-157E3B7A5A47}" destId="{2DB98CB6-EE4F-466A-858A-D097ADE018D8}" srcOrd="1" destOrd="0" presId="urn:microsoft.com/office/officeart/2005/8/layout/hierarchy2"/>
+    <dgm:cxn modelId="{41A85483-7DD7-439A-A790-D63B1D4A8E1E}" srcId="{431D98B8-B24A-4490-AA29-402867D60221}" destId="{09DCDEBB-6616-4EE1-B7A8-9E199F250470}" srcOrd="0" destOrd="0" parTransId="{CB0EA68D-1C52-4B45-8073-C8F294D0612A}" sibTransId="{CAC978FB-2997-4FF6-9B6A-2FBBAC4E258F}"/>
+    <dgm:cxn modelId="{D790CB3D-2E66-4D35-8755-435708193FA7}" type="presOf" srcId="{F966C9A1-62A7-4A58-8732-563828EEE4FB}" destId="{DBD412D3-9BE5-4901-90F2-6166781ACA75}" srcOrd="0" destOrd="0" presId="urn:microsoft.com/office/officeart/2005/8/layout/hierarchy2"/>
+    <dgm:cxn modelId="{475C46F2-50EF-4959-A576-9F8B77924BA6}" type="presOf" srcId="{CB0EA68D-1C52-4B45-8073-C8F294D0612A}" destId="{FE4D4BA6-D933-4636-810B-4071DC750B3C}" srcOrd="0" destOrd="0" presId="urn:microsoft.com/office/officeart/2005/8/layout/hierarchy2"/>
+    <dgm:cxn modelId="{9757EA31-3C08-4FE0-8F1E-89D4092E126D}" type="presOf" srcId="{3A427AA2-300A-4394-9DC3-6F3B47D42410}" destId="{4D061B77-909F-47F9-A9E3-E5A361B2EA17}" srcOrd="1" destOrd="0" presId="urn:microsoft.com/office/officeart/2005/8/layout/hierarchy2"/>
+    <dgm:cxn modelId="{3F9857BD-4015-49DB-B3C7-F3D5F10D6730}" srcId="{A4A34430-1123-4E18-82C9-0859361AB1B4}" destId="{9DAEE240-5485-48EF-A63D-83B00D883463}" srcOrd="1" destOrd="0" parTransId="{865F1611-AEAB-47D5-B811-56C2588A38A5}" sibTransId="{306FB190-D23A-478C-B570-8DF90A8976DF}"/>
+    <dgm:cxn modelId="{1B3531AF-F3A6-4879-A34E-5CDEFCEC69A3}" type="presOf" srcId="{0FED76A3-BE3A-4309-9DBD-053921E993D9}" destId="{A5A31BFC-2F58-48CA-B764-DB3B93463B80}" srcOrd="0" destOrd="0" presId="urn:microsoft.com/office/officeart/2005/8/layout/hierarchy2"/>
+    <dgm:cxn modelId="{062FB59B-1EC3-4AF4-BCAB-6D2DEBA35020}" type="presOf" srcId="{C81824DD-00B7-45A8-8A5E-C9804F69D54E}" destId="{715A27A3-2D4D-44C1-A35C-E3E0B3EAFBA1}" srcOrd="0" destOrd="0" presId="urn:microsoft.com/office/officeart/2005/8/layout/hierarchy2"/>
+    <dgm:cxn modelId="{CBD2E3E9-50B7-440C-8713-CBA71793D384}" type="presOf" srcId="{9DAEE240-5485-48EF-A63D-83B00D883463}" destId="{7AB66274-8C64-45FC-A7B1-664ACD7E105B}" srcOrd="0" destOrd="0" presId="urn:microsoft.com/office/officeart/2005/8/layout/hierarchy2"/>
     <dgm:cxn modelId="{AB787FFD-D5F3-4C00-A8B8-C1975808F413}" type="presOf" srcId="{865F1611-AEAB-47D5-B811-56C2588A38A5}" destId="{87BDA03F-0015-4903-98B8-148EC667ACD1}" srcOrd="1" destOrd="0" presId="urn:microsoft.com/office/officeart/2005/8/layout/hierarchy2"/>
-    <dgm:cxn modelId="{6FBC3801-255A-4FD7-B443-A58882D34DC5}" type="presOf" srcId="{431D98B8-B24A-4490-AA29-402867D60221}" destId="{3F4D243B-79A1-4566-A0BD-F655D00E76C1}" srcOrd="0" destOrd="0" presId="urn:microsoft.com/office/officeart/2005/8/layout/hierarchy2"/>
-    <dgm:cxn modelId="{F8752CCF-5951-45ED-BE1A-8D216DD0231E}" srcId="{7043CF0B-5F52-4194-A26B-1C6035F12FAC}" destId="{07538976-0F4C-4342-8FDC-E82C1EA58CD6}" srcOrd="0" destOrd="0" parTransId="{D73918FA-C5C0-4D13-A09D-522A5ED06D3F}" sibTransId="{7FE7EC95-9715-4766-B415-A33C45B3D497}"/>
-    <dgm:cxn modelId="{6DE1CC87-1E12-4536-A8C9-218F9D9EE742}" srcId="{0FED76A3-BE3A-4309-9DBD-053921E993D9}" destId="{431D98B8-B24A-4490-AA29-402867D60221}" srcOrd="0" destOrd="0" parTransId="{F446E0B6-7B0C-4B92-BE98-157E3B7A5A47}" sibTransId="{B19BA0A5-5290-489D-9679-F6FEE950DF36}"/>
-    <dgm:cxn modelId="{3EAE473B-BAFA-4F91-B75C-B36A7DA9E198}" type="presOf" srcId="{A4A34430-1123-4E18-82C9-0859361AB1B4}" destId="{97EAAE34-D75B-4BCD-9034-FA9ED5400BAF}" srcOrd="0" destOrd="0" presId="urn:microsoft.com/office/officeart/2005/8/layout/hierarchy2"/>
-    <dgm:cxn modelId="{B47A421B-07B7-4DC0-9E18-3A751ECA9B90}" type="presOf" srcId="{F966C9A1-62A7-4A58-8732-563828EEE4FB}" destId="{AB121646-9C72-4176-A1C1-268325446FEB}" srcOrd="1" destOrd="0" presId="urn:microsoft.com/office/officeart/2005/8/layout/hierarchy2"/>
-    <dgm:cxn modelId="{D51147C0-D5D5-447B-BC4B-C85655DBFD79}" type="presOf" srcId="{07538976-0F4C-4342-8FDC-E82C1EA58CD6}" destId="{10ECFEB4-C144-4CAB-9EAA-BC4EBBF42578}" srcOrd="0" destOrd="0" presId="urn:microsoft.com/office/officeart/2005/8/layout/hierarchy2"/>
-    <dgm:cxn modelId="{DBF5A680-B5CF-495A-8499-0072D1FF958A}" type="presOf" srcId="{3A427AA2-300A-4394-9DC3-6F3B47D42410}" destId="{5978F671-BFC2-4D4E-9F1C-2A2D04E66A6A}" srcOrd="0" destOrd="0" presId="urn:microsoft.com/office/officeart/2005/8/layout/hierarchy2"/>
-    <dgm:cxn modelId="{9757EA31-3C08-4FE0-8F1E-89D4092E126D}" type="presOf" srcId="{3A427AA2-300A-4394-9DC3-6F3B47D42410}" destId="{4D061B77-909F-47F9-A9E3-E5A361B2EA17}" srcOrd="1" destOrd="0" presId="urn:microsoft.com/office/officeart/2005/8/layout/hierarchy2"/>
-    <dgm:cxn modelId="{BF1770FC-BC64-4C4D-9428-52DADFC416BA}" type="presOf" srcId="{7043CF0B-5F52-4194-A26B-1C6035F12FAC}" destId="{8F83FAF7-F58D-436B-BA3C-BEFA84893FCE}" srcOrd="0" destOrd="0" presId="urn:microsoft.com/office/officeart/2005/8/layout/hierarchy2"/>
+    <dgm:cxn modelId="{ED43C035-823B-4130-985A-3587AF33AB5B}" srcId="{0FED76A3-BE3A-4309-9DBD-053921E993D9}" destId="{A4A34430-1123-4E18-82C9-0859361AB1B4}" srcOrd="2" destOrd="0" parTransId="{57025AFD-65C0-4565-AF79-783C08BE301B}" sibTransId="{65BA6CDF-B360-4906-8926-DA938F200E34}"/>
+    <dgm:cxn modelId="{842CDCC9-43B5-4AEA-9943-516A7EBDC77A}" type="presOf" srcId="{78FA30CF-F7F7-427A-851C-E0B03C77DEAD}" destId="{F6B6C2FA-DE6E-49B6-B567-9402151CE33E}" srcOrd="1" destOrd="0" presId="urn:microsoft.com/office/officeart/2005/8/layout/hierarchy2"/>
     <dgm:cxn modelId="{0EE47C4A-90E8-4F88-8B7B-8ABF85D4FDE8}" type="presOf" srcId="{D73918FA-C5C0-4D13-A09D-522A5ED06D3F}" destId="{C1E9E8A3-6F29-40EE-B281-02C9A1A75369}" srcOrd="1" destOrd="0" presId="urn:microsoft.com/office/officeart/2005/8/layout/hierarchy2"/>
     <dgm:cxn modelId="{B965BB29-229A-46E2-AB6A-14D75FFCB29A}" type="presOf" srcId="{865F1611-AEAB-47D5-B811-56C2588A38A5}" destId="{AE08BE88-CE48-4984-96E9-DE27D8EC102B}" srcOrd="0" destOrd="0" presId="urn:microsoft.com/office/officeart/2005/8/layout/hierarchy2"/>
-    <dgm:cxn modelId="{B15BF1AA-1CAE-4108-AB11-2E16DEA3672D}" type="presOf" srcId="{60C028EB-4226-4D97-A6DA-8A71BB50F5E7}" destId="{237F03C6-44F5-4ACC-9965-BCAE14A02312}" srcOrd="0" destOrd="0" presId="urn:microsoft.com/office/officeart/2005/8/layout/hierarchy2"/>
-    <dgm:cxn modelId="{41A85483-7DD7-439A-A790-D63B1D4A8E1E}" srcId="{431D98B8-B24A-4490-AA29-402867D60221}" destId="{09DCDEBB-6616-4EE1-B7A8-9E199F250470}" srcOrd="0" destOrd="0" parTransId="{CB0EA68D-1C52-4B45-8073-C8F294D0612A}" sibTransId="{CAC978FB-2997-4FF6-9B6A-2FBBAC4E258F}"/>
-    <dgm:cxn modelId="{C0F9533D-4F62-4779-B8AD-61058327A7D5}" type="presOf" srcId="{D73918FA-C5C0-4D13-A09D-522A5ED06D3F}" destId="{07B34F24-4F77-459F-824D-A67101850569}" srcOrd="0" destOrd="0" presId="urn:microsoft.com/office/officeart/2005/8/layout/hierarchy2"/>
-    <dgm:cxn modelId="{ED43C035-823B-4130-985A-3587AF33AB5B}" srcId="{0FED76A3-BE3A-4309-9DBD-053921E993D9}" destId="{A4A34430-1123-4E18-82C9-0859361AB1B4}" srcOrd="2" destOrd="0" parTransId="{57025AFD-65C0-4565-AF79-783C08BE301B}" sibTransId="{65BA6CDF-B360-4906-8926-DA938F200E34}"/>
-    <dgm:cxn modelId="{578E1162-3D16-431F-9F94-F089441A030A}" srcId="{7043CF0B-5F52-4194-A26B-1C6035F12FAC}" destId="{C81824DD-00B7-45A8-8A5E-C9804F69D54E}" srcOrd="1" destOrd="0" parTransId="{F966C9A1-62A7-4A58-8732-563828EEE4FB}" sibTransId="{D1C62FA9-2C2C-4F9F-84D0-E631735A67EE}"/>
-    <dgm:cxn modelId="{E34F950F-D044-42B7-8214-AF4A2AC1EA89}" type="presOf" srcId="{3CF8B261-7FB1-4211-AA20-6C87722C7D49}" destId="{0A821ACB-079C-4AA8-8E64-04069F8B38CC}" srcOrd="0" destOrd="0" presId="urn:microsoft.com/office/officeart/2005/8/layout/hierarchy2"/>
-    <dgm:cxn modelId="{475C46F2-50EF-4959-A576-9F8B77924BA6}" type="presOf" srcId="{CB0EA68D-1C52-4B45-8073-C8F294D0612A}" destId="{FE4D4BA6-D933-4636-810B-4071DC750B3C}" srcOrd="0" destOrd="0" presId="urn:microsoft.com/office/officeart/2005/8/layout/hierarchy2"/>
-    <dgm:cxn modelId="{FEFD1A3B-DF17-4A8A-B8A4-24904BEA164D}" type="presOf" srcId="{CB0EA68D-1C52-4B45-8073-C8F294D0612A}" destId="{A0E278D8-00FE-4760-B985-D9965752C78A}" srcOrd="1" destOrd="0" presId="urn:microsoft.com/office/officeart/2005/8/layout/hierarchy2"/>
-    <dgm:cxn modelId="{E049F7D3-7E4E-48E1-9EBC-F93BD1848396}" type="presOf" srcId="{57025AFD-65C0-4565-AF79-783C08BE301B}" destId="{CAE939C1-1F50-4515-A49C-BE8A483860C0}" srcOrd="0" destOrd="0" presId="urn:microsoft.com/office/officeart/2005/8/layout/hierarchy2"/>
-    <dgm:cxn modelId="{E248D617-7A19-481A-A022-99917E3C4367}" srcId="{60C028EB-4226-4D97-A6DA-8A71BB50F5E7}" destId="{0FED76A3-BE3A-4309-9DBD-053921E993D9}" srcOrd="0" destOrd="0" parTransId="{001F8E5E-4DAB-4088-BA65-A635AC343E55}" sibTransId="{5D207D04-23A7-4EAA-8AF8-4D979F52E7DF}"/>
-    <dgm:cxn modelId="{2A13E8C4-F9A9-4706-BDED-F348EDB35EBC}" type="presOf" srcId="{9D3E5DB5-2BCD-4C1E-847C-B490A9F597D4}" destId="{E377C5A3-0480-4D61-AE6C-8F073734A85C}" srcOrd="1" destOrd="0" presId="urn:microsoft.com/office/officeart/2005/8/layout/hierarchy2"/>
-    <dgm:cxn modelId="{D790CB3D-2E66-4D35-8755-435708193FA7}" type="presOf" srcId="{F966C9A1-62A7-4A58-8732-563828EEE4FB}" destId="{DBD412D3-9BE5-4901-90F2-6166781ACA75}" srcOrd="0" destOrd="0" presId="urn:microsoft.com/office/officeart/2005/8/layout/hierarchy2"/>
-    <dgm:cxn modelId="{D759E5C9-0B73-4964-8287-4A675A053659}" type="presOf" srcId="{8D4EE063-B0A6-4C76-9FCD-4AC854044413}" destId="{06AC581A-7061-4F57-9D3F-9844C1CFF174}" srcOrd="0" destOrd="0" presId="urn:microsoft.com/office/officeart/2005/8/layout/hierarchy2"/>
-    <dgm:cxn modelId="{BFCE27A8-E155-471B-8808-8E49D8AE74A2}" srcId="{A4A34430-1123-4E18-82C9-0859361AB1B4}" destId="{3CF8B261-7FB1-4211-AA20-6C87722C7D49}" srcOrd="0" destOrd="0" parTransId="{9D3E5DB5-2BCD-4C1E-847C-B490A9F597D4}" sibTransId="{C0345E00-954A-406B-BC6F-32BD1D7E7926}"/>
-    <dgm:cxn modelId="{3F9857BD-4015-49DB-B3C7-F3D5F10D6730}" srcId="{A4A34430-1123-4E18-82C9-0859361AB1B4}" destId="{9DAEE240-5485-48EF-A63D-83B00D883463}" srcOrd="1" destOrd="0" parTransId="{865F1611-AEAB-47D5-B811-56C2588A38A5}" sibTransId="{306FB190-D23A-478C-B570-8DF90A8976DF}"/>
-    <dgm:cxn modelId="{062FB59B-1EC3-4AF4-BCAB-6D2DEBA35020}" type="presOf" srcId="{C81824DD-00B7-45A8-8A5E-C9804F69D54E}" destId="{715A27A3-2D4D-44C1-A35C-E3E0B3EAFBA1}" srcOrd="0" destOrd="0" presId="urn:microsoft.com/office/officeart/2005/8/layout/hierarchy2"/>
-    <dgm:cxn modelId="{E2ECCE49-4BC1-4CE3-9F31-8C57C64E9CAB}" type="presOf" srcId="{78FA30CF-F7F7-427A-851C-E0B03C77DEAD}" destId="{C70DD696-8EF2-4F5C-855D-1031C6880065}" srcOrd="0" destOrd="0" presId="urn:microsoft.com/office/officeart/2005/8/layout/hierarchy2"/>
-    <dgm:cxn modelId="{E331A224-6C3C-4F38-B0FC-89DB7E189B93}" type="presOf" srcId="{57025AFD-65C0-4565-AF79-783C08BE301B}" destId="{AD4680DC-87B7-4418-BBEA-CD49D54C154D}" srcOrd="1" destOrd="0" presId="urn:microsoft.com/office/officeart/2005/8/layout/hierarchy2"/>
+    <dgm:cxn modelId="{A16E59FC-EBC5-41F3-B748-280321B36394}" type="presOf" srcId="{F446E0B6-7B0C-4B92-BE98-157E3B7A5A47}" destId="{3B172838-17E6-46FD-8B5E-FE426CCB9A01}" srcOrd="0" destOrd="0" presId="urn:microsoft.com/office/officeart/2005/8/layout/hierarchy2"/>
     <dgm:cxn modelId="{C2FF233A-48F3-4937-AAF5-AB11BA15E5C1}" srcId="{0FED76A3-BE3A-4309-9DBD-053921E993D9}" destId="{7043CF0B-5F52-4194-A26B-1C6035F12FAC}" srcOrd="1" destOrd="0" parTransId="{78FA30CF-F7F7-427A-851C-E0B03C77DEAD}" sibTransId="{22AB7DC6-5587-4D24-BC15-778E7518E357}"/>
-    <dgm:cxn modelId="{CBD2E3E9-50B7-440C-8713-CBA71793D384}" type="presOf" srcId="{9DAEE240-5485-48EF-A63D-83B00D883463}" destId="{7AB66274-8C64-45FC-A7B1-664ACD7E105B}" srcOrd="0" destOrd="0" presId="urn:microsoft.com/office/officeart/2005/8/layout/hierarchy2"/>
-    <dgm:cxn modelId="{179CAD59-D45A-4BF8-99D6-326364937B29}" type="presOf" srcId="{09DCDEBB-6616-4EE1-B7A8-9E199F250470}" destId="{D95A19FF-DA87-4264-A10F-A820CD98D342}" srcOrd="0" destOrd="0" presId="urn:microsoft.com/office/officeart/2005/8/layout/hierarchy2"/>
-    <dgm:cxn modelId="{1B3531AF-F3A6-4879-A34E-5CDEFCEC69A3}" type="presOf" srcId="{0FED76A3-BE3A-4309-9DBD-053921E993D9}" destId="{A5A31BFC-2F58-48CA-B764-DB3B93463B80}" srcOrd="0" destOrd="0" presId="urn:microsoft.com/office/officeart/2005/8/layout/hierarchy2"/>
-    <dgm:cxn modelId="{842CDCC9-43B5-4AEA-9943-516A7EBDC77A}" type="presOf" srcId="{78FA30CF-F7F7-427A-851C-E0B03C77DEAD}" destId="{F6B6C2FA-DE6E-49B6-B567-9402151CE33E}" srcOrd="1" destOrd="0" presId="urn:microsoft.com/office/officeart/2005/8/layout/hierarchy2"/>
-    <dgm:cxn modelId="{A16E59FC-EBC5-41F3-B748-280321B36394}" type="presOf" srcId="{F446E0B6-7B0C-4B92-BE98-157E3B7A5A47}" destId="{3B172838-17E6-46FD-8B5E-FE426CCB9A01}" srcOrd="0" destOrd="0" presId="urn:microsoft.com/office/officeart/2005/8/layout/hierarchy2"/>
-    <dgm:cxn modelId="{CE200A29-1AF6-4410-92DA-6FC839625B6C}" type="presOf" srcId="{F446E0B6-7B0C-4B92-BE98-157E3B7A5A47}" destId="{2DB98CB6-EE4F-466A-858A-D097ADE018D8}" srcOrd="1" destOrd="0" presId="urn:microsoft.com/office/officeart/2005/8/layout/hierarchy2"/>
-    <dgm:cxn modelId="{BF0A9688-AA1C-44EE-861C-586C70BDD66F}" srcId="{431D98B8-B24A-4490-AA29-402867D60221}" destId="{8D4EE063-B0A6-4C76-9FCD-4AC854044413}" srcOrd="1" destOrd="0" parTransId="{3A427AA2-300A-4394-9DC3-6F3B47D42410}" sibTransId="{DA8994AF-A045-4967-A7B7-9A2DC3C0AB99}"/>
-    <dgm:cxn modelId="{5E548964-88D2-4536-9281-54B27D010C14}" type="presOf" srcId="{9D3E5DB5-2BCD-4C1E-847C-B490A9F597D4}" destId="{F6653A6B-87D2-4462-A330-757DF79CBEF2}" srcOrd="0" destOrd="0" presId="urn:microsoft.com/office/officeart/2005/8/layout/hierarchy2"/>
     <dgm:cxn modelId="{F9018D3C-5B47-421B-A00A-A9DF30E90892}" type="presParOf" srcId="{237F03C6-44F5-4ACC-9965-BCAE14A02312}" destId="{B3DA3AD1-F253-429D-A372-D9D438369994}" srcOrd="0" destOrd="0" presId="urn:microsoft.com/office/officeart/2005/8/layout/hierarchy2"/>
     <dgm:cxn modelId="{B6F355F6-65BF-4926-AC6E-61A070985DB5}" type="presParOf" srcId="{B3DA3AD1-F253-429D-A372-D9D438369994}" destId="{A5A31BFC-2F58-48CA-B764-DB3B93463B80}" srcOrd="0" destOrd="0" presId="urn:microsoft.com/office/officeart/2005/8/layout/hierarchy2"/>
     <dgm:cxn modelId="{0DEFDB00-F72E-46AF-A674-7F772193E9A8}" type="presParOf" srcId="{B3DA3AD1-F253-429D-A372-D9D438369994}" destId="{7FF3D3D9-1F07-49C7-859C-9AA435F8ED4F}" srcOrd="1" destOrd="0" presId="urn:microsoft.com/office/officeart/2005/8/layout/hierarchy2"/>
@@ -4386,14 +4414,35 @@
         </dgm:presLayoutVars>
       </dgm:prSet>
       <dgm:spPr/>
+      <dgm:t>
+        <a:bodyPr/>
+        <a:lstStyle/>
+        <a:p>
+          <a:endParaRPr lang="zh-CN" altLang="en-US"/>
+        </a:p>
+      </dgm:t>
     </dgm:pt>
     <dgm:pt modelId="{A570D424-E3CC-44E8-AD35-18395D63960D}" type="pres">
       <dgm:prSet presAssocID="{6E0867C9-7FA5-4AE5-96CF-E928D765CFF0}" presName="gear1srcNode" presStyleLbl="node1" presStyleIdx="0" presStyleCnt="3"/>
       <dgm:spPr/>
+      <dgm:t>
+        <a:bodyPr/>
+        <a:lstStyle/>
+        <a:p>
+          <a:endParaRPr lang="zh-CN" altLang="en-US"/>
+        </a:p>
+      </dgm:t>
     </dgm:pt>
     <dgm:pt modelId="{C3204493-D6A3-47ED-A252-62219CDCF647}" type="pres">
       <dgm:prSet presAssocID="{6E0867C9-7FA5-4AE5-96CF-E928D765CFF0}" presName="gear1dstNode" presStyleLbl="node1" presStyleIdx="0" presStyleCnt="3"/>
       <dgm:spPr/>
+      <dgm:t>
+        <a:bodyPr/>
+        <a:lstStyle/>
+        <a:p>
+          <a:endParaRPr lang="zh-CN" altLang="en-US"/>
+        </a:p>
+      </dgm:t>
     </dgm:pt>
     <dgm:pt modelId="{87DBF983-7F68-44F6-90B2-21DD191B7335}" type="pres">
       <dgm:prSet presAssocID="{44C7BDC6-2B0C-401A-834C-89ED6FDFD199}" presName="gear2" presStyleLbl="node1" presStyleIdx="1" presStyleCnt="3">
@@ -4403,18 +4452,46 @@
         </dgm:presLayoutVars>
       </dgm:prSet>
       <dgm:spPr/>
+      <dgm:t>
+        <a:bodyPr/>
+        <a:lstStyle/>
+        <a:p>
+          <a:endParaRPr lang="zh-CN" altLang="en-US"/>
+        </a:p>
+      </dgm:t>
     </dgm:pt>
     <dgm:pt modelId="{DCD3FE5A-106F-4428-8306-843BBA5CD7EC}" type="pres">
       <dgm:prSet presAssocID="{44C7BDC6-2B0C-401A-834C-89ED6FDFD199}" presName="gear2srcNode" presStyleLbl="node1" presStyleIdx="1" presStyleCnt="3"/>
       <dgm:spPr/>
+      <dgm:t>
+        <a:bodyPr/>
+        <a:lstStyle/>
+        <a:p>
+          <a:endParaRPr lang="zh-CN" altLang="en-US"/>
+        </a:p>
+      </dgm:t>
     </dgm:pt>
     <dgm:pt modelId="{FD168F9A-CE5F-4D5D-883C-6E9058F9F06C}" type="pres">
       <dgm:prSet presAssocID="{44C7BDC6-2B0C-401A-834C-89ED6FDFD199}" presName="gear2dstNode" presStyleLbl="node1" presStyleIdx="1" presStyleCnt="3"/>
       <dgm:spPr/>
+      <dgm:t>
+        <a:bodyPr/>
+        <a:lstStyle/>
+        <a:p>
+          <a:endParaRPr lang="zh-CN" altLang="en-US"/>
+        </a:p>
+      </dgm:t>
     </dgm:pt>
     <dgm:pt modelId="{0DFBCC03-8C31-420A-AC05-DC473D82D312}" type="pres">
       <dgm:prSet presAssocID="{D842874B-6BEB-4294-AE99-95A806FE0E6E}" presName="gear3" presStyleLbl="node1" presStyleIdx="2" presStyleCnt="3"/>
       <dgm:spPr/>
+      <dgm:t>
+        <a:bodyPr/>
+        <a:lstStyle/>
+        <a:p>
+          <a:endParaRPr lang="zh-CN" altLang="en-US"/>
+        </a:p>
+      </dgm:t>
     </dgm:pt>
     <dgm:pt modelId="{821F2A1A-59EF-4627-87EB-418473C618C4}" type="pres">
       <dgm:prSet presAssocID="{D842874B-6BEB-4294-AE99-95A806FE0E6E}" presName="gear3tx" presStyleLbl="node1" presStyleIdx="2" presStyleCnt="3">
@@ -4424,46 +4501,88 @@
         </dgm:presLayoutVars>
       </dgm:prSet>
       <dgm:spPr/>
+      <dgm:t>
+        <a:bodyPr/>
+        <a:lstStyle/>
+        <a:p>
+          <a:endParaRPr lang="zh-CN" altLang="en-US"/>
+        </a:p>
+      </dgm:t>
     </dgm:pt>
     <dgm:pt modelId="{0E24EA98-44ED-48F2-BED3-2B94329AA1D2}" type="pres">
       <dgm:prSet presAssocID="{D842874B-6BEB-4294-AE99-95A806FE0E6E}" presName="gear3srcNode" presStyleLbl="node1" presStyleIdx="2" presStyleCnt="3"/>
       <dgm:spPr/>
+      <dgm:t>
+        <a:bodyPr/>
+        <a:lstStyle/>
+        <a:p>
+          <a:endParaRPr lang="zh-CN" altLang="en-US"/>
+        </a:p>
+      </dgm:t>
     </dgm:pt>
     <dgm:pt modelId="{24D60FB9-2D57-4A66-A4AA-9A65BCA2D67D}" type="pres">
       <dgm:prSet presAssocID="{D842874B-6BEB-4294-AE99-95A806FE0E6E}" presName="gear3dstNode" presStyleLbl="node1" presStyleIdx="2" presStyleCnt="3"/>
       <dgm:spPr/>
+      <dgm:t>
+        <a:bodyPr/>
+        <a:lstStyle/>
+        <a:p>
+          <a:endParaRPr lang="zh-CN" altLang="en-US"/>
+        </a:p>
+      </dgm:t>
     </dgm:pt>
     <dgm:pt modelId="{E109EA82-1B47-4E6E-A0ED-CEC700DB4757}" type="pres">
       <dgm:prSet presAssocID="{EB947E7F-CDBF-402E-B36B-66D470CEEC8E}" presName="connector1" presStyleLbl="sibTrans2D1" presStyleIdx="0" presStyleCnt="3"/>
       <dgm:spPr/>
+      <dgm:t>
+        <a:bodyPr/>
+        <a:lstStyle/>
+        <a:p>
+          <a:endParaRPr lang="zh-CN" altLang="en-US"/>
+        </a:p>
+      </dgm:t>
     </dgm:pt>
     <dgm:pt modelId="{2D8A94CC-6751-4C2E-9C0B-1D9411D372E7}" type="pres">
       <dgm:prSet presAssocID="{8F031268-C10F-46BC-92A1-F38CC916BF16}" presName="connector2" presStyleLbl="sibTrans2D1" presStyleIdx="1" presStyleCnt="3"/>
       <dgm:spPr/>
+      <dgm:t>
+        <a:bodyPr/>
+        <a:lstStyle/>
+        <a:p>
+          <a:endParaRPr lang="zh-CN" altLang="en-US"/>
+        </a:p>
+      </dgm:t>
     </dgm:pt>
     <dgm:pt modelId="{6F427BDC-87E4-4FE5-A5A3-A4FBABB25647}" type="pres">
       <dgm:prSet presAssocID="{641EE935-78D7-443C-92AF-4961CB3FEEBB}" presName="connector3" presStyleLbl="sibTrans2D1" presStyleIdx="2" presStyleCnt="3"/>
       <dgm:spPr/>
+      <dgm:t>
+        <a:bodyPr/>
+        <a:lstStyle/>
+        <a:p>
+          <a:endParaRPr lang="zh-CN" altLang="en-US"/>
+        </a:p>
+      </dgm:t>
     </dgm:pt>
   </dgm:ptLst>
   <dgm:cxnLst>
+    <dgm:cxn modelId="{EBD95265-CD5E-4168-A698-7925B4C188D6}" type="presOf" srcId="{D842874B-6BEB-4294-AE99-95A806FE0E6E}" destId="{0DFBCC03-8C31-420A-AC05-DC473D82D312}" srcOrd="0" destOrd="0" presId="urn:microsoft.com/office/officeart/2005/8/layout/gear1"/>
+    <dgm:cxn modelId="{1840DD23-8CEA-4A85-8691-BDF85633CF72}" srcId="{0D46B2AD-2895-4EF8-B01C-656A9FBCD3A0}" destId="{D842874B-6BEB-4294-AE99-95A806FE0E6E}" srcOrd="2" destOrd="0" parTransId="{56C64DB9-5CCA-47C6-9424-18F9B27407EE}" sibTransId="{641EE935-78D7-443C-92AF-4961CB3FEEBB}"/>
+    <dgm:cxn modelId="{8CBE618A-F417-41BE-9268-10C20DEE5EC5}" type="presOf" srcId="{44C7BDC6-2B0C-401A-834C-89ED6FDFD199}" destId="{FD168F9A-CE5F-4D5D-883C-6E9058F9F06C}" srcOrd="2" destOrd="0" presId="urn:microsoft.com/office/officeart/2005/8/layout/gear1"/>
+    <dgm:cxn modelId="{F842DC6F-157E-4F8A-B75C-4B2A006DF184}" type="presOf" srcId="{6E0867C9-7FA5-4AE5-96CF-E928D765CFF0}" destId="{A570D424-E3CC-44E8-AD35-18395D63960D}" srcOrd="1" destOrd="0" presId="urn:microsoft.com/office/officeart/2005/8/layout/gear1"/>
+    <dgm:cxn modelId="{441227B2-8385-46D8-8605-94B96C462478}" type="presOf" srcId="{44C7BDC6-2B0C-401A-834C-89ED6FDFD199}" destId="{87DBF983-7F68-44F6-90B2-21DD191B7335}" srcOrd="0" destOrd="0" presId="urn:microsoft.com/office/officeart/2005/8/layout/gear1"/>
+    <dgm:cxn modelId="{EDAACD08-EAEE-4064-8E01-D2E9924D8E86}" type="presOf" srcId="{D842874B-6BEB-4294-AE99-95A806FE0E6E}" destId="{24D60FB9-2D57-4A66-A4AA-9A65BCA2D67D}" srcOrd="3" destOrd="0" presId="urn:microsoft.com/office/officeart/2005/8/layout/gear1"/>
+    <dgm:cxn modelId="{681BB114-A96E-4A16-91D7-E8AF055F7BDD}" type="presOf" srcId="{6E0867C9-7FA5-4AE5-96CF-E928D765CFF0}" destId="{9E67497B-A858-4943-92EF-CCF907C5DF3F}" srcOrd="0" destOrd="0" presId="urn:microsoft.com/office/officeart/2005/8/layout/gear1"/>
+    <dgm:cxn modelId="{4C1DBB42-3FF7-49EF-A4D2-6FE558FA863E}" type="presOf" srcId="{D842874B-6BEB-4294-AE99-95A806FE0E6E}" destId="{821F2A1A-59EF-4627-87EB-418473C618C4}" srcOrd="1" destOrd="0" presId="urn:microsoft.com/office/officeart/2005/8/layout/gear1"/>
+    <dgm:cxn modelId="{C1D405FC-EE4F-4DFC-A9EE-140EA5FBA413}" type="presOf" srcId="{44C7BDC6-2B0C-401A-834C-89ED6FDFD199}" destId="{DCD3FE5A-106F-4428-8306-843BBA5CD7EC}" srcOrd="1" destOrd="0" presId="urn:microsoft.com/office/officeart/2005/8/layout/gear1"/>
     <dgm:cxn modelId="{F1A2ABE6-FCC4-4F1C-B8B1-BE8053475110}" type="presOf" srcId="{6E0867C9-7FA5-4AE5-96CF-E928D765CFF0}" destId="{C3204493-D6A3-47ED-A252-62219CDCF647}" srcOrd="2" destOrd="0" presId="urn:microsoft.com/office/officeart/2005/8/layout/gear1"/>
     <dgm:cxn modelId="{E1C82195-201E-4004-BBFC-F4FB87E8F3F1}" type="presOf" srcId="{8F031268-C10F-46BC-92A1-F38CC916BF16}" destId="{2D8A94CC-6751-4C2E-9C0B-1D9411D372E7}" srcOrd="0" destOrd="0" presId="urn:microsoft.com/office/officeart/2005/8/layout/gear1"/>
-    <dgm:cxn modelId="{681BB114-A96E-4A16-91D7-E8AF055F7BDD}" type="presOf" srcId="{6E0867C9-7FA5-4AE5-96CF-E928D765CFF0}" destId="{9E67497B-A858-4943-92EF-CCF907C5DF3F}" srcOrd="0" destOrd="0" presId="urn:microsoft.com/office/officeart/2005/8/layout/gear1"/>
+    <dgm:cxn modelId="{CEEE954E-7F33-433F-9FE6-17D24B0BC329}" type="presOf" srcId="{EB947E7F-CDBF-402E-B36B-66D470CEEC8E}" destId="{E109EA82-1B47-4E6E-A0ED-CEC700DB4757}" srcOrd="0" destOrd="0" presId="urn:microsoft.com/office/officeart/2005/8/layout/gear1"/>
+    <dgm:cxn modelId="{BF689BA4-0780-4156-9A73-087351DCB0FD}" srcId="{0D46B2AD-2895-4EF8-B01C-656A9FBCD3A0}" destId="{44C7BDC6-2B0C-401A-834C-89ED6FDFD199}" srcOrd="1" destOrd="0" parTransId="{45C1DE54-E3F7-42E8-A404-0157EA93EFA6}" sibTransId="{8F031268-C10F-46BC-92A1-F38CC916BF16}"/>
     <dgm:cxn modelId="{5964BC4C-D7D7-4923-B779-A9C70D022187}" type="presOf" srcId="{641EE935-78D7-443C-92AF-4961CB3FEEBB}" destId="{6F427BDC-87E4-4FE5-A5A3-A4FBABB25647}" srcOrd="0" destOrd="0" presId="urn:microsoft.com/office/officeart/2005/8/layout/gear1"/>
+    <dgm:cxn modelId="{F1511482-583B-4885-8278-9C56F63DDD07}" type="presOf" srcId="{0D46B2AD-2895-4EF8-B01C-656A9FBCD3A0}" destId="{57BB5DB5-0179-4079-B189-F4B7564EA685}" srcOrd="0" destOrd="0" presId="urn:microsoft.com/office/officeart/2005/8/layout/gear1"/>
+    <dgm:cxn modelId="{0B0D39BB-2058-44C6-89AC-A5051AD732C8}" srcId="{0D46B2AD-2895-4EF8-B01C-656A9FBCD3A0}" destId="{6E0867C9-7FA5-4AE5-96CF-E928D765CFF0}" srcOrd="0" destOrd="0" parTransId="{11420C56-F3B1-4EC4-B5F3-08CB01BE1351}" sibTransId="{EB947E7F-CDBF-402E-B36B-66D470CEEC8E}"/>
     <dgm:cxn modelId="{C013CF42-0217-4182-8D8D-0A4B6E711280}" type="presOf" srcId="{D842874B-6BEB-4294-AE99-95A806FE0E6E}" destId="{0E24EA98-44ED-48F2-BED3-2B94329AA1D2}" srcOrd="2" destOrd="0" presId="urn:microsoft.com/office/officeart/2005/8/layout/gear1"/>
-    <dgm:cxn modelId="{C1D405FC-EE4F-4DFC-A9EE-140EA5FBA413}" type="presOf" srcId="{44C7BDC6-2B0C-401A-834C-89ED6FDFD199}" destId="{DCD3FE5A-106F-4428-8306-843BBA5CD7EC}" srcOrd="1" destOrd="0" presId="urn:microsoft.com/office/officeart/2005/8/layout/gear1"/>
-    <dgm:cxn modelId="{EBD95265-CD5E-4168-A698-7925B4C188D6}" type="presOf" srcId="{D842874B-6BEB-4294-AE99-95A806FE0E6E}" destId="{0DFBCC03-8C31-420A-AC05-DC473D82D312}" srcOrd="0" destOrd="0" presId="urn:microsoft.com/office/officeart/2005/8/layout/gear1"/>
-    <dgm:cxn modelId="{EDAACD08-EAEE-4064-8E01-D2E9924D8E86}" type="presOf" srcId="{D842874B-6BEB-4294-AE99-95A806FE0E6E}" destId="{24D60FB9-2D57-4A66-A4AA-9A65BCA2D67D}" srcOrd="3" destOrd="0" presId="urn:microsoft.com/office/officeart/2005/8/layout/gear1"/>
-    <dgm:cxn modelId="{0B0D39BB-2058-44C6-89AC-A5051AD732C8}" srcId="{0D46B2AD-2895-4EF8-B01C-656A9FBCD3A0}" destId="{6E0867C9-7FA5-4AE5-96CF-E928D765CFF0}" srcOrd="0" destOrd="0" parTransId="{11420C56-F3B1-4EC4-B5F3-08CB01BE1351}" sibTransId="{EB947E7F-CDBF-402E-B36B-66D470CEEC8E}"/>
-    <dgm:cxn modelId="{F842DC6F-157E-4F8A-B75C-4B2A006DF184}" type="presOf" srcId="{6E0867C9-7FA5-4AE5-96CF-E928D765CFF0}" destId="{A570D424-E3CC-44E8-AD35-18395D63960D}" srcOrd="1" destOrd="0" presId="urn:microsoft.com/office/officeart/2005/8/layout/gear1"/>
-    <dgm:cxn modelId="{CEEE954E-7F33-433F-9FE6-17D24B0BC329}" type="presOf" srcId="{EB947E7F-CDBF-402E-B36B-66D470CEEC8E}" destId="{E109EA82-1B47-4E6E-A0ED-CEC700DB4757}" srcOrd="0" destOrd="0" presId="urn:microsoft.com/office/officeart/2005/8/layout/gear1"/>
-    <dgm:cxn modelId="{4C1DBB42-3FF7-49EF-A4D2-6FE558FA863E}" type="presOf" srcId="{D842874B-6BEB-4294-AE99-95A806FE0E6E}" destId="{821F2A1A-59EF-4627-87EB-418473C618C4}" srcOrd="1" destOrd="0" presId="urn:microsoft.com/office/officeart/2005/8/layout/gear1"/>
-    <dgm:cxn modelId="{BF689BA4-0780-4156-9A73-087351DCB0FD}" srcId="{0D46B2AD-2895-4EF8-B01C-656A9FBCD3A0}" destId="{44C7BDC6-2B0C-401A-834C-89ED6FDFD199}" srcOrd="1" destOrd="0" parTransId="{45C1DE54-E3F7-42E8-A404-0157EA93EFA6}" sibTransId="{8F031268-C10F-46BC-92A1-F38CC916BF16}"/>
-    <dgm:cxn modelId="{1840DD23-8CEA-4A85-8691-BDF85633CF72}" srcId="{0D46B2AD-2895-4EF8-B01C-656A9FBCD3A0}" destId="{D842874B-6BEB-4294-AE99-95A806FE0E6E}" srcOrd="2" destOrd="0" parTransId="{56C64DB9-5CCA-47C6-9424-18F9B27407EE}" sibTransId="{641EE935-78D7-443C-92AF-4961CB3FEEBB}"/>
-    <dgm:cxn modelId="{8CBE618A-F417-41BE-9268-10C20DEE5EC5}" type="presOf" srcId="{44C7BDC6-2B0C-401A-834C-89ED6FDFD199}" destId="{FD168F9A-CE5F-4D5D-883C-6E9058F9F06C}" srcOrd="2" destOrd="0" presId="urn:microsoft.com/office/officeart/2005/8/layout/gear1"/>
-    <dgm:cxn modelId="{441227B2-8385-46D8-8605-94B96C462478}" type="presOf" srcId="{44C7BDC6-2B0C-401A-834C-89ED6FDFD199}" destId="{87DBF983-7F68-44F6-90B2-21DD191B7335}" srcOrd="0" destOrd="0" presId="urn:microsoft.com/office/officeart/2005/8/layout/gear1"/>
-    <dgm:cxn modelId="{F1511482-583B-4885-8278-9C56F63DDD07}" type="presOf" srcId="{0D46B2AD-2895-4EF8-B01C-656A9FBCD3A0}" destId="{57BB5DB5-0179-4079-B189-F4B7564EA685}" srcOrd="0" destOrd="0" presId="urn:microsoft.com/office/officeart/2005/8/layout/gear1"/>
     <dgm:cxn modelId="{EC6038BB-69F9-435A-9ECA-5661D0D287DF}" type="presParOf" srcId="{57BB5DB5-0179-4079-B189-F4B7564EA685}" destId="{9E67497B-A858-4943-92EF-CCF907C5DF3F}" srcOrd="0" destOrd="0" presId="urn:microsoft.com/office/officeart/2005/8/layout/gear1"/>
     <dgm:cxn modelId="{53067B45-2B5B-43F3-B9CF-6486C222AC61}" type="presParOf" srcId="{57BB5DB5-0179-4079-B189-F4B7564EA685}" destId="{A570D424-E3CC-44E8-AD35-18395D63960D}" srcOrd="1" destOrd="0" presId="urn:microsoft.com/office/officeart/2005/8/layout/gear1"/>
     <dgm:cxn modelId="{362A9514-F761-48F2-A989-7799C72D41B6}" type="presParOf" srcId="{57BB5DB5-0179-4079-B189-F4B7564EA685}" destId="{C3204493-D6A3-47ED-A252-62219CDCF647}" srcOrd="2" destOrd="0" presId="urn:microsoft.com/office/officeart/2005/8/layout/gear1"/>
@@ -10584,1503 +10703,6 @@
       <dsp:cNvGrpSpPr/>
     </dsp:nvGrpSpPr>
     <dsp:grpSpPr/>
-    <dsp:sp modelId="{6789CA3B-8D21-492B-9CD9-0149561CD77C}">
-      <dsp:nvSpPr>
-        <dsp:cNvPr id="0" name=""/>
-        <dsp:cNvSpPr/>
-      </dsp:nvSpPr>
-      <dsp:spPr>
-        <a:xfrm>
-          <a:off x="928877" y="1883695"/>
-          <a:ext cx="446217" cy="1233074"/>
-        </a:xfrm>
-        <a:custGeom>
-          <a:avLst/>
-          <a:gdLst/>
-          <a:ahLst/>
-          <a:cxnLst/>
-          <a:rect l="0" t="0" r="0" b="0"/>
-          <a:pathLst>
-            <a:path>
-              <a:moveTo>
-                <a:pt x="0" y="0"/>
-              </a:moveTo>
-              <a:lnTo>
-                <a:pt x="223108" y="0"/>
-              </a:lnTo>
-              <a:lnTo>
-                <a:pt x="223108" y="1233074"/>
-              </a:lnTo>
-              <a:lnTo>
-                <a:pt x="446217" y="1233074"/>
-              </a:lnTo>
-            </a:path>
-          </a:pathLst>
-        </a:custGeom>
-        <a:noFill/>
-        <a:ln w="25400" cap="flat" cmpd="sng" algn="ctr">
-          <a:solidFill>
-            <a:schemeClr val="accent1">
-              <a:shade val="60000"/>
-              <a:hueOff val="0"/>
-              <a:satOff val="0"/>
-              <a:lumOff val="0"/>
-              <a:alphaOff val="0"/>
-            </a:schemeClr>
-          </a:solidFill>
-          <a:prstDash val="solid"/>
-        </a:ln>
-        <a:effectLst/>
-      </dsp:spPr>
-      <dsp:style>
-        <a:lnRef idx="2">
-          <a:scrgbClr r="0" g="0" b="0"/>
-        </a:lnRef>
-        <a:fillRef idx="0">
-          <a:scrgbClr r="0" g="0" b="0"/>
-        </a:fillRef>
-        <a:effectRef idx="0">
-          <a:scrgbClr r="0" g="0" b="0"/>
-        </a:effectRef>
-        <a:fontRef idx="minor"/>
-      </dsp:style>
-    </dsp:sp>
-    <dsp:sp modelId="{3587A352-E442-4E31-A49B-693F82C1ABF6}">
-      <dsp:nvSpPr>
-        <dsp:cNvPr id="0" name=""/>
-        <dsp:cNvSpPr/>
-      </dsp:nvSpPr>
-      <dsp:spPr>
-        <a:xfrm>
-          <a:off x="928877" y="1883695"/>
-          <a:ext cx="446217" cy="611062"/>
-        </a:xfrm>
-        <a:custGeom>
-          <a:avLst/>
-          <a:gdLst/>
-          <a:ahLst/>
-          <a:cxnLst/>
-          <a:rect l="0" t="0" r="0" b="0"/>
-          <a:pathLst>
-            <a:path>
-              <a:moveTo>
-                <a:pt x="0" y="0"/>
-              </a:moveTo>
-              <a:lnTo>
-                <a:pt x="223108" y="0"/>
-              </a:lnTo>
-              <a:lnTo>
-                <a:pt x="223108" y="611062"/>
-              </a:lnTo>
-              <a:lnTo>
-                <a:pt x="446217" y="611062"/>
-              </a:lnTo>
-            </a:path>
-          </a:pathLst>
-        </a:custGeom>
-        <a:noFill/>
-        <a:ln w="25400" cap="flat" cmpd="sng" algn="ctr">
-          <a:solidFill>
-            <a:schemeClr val="accent1">
-              <a:shade val="60000"/>
-              <a:hueOff val="0"/>
-              <a:satOff val="0"/>
-              <a:lumOff val="0"/>
-              <a:alphaOff val="0"/>
-            </a:schemeClr>
-          </a:solidFill>
-          <a:prstDash val="solid"/>
-        </a:ln>
-        <a:effectLst/>
-      </dsp:spPr>
-      <dsp:style>
-        <a:lnRef idx="2">
-          <a:scrgbClr r="0" g="0" b="0"/>
-        </a:lnRef>
-        <a:fillRef idx="0">
-          <a:scrgbClr r="0" g="0" b="0"/>
-        </a:fillRef>
-        <a:effectRef idx="0">
-          <a:scrgbClr r="0" g="0" b="0"/>
-        </a:effectRef>
-        <a:fontRef idx="minor"/>
-      </dsp:style>
-    </dsp:sp>
-    <dsp:sp modelId="{9699088E-E9BD-4C41-9662-7DB594734988}">
-      <dsp:nvSpPr>
-        <dsp:cNvPr id="0" name=""/>
-        <dsp:cNvSpPr/>
-      </dsp:nvSpPr>
-      <dsp:spPr>
-        <a:xfrm>
-          <a:off x="2257936" y="1827025"/>
-          <a:ext cx="446217" cy="91440"/>
-        </a:xfrm>
-        <a:custGeom>
-          <a:avLst/>
-          <a:gdLst/>
-          <a:ahLst/>
-          <a:cxnLst/>
-          <a:rect l="0" t="0" r="0" b="0"/>
-          <a:pathLst>
-            <a:path>
-              <a:moveTo>
-                <a:pt x="0" y="45720"/>
-              </a:moveTo>
-              <a:lnTo>
-                <a:pt x="446217" y="45720"/>
-              </a:lnTo>
-            </a:path>
-          </a:pathLst>
-        </a:custGeom>
-        <a:noFill/>
-        <a:ln w="25400" cap="flat" cmpd="sng" algn="ctr">
-          <a:solidFill>
-            <a:schemeClr val="accent1">
-              <a:shade val="80000"/>
-              <a:hueOff val="0"/>
-              <a:satOff val="0"/>
-              <a:lumOff val="0"/>
-              <a:alphaOff val="0"/>
-            </a:schemeClr>
-          </a:solidFill>
-          <a:prstDash val="solid"/>
-        </a:ln>
-        <a:effectLst/>
-      </dsp:spPr>
-      <dsp:style>
-        <a:lnRef idx="2">
-          <a:scrgbClr r="0" g="0" b="0"/>
-        </a:lnRef>
-        <a:fillRef idx="0">
-          <a:scrgbClr r="0" g="0" b="0"/>
-        </a:fillRef>
-        <a:effectRef idx="0">
-          <a:scrgbClr r="0" g="0" b="0"/>
-        </a:effectRef>
-        <a:fontRef idx="minor"/>
-      </dsp:style>
-    </dsp:sp>
-    <dsp:sp modelId="{FF9CC196-CCCC-4586-BC26-70670EEAE589}">
-      <dsp:nvSpPr>
-        <dsp:cNvPr id="0" name=""/>
-        <dsp:cNvSpPr/>
-      </dsp:nvSpPr>
-      <dsp:spPr>
-        <a:xfrm>
-          <a:off x="928877" y="1827025"/>
-          <a:ext cx="446217" cy="91440"/>
-        </a:xfrm>
-        <a:custGeom>
-          <a:avLst/>
-          <a:gdLst/>
-          <a:ahLst/>
-          <a:cxnLst/>
-          <a:rect l="0" t="0" r="0" b="0"/>
-          <a:pathLst>
-            <a:path>
-              <a:moveTo>
-                <a:pt x="0" y="56669"/>
-              </a:moveTo>
-              <a:lnTo>
-                <a:pt x="223108" y="56669"/>
-              </a:lnTo>
-              <a:lnTo>
-                <a:pt x="223108" y="45720"/>
-              </a:lnTo>
-              <a:lnTo>
-                <a:pt x="446217" y="45720"/>
-              </a:lnTo>
-            </a:path>
-          </a:pathLst>
-        </a:custGeom>
-        <a:noFill/>
-        <a:ln w="25400" cap="flat" cmpd="sng" algn="ctr">
-          <a:solidFill>
-            <a:schemeClr val="accent1">
-              <a:shade val="60000"/>
-              <a:hueOff val="0"/>
-              <a:satOff val="0"/>
-              <a:lumOff val="0"/>
-              <a:alphaOff val="0"/>
-            </a:schemeClr>
-          </a:solidFill>
-          <a:prstDash val="solid"/>
-        </a:ln>
-        <a:effectLst/>
-      </dsp:spPr>
-      <dsp:style>
-        <a:lnRef idx="2">
-          <a:scrgbClr r="0" g="0" b="0"/>
-        </a:lnRef>
-        <a:fillRef idx="0">
-          <a:scrgbClr r="0" g="0" b="0"/>
-        </a:fillRef>
-        <a:effectRef idx="0">
-          <a:scrgbClr r="0" g="0" b="0"/>
-        </a:effectRef>
-        <a:fontRef idx="minor"/>
-      </dsp:style>
-    </dsp:sp>
-    <dsp:sp modelId="{01F44ED7-0732-498C-9B52-BC9AB572B88F}">
-      <dsp:nvSpPr>
-        <dsp:cNvPr id="0" name=""/>
-        <dsp:cNvSpPr/>
-      </dsp:nvSpPr>
-      <dsp:spPr>
-        <a:xfrm>
-          <a:off x="2257936" y="1281288"/>
-          <a:ext cx="446217" cy="91440"/>
-        </a:xfrm>
-        <a:custGeom>
-          <a:avLst/>
-          <a:gdLst/>
-          <a:ahLst/>
-          <a:cxnLst/>
-          <a:rect l="0" t="0" r="0" b="0"/>
-          <a:pathLst>
-            <a:path>
-              <a:moveTo>
-                <a:pt x="0" y="45720"/>
-              </a:moveTo>
-              <a:lnTo>
-                <a:pt x="446217" y="45720"/>
-              </a:lnTo>
-            </a:path>
-          </a:pathLst>
-        </a:custGeom>
-        <a:noFill/>
-        <a:ln w="25400" cap="flat" cmpd="sng" algn="ctr">
-          <a:solidFill>
-            <a:schemeClr val="accent1">
-              <a:shade val="80000"/>
-              <a:hueOff val="0"/>
-              <a:satOff val="0"/>
-              <a:lumOff val="0"/>
-              <a:alphaOff val="0"/>
-            </a:schemeClr>
-          </a:solidFill>
-          <a:prstDash val="solid"/>
-        </a:ln>
-        <a:effectLst/>
-      </dsp:spPr>
-      <dsp:style>
-        <a:lnRef idx="2">
-          <a:scrgbClr r="0" g="0" b="0"/>
-        </a:lnRef>
-        <a:fillRef idx="0">
-          <a:scrgbClr r="0" g="0" b="0"/>
-        </a:fillRef>
-        <a:effectRef idx="0">
-          <a:scrgbClr r="0" g="0" b="0"/>
-        </a:effectRef>
-        <a:fontRef idx="minor"/>
-      </dsp:style>
-    </dsp:sp>
-    <dsp:sp modelId="{2E3B212C-664D-4801-A524-BFBB83E6D143}">
-      <dsp:nvSpPr>
-        <dsp:cNvPr id="0" name=""/>
-        <dsp:cNvSpPr/>
-      </dsp:nvSpPr>
-      <dsp:spPr>
-        <a:xfrm>
-          <a:off x="928877" y="1327008"/>
-          <a:ext cx="446217" cy="556686"/>
-        </a:xfrm>
-        <a:custGeom>
-          <a:avLst/>
-          <a:gdLst/>
-          <a:ahLst/>
-          <a:cxnLst/>
-          <a:rect l="0" t="0" r="0" b="0"/>
-          <a:pathLst>
-            <a:path>
-              <a:moveTo>
-                <a:pt x="0" y="556686"/>
-              </a:moveTo>
-              <a:lnTo>
-                <a:pt x="223108" y="556686"/>
-              </a:lnTo>
-              <a:lnTo>
-                <a:pt x="223108" y="0"/>
-              </a:lnTo>
-              <a:lnTo>
-                <a:pt x="446217" y="0"/>
-              </a:lnTo>
-            </a:path>
-          </a:pathLst>
-        </a:custGeom>
-        <a:noFill/>
-        <a:ln w="25400" cap="flat" cmpd="sng" algn="ctr">
-          <a:solidFill>
-            <a:schemeClr val="accent1">
-              <a:shade val="60000"/>
-              <a:hueOff val="0"/>
-              <a:satOff val="0"/>
-              <a:lumOff val="0"/>
-              <a:alphaOff val="0"/>
-            </a:schemeClr>
-          </a:solidFill>
-          <a:prstDash val="solid"/>
-        </a:ln>
-        <a:effectLst/>
-      </dsp:spPr>
-      <dsp:style>
-        <a:lnRef idx="2">
-          <a:scrgbClr r="0" g="0" b="0"/>
-        </a:lnRef>
-        <a:fillRef idx="0">
-          <a:scrgbClr r="0" g="0" b="0"/>
-        </a:fillRef>
-        <a:effectRef idx="0">
-          <a:scrgbClr r="0" g="0" b="0"/>
-        </a:effectRef>
-        <a:fontRef idx="minor"/>
-      </dsp:style>
-    </dsp:sp>
-    <dsp:sp modelId="{569D9C4B-E040-4C83-9D93-D7D3979B7996}">
-      <dsp:nvSpPr>
-        <dsp:cNvPr id="0" name=""/>
-        <dsp:cNvSpPr/>
-      </dsp:nvSpPr>
-      <dsp:spPr>
-        <a:xfrm>
-          <a:off x="2257936" y="484167"/>
-          <a:ext cx="446217" cy="311006"/>
-        </a:xfrm>
-        <a:custGeom>
-          <a:avLst/>
-          <a:gdLst/>
-          <a:ahLst/>
-          <a:cxnLst/>
-          <a:rect l="0" t="0" r="0" b="0"/>
-          <a:pathLst>
-            <a:path>
-              <a:moveTo>
-                <a:pt x="0" y="0"/>
-              </a:moveTo>
-              <a:lnTo>
-                <a:pt x="223108" y="0"/>
-              </a:lnTo>
-              <a:lnTo>
-                <a:pt x="223108" y="311006"/>
-              </a:lnTo>
-              <a:lnTo>
-                <a:pt x="446217" y="311006"/>
-              </a:lnTo>
-            </a:path>
-          </a:pathLst>
-        </a:custGeom>
-        <a:noFill/>
-        <a:ln w="25400" cap="flat" cmpd="sng" algn="ctr">
-          <a:solidFill>
-            <a:schemeClr val="accent1">
-              <a:shade val="80000"/>
-              <a:hueOff val="0"/>
-              <a:satOff val="0"/>
-              <a:lumOff val="0"/>
-              <a:alphaOff val="0"/>
-            </a:schemeClr>
-          </a:solidFill>
-          <a:prstDash val="solid"/>
-        </a:ln>
-        <a:effectLst/>
-      </dsp:spPr>
-      <dsp:style>
-        <a:lnRef idx="2">
-          <a:scrgbClr r="0" g="0" b="0"/>
-        </a:lnRef>
-        <a:fillRef idx="0">
-          <a:scrgbClr r="0" g="0" b="0"/>
-        </a:fillRef>
-        <a:effectRef idx="0">
-          <a:scrgbClr r="0" g="0" b="0"/>
-        </a:effectRef>
-        <a:fontRef idx="minor"/>
-      </dsp:style>
-    </dsp:sp>
-    <dsp:sp modelId="{A183E592-3AA6-48B3-9275-2AA017F751D4}">
-      <dsp:nvSpPr>
-        <dsp:cNvPr id="0" name=""/>
-        <dsp:cNvSpPr/>
-      </dsp:nvSpPr>
-      <dsp:spPr>
-        <a:xfrm>
-          <a:off x="2257936" y="173161"/>
-          <a:ext cx="446217" cy="311006"/>
-        </a:xfrm>
-        <a:custGeom>
-          <a:avLst/>
-          <a:gdLst/>
-          <a:ahLst/>
-          <a:cxnLst/>
-          <a:rect l="0" t="0" r="0" b="0"/>
-          <a:pathLst>
-            <a:path>
-              <a:moveTo>
-                <a:pt x="0" y="311006"/>
-              </a:moveTo>
-              <a:lnTo>
-                <a:pt x="223108" y="311006"/>
-              </a:lnTo>
-              <a:lnTo>
-                <a:pt x="223108" y="0"/>
-              </a:lnTo>
-              <a:lnTo>
-                <a:pt x="446217" y="0"/>
-              </a:lnTo>
-            </a:path>
-          </a:pathLst>
-        </a:custGeom>
-        <a:noFill/>
-        <a:ln w="25400" cap="flat" cmpd="sng" algn="ctr">
-          <a:solidFill>
-            <a:schemeClr val="accent1">
-              <a:shade val="80000"/>
-              <a:hueOff val="0"/>
-              <a:satOff val="0"/>
-              <a:lumOff val="0"/>
-              <a:alphaOff val="0"/>
-            </a:schemeClr>
-          </a:solidFill>
-          <a:prstDash val="solid"/>
-        </a:ln>
-        <a:effectLst/>
-      </dsp:spPr>
-      <dsp:style>
-        <a:lnRef idx="2">
-          <a:scrgbClr r="0" g="0" b="0"/>
-        </a:lnRef>
-        <a:fillRef idx="0">
-          <a:scrgbClr r="0" g="0" b="0"/>
-        </a:fillRef>
-        <a:effectRef idx="0">
-          <a:scrgbClr r="0" g="0" b="0"/>
-        </a:effectRef>
-        <a:fontRef idx="minor"/>
-      </dsp:style>
-    </dsp:sp>
-    <dsp:sp modelId="{130952F8-CDD2-4F48-9308-7C9CAECA407E}">
-      <dsp:nvSpPr>
-        <dsp:cNvPr id="0" name=""/>
-        <dsp:cNvSpPr/>
-      </dsp:nvSpPr>
-      <dsp:spPr>
-        <a:xfrm>
-          <a:off x="928877" y="484167"/>
-          <a:ext cx="446217" cy="1399527"/>
-        </a:xfrm>
-        <a:custGeom>
-          <a:avLst/>
-          <a:gdLst/>
-          <a:ahLst/>
-          <a:cxnLst/>
-          <a:rect l="0" t="0" r="0" b="0"/>
-          <a:pathLst>
-            <a:path>
-              <a:moveTo>
-                <a:pt x="0" y="1399527"/>
-              </a:moveTo>
-              <a:lnTo>
-                <a:pt x="223108" y="1399527"/>
-              </a:lnTo>
-              <a:lnTo>
-                <a:pt x="223108" y="0"/>
-              </a:lnTo>
-              <a:lnTo>
-                <a:pt x="446217" y="0"/>
-              </a:lnTo>
-            </a:path>
-          </a:pathLst>
-        </a:custGeom>
-        <a:noFill/>
-        <a:ln w="25400" cap="flat" cmpd="sng" algn="ctr">
-          <a:solidFill>
-            <a:schemeClr val="accent1">
-              <a:shade val="60000"/>
-              <a:hueOff val="0"/>
-              <a:satOff val="0"/>
-              <a:lumOff val="0"/>
-              <a:alphaOff val="0"/>
-            </a:schemeClr>
-          </a:solidFill>
-          <a:prstDash val="solid"/>
-        </a:ln>
-        <a:effectLst/>
-      </dsp:spPr>
-      <dsp:style>
-        <a:lnRef idx="2">
-          <a:scrgbClr r="0" g="0" b="0"/>
-        </a:lnRef>
-        <a:fillRef idx="0">
-          <a:scrgbClr r="0" g="0" b="0"/>
-        </a:fillRef>
-        <a:effectRef idx="0">
-          <a:scrgbClr r="0" g="0" b="0"/>
-        </a:effectRef>
-        <a:fontRef idx="minor"/>
-      </dsp:style>
-    </dsp:sp>
-    <dsp:sp modelId="{A79EA8DE-5EFD-47EE-A467-CE7DC5FD7CF2}">
-      <dsp:nvSpPr>
-        <dsp:cNvPr id="0" name=""/>
-        <dsp:cNvSpPr/>
-      </dsp:nvSpPr>
-      <dsp:spPr>
-        <a:xfrm>
-          <a:off x="393349" y="1712131"/>
-          <a:ext cx="535527" cy="343126"/>
-        </a:xfrm>
-        <a:prstGeom prst="rect">
-          <a:avLst/>
-        </a:prstGeom>
-        <a:gradFill rotWithShape="1">
-          <a:gsLst>
-            <a:gs pos="0">
-              <a:schemeClr val="accent1">
-                <a:shade val="51000"/>
-                <a:satMod val="130000"/>
-              </a:schemeClr>
-            </a:gs>
-            <a:gs pos="80000">
-              <a:schemeClr val="accent1">
-                <a:shade val="93000"/>
-                <a:satMod val="130000"/>
-              </a:schemeClr>
-            </a:gs>
-            <a:gs pos="100000">
-              <a:schemeClr val="accent1">
-                <a:shade val="94000"/>
-                <a:satMod val="135000"/>
-              </a:schemeClr>
-            </a:gs>
-          </a:gsLst>
-          <a:lin ang="16200000" scaled="0"/>
-        </a:gradFill>
-        <a:ln w="9525" cap="flat" cmpd="sng" algn="ctr">
-          <a:solidFill>
-            <a:schemeClr val="accent1">
-              <a:shade val="95000"/>
-              <a:satMod val="105000"/>
-            </a:schemeClr>
-          </a:solidFill>
-          <a:prstDash val="solid"/>
-        </a:ln>
-        <a:effectLst>
-          <a:outerShdw blurRad="40000" dist="23000" dir="5400000" rotWithShape="0">
-            <a:srgbClr val="000000">
-              <a:alpha val="35000"/>
-            </a:srgbClr>
-          </a:outerShdw>
-        </a:effectLst>
-      </dsp:spPr>
-      <dsp:style>
-        <a:lnRef idx="1">
-          <a:schemeClr val="accent1"/>
-        </a:lnRef>
-        <a:fillRef idx="3">
-          <a:schemeClr val="accent1"/>
-        </a:fillRef>
-        <a:effectRef idx="2">
-          <a:schemeClr val="accent1"/>
-        </a:effectRef>
-        <a:fontRef idx="minor">
-          <a:schemeClr val="lt1"/>
-        </a:fontRef>
-      </dsp:style>
-      <dsp:txBody>
-        <a:bodyPr spcFirstLastPara="0" vert="horz" wrap="square" lIns="10160" tIns="10160" rIns="10160" bIns="10160" numCol="1" spcCol="1270" anchor="ctr" anchorCtr="0">
-          <a:noAutofit/>
-        </a:bodyPr>
-        <a:lstStyle/>
-        <a:p>
-          <a:pPr lvl="0" algn="l" defTabSz="711200">
-            <a:lnSpc>
-              <a:spcPct val="90000"/>
-            </a:lnSpc>
-            <a:spcBef>
-              <a:spcPct val="0"/>
-            </a:spcBef>
-            <a:spcAft>
-              <a:spcPct val="35000"/>
-            </a:spcAft>
-          </a:pPr>
-          <a:r>
-            <a:rPr lang="en-US" altLang="zh-CN" sz="1600" kern="1200" dirty="0" smtClean="0"/>
-            <a:t>/</a:t>
-          </a:r>
-          <a:endParaRPr lang="zh-CN" altLang="en-US" sz="1600" kern="1200" dirty="0"/>
-        </a:p>
-      </dsp:txBody>
-      <dsp:txXfrm>
-        <a:off x="393349" y="1712131"/>
-        <a:ext cx="535527" cy="343126"/>
-      </dsp:txXfrm>
-    </dsp:sp>
-    <dsp:sp modelId="{4EDE825D-4960-4582-BD0A-1C66355BC72A}">
-      <dsp:nvSpPr>
-        <dsp:cNvPr id="0" name=""/>
-        <dsp:cNvSpPr/>
-      </dsp:nvSpPr>
-      <dsp:spPr>
-        <a:xfrm>
-          <a:off x="1375095" y="312604"/>
-          <a:ext cx="882841" cy="343126"/>
-        </a:xfrm>
-        <a:prstGeom prst="rect">
-          <a:avLst/>
-        </a:prstGeom>
-        <a:gradFill rotWithShape="1">
-          <a:gsLst>
-            <a:gs pos="0">
-              <a:schemeClr val="accent1">
-                <a:shade val="51000"/>
-                <a:satMod val="130000"/>
-              </a:schemeClr>
-            </a:gs>
-            <a:gs pos="80000">
-              <a:schemeClr val="accent1">
-                <a:shade val="93000"/>
-                <a:satMod val="130000"/>
-              </a:schemeClr>
-            </a:gs>
-            <a:gs pos="100000">
-              <a:schemeClr val="accent1">
-                <a:shade val="94000"/>
-                <a:satMod val="135000"/>
-              </a:schemeClr>
-            </a:gs>
-          </a:gsLst>
-          <a:lin ang="16200000" scaled="0"/>
-        </a:gradFill>
-        <a:ln w="9525" cap="flat" cmpd="sng" algn="ctr">
-          <a:solidFill>
-            <a:schemeClr val="accent1">
-              <a:shade val="95000"/>
-              <a:satMod val="105000"/>
-            </a:schemeClr>
-          </a:solidFill>
-          <a:prstDash val="solid"/>
-        </a:ln>
-        <a:effectLst>
-          <a:outerShdw blurRad="40000" dist="23000" dir="5400000" rotWithShape="0">
-            <a:srgbClr val="000000">
-              <a:alpha val="35000"/>
-            </a:srgbClr>
-          </a:outerShdw>
-        </a:effectLst>
-      </dsp:spPr>
-      <dsp:style>
-        <a:lnRef idx="1">
-          <a:schemeClr val="accent1"/>
-        </a:lnRef>
-        <a:fillRef idx="3">
-          <a:schemeClr val="accent1"/>
-        </a:fillRef>
-        <a:effectRef idx="2">
-          <a:schemeClr val="accent1"/>
-        </a:effectRef>
-        <a:fontRef idx="minor">
-          <a:schemeClr val="lt1"/>
-        </a:fontRef>
-      </dsp:style>
-      <dsp:txBody>
-        <a:bodyPr spcFirstLastPara="0" vert="horz" wrap="square" lIns="10160" tIns="10160" rIns="10160" bIns="10160" numCol="1" spcCol="1270" anchor="ctr" anchorCtr="0">
-          <a:noAutofit/>
-        </a:bodyPr>
-        <a:lstStyle/>
-        <a:p>
-          <a:pPr lvl="0" algn="l" defTabSz="711200">
-            <a:lnSpc>
-              <a:spcPct val="90000"/>
-            </a:lnSpc>
-            <a:spcBef>
-              <a:spcPct val="0"/>
-            </a:spcBef>
-            <a:spcAft>
-              <a:spcPct val="35000"/>
-            </a:spcAft>
-          </a:pPr>
-          <a:r>
-            <a:rPr lang="en-US" altLang="zh-CN" sz="1600" kern="1200" dirty="0" smtClean="0"/>
-            <a:t>common/</a:t>
-          </a:r>
-          <a:endParaRPr lang="zh-CN" altLang="en-US" sz="1600" kern="1200" dirty="0"/>
-        </a:p>
-      </dsp:txBody>
-      <dsp:txXfrm>
-        <a:off x="1375095" y="312604"/>
-        <a:ext cx="882841" cy="343126"/>
-      </dsp:txXfrm>
-    </dsp:sp>
-    <dsp:sp modelId="{A185E295-78ED-4BBE-8A4C-42ED2774797A}">
-      <dsp:nvSpPr>
-        <dsp:cNvPr id="0" name=""/>
-        <dsp:cNvSpPr/>
-      </dsp:nvSpPr>
-      <dsp:spPr>
-        <a:xfrm>
-          <a:off x="2704154" y="1598"/>
-          <a:ext cx="2231087" cy="343126"/>
-        </a:xfrm>
-        <a:prstGeom prst="rect">
-          <a:avLst/>
-        </a:prstGeom>
-        <a:gradFill rotWithShape="1">
-          <a:gsLst>
-            <a:gs pos="0">
-              <a:schemeClr val="accent1">
-                <a:shade val="51000"/>
-                <a:satMod val="130000"/>
-              </a:schemeClr>
-            </a:gs>
-            <a:gs pos="80000">
-              <a:schemeClr val="accent1">
-                <a:shade val="93000"/>
-                <a:satMod val="130000"/>
-              </a:schemeClr>
-            </a:gs>
-            <a:gs pos="100000">
-              <a:schemeClr val="accent1">
-                <a:shade val="94000"/>
-                <a:satMod val="135000"/>
-              </a:schemeClr>
-            </a:gs>
-          </a:gsLst>
-          <a:lin ang="16200000" scaled="0"/>
-        </a:gradFill>
-        <a:ln w="9525" cap="flat" cmpd="sng" algn="ctr">
-          <a:solidFill>
-            <a:schemeClr val="accent1">
-              <a:shade val="95000"/>
-              <a:satMod val="105000"/>
-            </a:schemeClr>
-          </a:solidFill>
-          <a:prstDash val="solid"/>
-        </a:ln>
-        <a:effectLst>
-          <a:outerShdw blurRad="40000" dist="23000" dir="5400000" rotWithShape="0">
-            <a:srgbClr val="000000">
-              <a:alpha val="35000"/>
-            </a:srgbClr>
-          </a:outerShdw>
-        </a:effectLst>
-      </dsp:spPr>
-      <dsp:style>
-        <a:lnRef idx="1">
-          <a:schemeClr val="accent1"/>
-        </a:lnRef>
-        <a:fillRef idx="3">
-          <a:schemeClr val="accent1"/>
-        </a:fillRef>
-        <a:effectRef idx="2">
-          <a:schemeClr val="accent1"/>
-        </a:effectRef>
-        <a:fontRef idx="minor">
-          <a:schemeClr val="lt1"/>
-        </a:fontRef>
-      </dsp:style>
-      <dsp:txBody>
-        <a:bodyPr spcFirstLastPara="0" vert="horz" wrap="square" lIns="10160" tIns="10160" rIns="10160" bIns="10160" numCol="1" spcCol="1270" anchor="ctr" anchorCtr="0">
-          <a:noAutofit/>
-        </a:bodyPr>
-        <a:lstStyle/>
-        <a:p>
-          <a:pPr lvl="0" algn="l" defTabSz="711200">
-            <a:lnSpc>
-              <a:spcPct val="90000"/>
-            </a:lnSpc>
-            <a:spcBef>
-              <a:spcPct val="0"/>
-            </a:spcBef>
-            <a:spcAft>
-              <a:spcPct val="35000"/>
-            </a:spcAft>
-          </a:pPr>
-          <a:r>
-            <a:rPr lang="en-US" altLang="en-US" sz="1600" kern="1200" dirty="0" err="1" smtClean="0"/>
-            <a:t>DataInitService</a:t>
-          </a:r>
-          <a:endParaRPr lang="zh-CN" altLang="en-US" sz="1600" kern="1200" dirty="0"/>
-        </a:p>
-      </dsp:txBody>
-      <dsp:txXfrm>
-        <a:off x="2704154" y="1598"/>
-        <a:ext cx="2231087" cy="343126"/>
-      </dsp:txXfrm>
-    </dsp:sp>
-    <dsp:sp modelId="{B9DDC7BE-DA2D-4A4E-9A70-E67D11548F9D}">
-      <dsp:nvSpPr>
-        <dsp:cNvPr id="0" name=""/>
-        <dsp:cNvSpPr/>
-      </dsp:nvSpPr>
-      <dsp:spPr>
-        <a:xfrm>
-          <a:off x="2704154" y="623610"/>
-          <a:ext cx="2231087" cy="343126"/>
-        </a:xfrm>
-        <a:prstGeom prst="rect">
-          <a:avLst/>
-        </a:prstGeom>
-        <a:gradFill rotWithShape="1">
-          <a:gsLst>
-            <a:gs pos="0">
-              <a:schemeClr val="accent1">
-                <a:shade val="51000"/>
-                <a:satMod val="130000"/>
-              </a:schemeClr>
-            </a:gs>
-            <a:gs pos="80000">
-              <a:schemeClr val="accent1">
-                <a:shade val="93000"/>
-                <a:satMod val="130000"/>
-              </a:schemeClr>
-            </a:gs>
-            <a:gs pos="100000">
-              <a:schemeClr val="accent1">
-                <a:shade val="94000"/>
-                <a:satMod val="135000"/>
-              </a:schemeClr>
-            </a:gs>
-          </a:gsLst>
-          <a:lin ang="16200000" scaled="0"/>
-        </a:gradFill>
-        <a:ln w="9525" cap="flat" cmpd="sng" algn="ctr">
-          <a:solidFill>
-            <a:schemeClr val="accent1">
-              <a:shade val="95000"/>
-              <a:satMod val="105000"/>
-            </a:schemeClr>
-          </a:solidFill>
-          <a:prstDash val="solid"/>
-        </a:ln>
-        <a:effectLst>
-          <a:outerShdw blurRad="40000" dist="23000" dir="5400000" rotWithShape="0">
-            <a:srgbClr val="000000">
-              <a:alpha val="35000"/>
-            </a:srgbClr>
-          </a:outerShdw>
-        </a:effectLst>
-      </dsp:spPr>
-      <dsp:style>
-        <a:lnRef idx="1">
-          <a:schemeClr val="accent1"/>
-        </a:lnRef>
-        <a:fillRef idx="3">
-          <a:schemeClr val="accent1"/>
-        </a:fillRef>
-        <a:effectRef idx="2">
-          <a:schemeClr val="accent1"/>
-        </a:effectRef>
-        <a:fontRef idx="minor">
-          <a:schemeClr val="lt1"/>
-        </a:fontRef>
-      </dsp:style>
-      <dsp:txBody>
-        <a:bodyPr spcFirstLastPara="0" vert="horz" wrap="square" lIns="10160" tIns="10160" rIns="10160" bIns="10160" numCol="1" spcCol="1270" anchor="ctr" anchorCtr="0">
-          <a:noAutofit/>
-        </a:bodyPr>
-        <a:lstStyle/>
-        <a:p>
-          <a:pPr lvl="0" algn="l" defTabSz="711200">
-            <a:lnSpc>
-              <a:spcPct val="90000"/>
-            </a:lnSpc>
-            <a:spcBef>
-              <a:spcPct val="0"/>
-            </a:spcBef>
-            <a:spcAft>
-              <a:spcPct val="35000"/>
-            </a:spcAft>
-          </a:pPr>
-          <a:r>
-            <a:rPr lang="en-US" altLang="en-US" sz="1600" kern="1200" dirty="0" err="1" smtClean="0"/>
-            <a:t>DbTransactionService</a:t>
-          </a:r>
-          <a:endParaRPr lang="zh-CN" altLang="en-US" sz="1600" kern="1200" dirty="0"/>
-        </a:p>
-      </dsp:txBody>
-      <dsp:txXfrm>
-        <a:off x="2704154" y="623610"/>
-        <a:ext cx="2231087" cy="343126"/>
-      </dsp:txXfrm>
-    </dsp:sp>
-    <dsp:sp modelId="{6AF623BD-B1DE-43E7-AEB5-AAD1C1E1BADD}">
-      <dsp:nvSpPr>
-        <dsp:cNvPr id="0" name=""/>
-        <dsp:cNvSpPr/>
-      </dsp:nvSpPr>
-      <dsp:spPr>
-        <a:xfrm>
-          <a:off x="1375095" y="1155445"/>
-          <a:ext cx="882841" cy="343126"/>
-        </a:xfrm>
-        <a:prstGeom prst="rect">
-          <a:avLst/>
-        </a:prstGeom>
-        <a:gradFill rotWithShape="1">
-          <a:gsLst>
-            <a:gs pos="0">
-              <a:schemeClr val="accent1">
-                <a:shade val="51000"/>
-                <a:satMod val="130000"/>
-              </a:schemeClr>
-            </a:gs>
-            <a:gs pos="80000">
-              <a:schemeClr val="accent1">
-                <a:shade val="93000"/>
-                <a:satMod val="130000"/>
-              </a:schemeClr>
-            </a:gs>
-            <a:gs pos="100000">
-              <a:schemeClr val="accent1">
-                <a:shade val="94000"/>
-                <a:satMod val="135000"/>
-              </a:schemeClr>
-            </a:gs>
-          </a:gsLst>
-          <a:lin ang="16200000" scaled="0"/>
-        </a:gradFill>
-        <a:ln w="9525" cap="flat" cmpd="sng" algn="ctr">
-          <a:solidFill>
-            <a:schemeClr val="accent1">
-              <a:shade val="95000"/>
-              <a:satMod val="105000"/>
-            </a:schemeClr>
-          </a:solidFill>
-          <a:prstDash val="solid"/>
-        </a:ln>
-        <a:effectLst>
-          <a:outerShdw blurRad="40000" dist="23000" dir="5400000" rotWithShape="0">
-            <a:srgbClr val="000000">
-              <a:alpha val="35000"/>
-            </a:srgbClr>
-          </a:outerShdw>
-        </a:effectLst>
-      </dsp:spPr>
-      <dsp:style>
-        <a:lnRef idx="1">
-          <a:schemeClr val="accent1"/>
-        </a:lnRef>
-        <a:fillRef idx="3">
-          <a:schemeClr val="accent1"/>
-        </a:fillRef>
-        <a:effectRef idx="2">
-          <a:schemeClr val="accent1"/>
-        </a:effectRef>
-        <a:fontRef idx="minor">
-          <a:schemeClr val="lt1"/>
-        </a:fontRef>
-      </dsp:style>
-      <dsp:txBody>
-        <a:bodyPr spcFirstLastPara="0" vert="horz" wrap="square" lIns="10160" tIns="10160" rIns="10160" bIns="10160" numCol="1" spcCol="1270" anchor="ctr" anchorCtr="0">
-          <a:noAutofit/>
-        </a:bodyPr>
-        <a:lstStyle/>
-        <a:p>
-          <a:pPr lvl="0" algn="l" defTabSz="711200">
-            <a:lnSpc>
-              <a:spcPct val="90000"/>
-            </a:lnSpc>
-            <a:spcBef>
-              <a:spcPct val="0"/>
-            </a:spcBef>
-            <a:spcAft>
-              <a:spcPct val="35000"/>
-            </a:spcAft>
-          </a:pPr>
-          <a:r>
-            <a:rPr lang="en-US" altLang="zh-CN" sz="1600" kern="1200" dirty="0" smtClean="0"/>
-            <a:t>menu/</a:t>
-          </a:r>
-          <a:endParaRPr lang="zh-CN" altLang="en-US" sz="1600" kern="1200" dirty="0"/>
-        </a:p>
-      </dsp:txBody>
-      <dsp:txXfrm>
-        <a:off x="1375095" y="1155445"/>
-        <a:ext cx="882841" cy="343126"/>
-      </dsp:txXfrm>
-    </dsp:sp>
-    <dsp:sp modelId="{4596509B-54A7-4172-A29E-1E1CD3B95C4C}">
-      <dsp:nvSpPr>
-        <dsp:cNvPr id="0" name=""/>
-        <dsp:cNvSpPr/>
-      </dsp:nvSpPr>
-      <dsp:spPr>
-        <a:xfrm>
-          <a:off x="2704154" y="1155445"/>
-          <a:ext cx="2231087" cy="343126"/>
-        </a:xfrm>
-        <a:prstGeom prst="rect">
-          <a:avLst/>
-        </a:prstGeom>
-        <a:gradFill rotWithShape="1">
-          <a:gsLst>
-            <a:gs pos="0">
-              <a:schemeClr val="accent1">
-                <a:shade val="51000"/>
-                <a:satMod val="130000"/>
-              </a:schemeClr>
-            </a:gs>
-            <a:gs pos="80000">
-              <a:schemeClr val="accent1">
-                <a:shade val="93000"/>
-                <a:satMod val="130000"/>
-              </a:schemeClr>
-            </a:gs>
-            <a:gs pos="100000">
-              <a:schemeClr val="accent1">
-                <a:shade val="94000"/>
-                <a:satMod val="135000"/>
-              </a:schemeClr>
-            </a:gs>
-          </a:gsLst>
-          <a:lin ang="16200000" scaled="0"/>
-        </a:gradFill>
-        <a:ln w="9525" cap="flat" cmpd="sng" algn="ctr">
-          <a:solidFill>
-            <a:schemeClr val="accent1">
-              <a:shade val="95000"/>
-              <a:satMod val="105000"/>
-            </a:schemeClr>
-          </a:solidFill>
-          <a:prstDash val="solid"/>
-        </a:ln>
-        <a:effectLst>
-          <a:outerShdw blurRad="40000" dist="23000" dir="5400000" rotWithShape="0">
-            <a:srgbClr val="000000">
-              <a:alpha val="35000"/>
-            </a:srgbClr>
-          </a:outerShdw>
-        </a:effectLst>
-      </dsp:spPr>
-      <dsp:style>
-        <a:lnRef idx="1">
-          <a:schemeClr val="accent1"/>
-        </a:lnRef>
-        <a:fillRef idx="3">
-          <a:schemeClr val="accent1"/>
-        </a:fillRef>
-        <a:effectRef idx="2">
-          <a:schemeClr val="accent1"/>
-        </a:effectRef>
-        <a:fontRef idx="minor">
-          <a:schemeClr val="lt1"/>
-        </a:fontRef>
-      </dsp:style>
-      <dsp:txBody>
-        <a:bodyPr spcFirstLastPara="0" vert="horz" wrap="square" lIns="10160" tIns="10160" rIns="10160" bIns="10160" numCol="1" spcCol="1270" anchor="ctr" anchorCtr="0">
-          <a:noAutofit/>
-        </a:bodyPr>
-        <a:lstStyle/>
-        <a:p>
-          <a:pPr lvl="0" algn="l" defTabSz="711200">
-            <a:lnSpc>
-              <a:spcPct val="90000"/>
-            </a:lnSpc>
-            <a:spcBef>
-              <a:spcPct val="0"/>
-            </a:spcBef>
-            <a:spcAft>
-              <a:spcPct val="35000"/>
-            </a:spcAft>
-          </a:pPr>
-          <a:r>
-            <a:rPr lang="en-US" altLang="zh-CN" sz="1600" kern="1200" dirty="0" err="1" smtClean="0"/>
-            <a:t>MenuItemService</a:t>
-          </a:r>
-          <a:endParaRPr lang="zh-CN" altLang="en-US" sz="1600" kern="1200" dirty="0"/>
-        </a:p>
-      </dsp:txBody>
-      <dsp:txXfrm>
-        <a:off x="2704154" y="1155445"/>
-        <a:ext cx="2231087" cy="343126"/>
-      </dsp:txXfrm>
-    </dsp:sp>
-    <dsp:sp modelId="{E3E58CAA-AFCD-4670-A7FF-181C8BB71459}">
-      <dsp:nvSpPr>
-        <dsp:cNvPr id="0" name=""/>
-        <dsp:cNvSpPr/>
-      </dsp:nvSpPr>
-      <dsp:spPr>
-        <a:xfrm>
-          <a:off x="1375095" y="1701182"/>
-          <a:ext cx="882841" cy="343126"/>
-        </a:xfrm>
-        <a:prstGeom prst="rect">
-          <a:avLst/>
-        </a:prstGeom>
-        <a:gradFill rotWithShape="1">
-          <a:gsLst>
-            <a:gs pos="0">
-              <a:schemeClr val="accent1">
-                <a:shade val="51000"/>
-                <a:satMod val="130000"/>
-              </a:schemeClr>
-            </a:gs>
-            <a:gs pos="80000">
-              <a:schemeClr val="accent1">
-                <a:shade val="93000"/>
-                <a:satMod val="130000"/>
-              </a:schemeClr>
-            </a:gs>
-            <a:gs pos="100000">
-              <a:schemeClr val="accent1">
-                <a:shade val="94000"/>
-                <a:satMod val="135000"/>
-              </a:schemeClr>
-            </a:gs>
-          </a:gsLst>
-          <a:lin ang="16200000" scaled="0"/>
-        </a:gradFill>
-        <a:ln w="9525" cap="flat" cmpd="sng" algn="ctr">
-          <a:solidFill>
-            <a:schemeClr val="accent1">
-              <a:shade val="95000"/>
-              <a:satMod val="105000"/>
-            </a:schemeClr>
-          </a:solidFill>
-          <a:prstDash val="solid"/>
-        </a:ln>
-        <a:effectLst>
-          <a:outerShdw blurRad="40000" dist="23000" dir="5400000" rotWithShape="0">
-            <a:srgbClr val="000000">
-              <a:alpha val="35000"/>
-            </a:srgbClr>
-          </a:outerShdw>
-        </a:effectLst>
-      </dsp:spPr>
-      <dsp:style>
-        <a:lnRef idx="1">
-          <a:schemeClr val="accent1"/>
-        </a:lnRef>
-        <a:fillRef idx="3">
-          <a:schemeClr val="accent1"/>
-        </a:fillRef>
-        <a:effectRef idx="2">
-          <a:schemeClr val="accent1"/>
-        </a:effectRef>
-        <a:fontRef idx="minor">
-          <a:schemeClr val="lt1"/>
-        </a:fontRef>
-      </dsp:style>
-      <dsp:txBody>
-        <a:bodyPr spcFirstLastPara="0" vert="horz" wrap="square" lIns="10160" tIns="10160" rIns="10160" bIns="10160" numCol="1" spcCol="1270" anchor="ctr" anchorCtr="0">
-          <a:noAutofit/>
-        </a:bodyPr>
-        <a:lstStyle/>
-        <a:p>
-          <a:pPr lvl="0" algn="l" defTabSz="711200">
-            <a:lnSpc>
-              <a:spcPct val="90000"/>
-            </a:lnSpc>
-            <a:spcBef>
-              <a:spcPct val="0"/>
-            </a:spcBef>
-            <a:spcAft>
-              <a:spcPct val="35000"/>
-            </a:spcAft>
-          </a:pPr>
-          <a:r>
-            <a:rPr lang="en-US" altLang="zh-CN" sz="1600" kern="1200" dirty="0" smtClean="0"/>
-            <a:t>user/</a:t>
-          </a:r>
-          <a:endParaRPr lang="zh-CN" altLang="en-US" sz="1600" kern="1200" dirty="0"/>
-        </a:p>
-      </dsp:txBody>
-      <dsp:txXfrm>
-        <a:off x="1375095" y="1701182"/>
-        <a:ext cx="882841" cy="343126"/>
-      </dsp:txXfrm>
-    </dsp:sp>
-    <dsp:sp modelId="{ED0530E5-714E-499E-9CB3-6E9E56C5BD57}">
-      <dsp:nvSpPr>
-        <dsp:cNvPr id="0" name=""/>
-        <dsp:cNvSpPr/>
-      </dsp:nvSpPr>
-      <dsp:spPr>
-        <a:xfrm>
-          <a:off x="2704154" y="1701182"/>
-          <a:ext cx="2231087" cy="343126"/>
-        </a:xfrm>
-        <a:prstGeom prst="rect">
-          <a:avLst/>
-        </a:prstGeom>
-        <a:gradFill rotWithShape="1">
-          <a:gsLst>
-            <a:gs pos="0">
-              <a:schemeClr val="accent1">
-                <a:shade val="51000"/>
-                <a:satMod val="130000"/>
-              </a:schemeClr>
-            </a:gs>
-            <a:gs pos="80000">
-              <a:schemeClr val="accent1">
-                <a:shade val="93000"/>
-                <a:satMod val="130000"/>
-              </a:schemeClr>
-            </a:gs>
-            <a:gs pos="100000">
-              <a:schemeClr val="accent1">
-                <a:shade val="94000"/>
-                <a:satMod val="135000"/>
-              </a:schemeClr>
-            </a:gs>
-          </a:gsLst>
-          <a:lin ang="16200000" scaled="0"/>
-        </a:gradFill>
-        <a:ln w="9525" cap="flat" cmpd="sng" algn="ctr">
-          <a:solidFill>
-            <a:schemeClr val="accent1">
-              <a:shade val="95000"/>
-              <a:satMod val="105000"/>
-            </a:schemeClr>
-          </a:solidFill>
-          <a:prstDash val="solid"/>
-        </a:ln>
-        <a:effectLst>
-          <a:outerShdw blurRad="40000" dist="23000" dir="5400000" rotWithShape="0">
-            <a:srgbClr val="000000">
-              <a:alpha val="35000"/>
-            </a:srgbClr>
-          </a:outerShdw>
-        </a:effectLst>
-      </dsp:spPr>
-      <dsp:style>
-        <a:lnRef idx="1">
-          <a:schemeClr val="accent1"/>
-        </a:lnRef>
-        <a:fillRef idx="3">
-          <a:schemeClr val="accent1"/>
-        </a:fillRef>
-        <a:effectRef idx="2">
-          <a:schemeClr val="accent1"/>
-        </a:effectRef>
-        <a:fontRef idx="minor">
-          <a:schemeClr val="lt1"/>
-        </a:fontRef>
-      </dsp:style>
-      <dsp:txBody>
-        <a:bodyPr spcFirstLastPara="0" vert="horz" wrap="square" lIns="10160" tIns="10160" rIns="10160" bIns="10160" numCol="1" spcCol="1270" anchor="ctr" anchorCtr="0">
-          <a:noAutofit/>
-        </a:bodyPr>
-        <a:lstStyle/>
-        <a:p>
-          <a:pPr lvl="0" algn="l" defTabSz="711200">
-            <a:lnSpc>
-              <a:spcPct val="90000"/>
-            </a:lnSpc>
-            <a:spcBef>
-              <a:spcPct val="0"/>
-            </a:spcBef>
-            <a:spcAft>
-              <a:spcPct val="35000"/>
-            </a:spcAft>
-          </a:pPr>
-          <a:r>
-            <a:rPr lang="en-US" altLang="zh-CN" sz="1600" kern="1200" dirty="0" err="1" smtClean="0"/>
-            <a:t>UserService</a:t>
-          </a:r>
-          <a:endParaRPr lang="zh-CN" altLang="en-US" sz="1600" kern="1200" dirty="0"/>
-        </a:p>
-      </dsp:txBody>
-      <dsp:txXfrm>
-        <a:off x="2704154" y="1701182"/>
-        <a:ext cx="2231087" cy="343126"/>
-      </dsp:txXfrm>
-    </dsp:sp>
-    <dsp:sp modelId="{4CF1D294-6ACF-4B11-B258-2EC8D8A5372F}">
-      <dsp:nvSpPr>
-        <dsp:cNvPr id="0" name=""/>
-        <dsp:cNvSpPr/>
-      </dsp:nvSpPr>
-      <dsp:spPr>
-        <a:xfrm>
-          <a:off x="1375095" y="2323194"/>
-          <a:ext cx="1732060" cy="343126"/>
-        </a:xfrm>
-        <a:prstGeom prst="rect">
-          <a:avLst/>
-        </a:prstGeom>
-        <a:gradFill rotWithShape="1">
-          <a:gsLst>
-            <a:gs pos="0">
-              <a:schemeClr val="accent3">
-                <a:shade val="51000"/>
-                <a:satMod val="130000"/>
-              </a:schemeClr>
-            </a:gs>
-            <a:gs pos="80000">
-              <a:schemeClr val="accent3">
-                <a:shade val="93000"/>
-                <a:satMod val="130000"/>
-              </a:schemeClr>
-            </a:gs>
-            <a:gs pos="100000">
-              <a:schemeClr val="accent3">
-                <a:shade val="94000"/>
-                <a:satMod val="135000"/>
-              </a:schemeClr>
-            </a:gs>
-          </a:gsLst>
-          <a:lin ang="16200000" scaled="0"/>
-        </a:gradFill>
-        <a:ln w="9525" cap="flat" cmpd="sng" algn="ctr">
-          <a:solidFill>
-            <a:schemeClr val="accent3">
-              <a:shade val="95000"/>
-              <a:satMod val="105000"/>
-            </a:schemeClr>
-          </a:solidFill>
-          <a:prstDash val="solid"/>
-        </a:ln>
-        <a:effectLst>
-          <a:outerShdw blurRad="40000" dist="23000" dir="5400000" rotWithShape="0">
-            <a:srgbClr val="000000">
-              <a:alpha val="35000"/>
-            </a:srgbClr>
-          </a:outerShdw>
-        </a:effectLst>
-      </dsp:spPr>
-      <dsp:style>
-        <a:lnRef idx="1">
-          <a:schemeClr val="accent3"/>
-        </a:lnRef>
-        <a:fillRef idx="3">
-          <a:schemeClr val="accent3"/>
-        </a:fillRef>
-        <a:effectRef idx="2">
-          <a:schemeClr val="accent3"/>
-        </a:effectRef>
-        <a:fontRef idx="minor">
-          <a:schemeClr val="lt1"/>
-        </a:fontRef>
-      </dsp:style>
-      <dsp:txBody>
-        <a:bodyPr spcFirstLastPara="0" vert="horz" wrap="square" lIns="10160" tIns="10160" rIns="10160" bIns="10160" numCol="1" spcCol="1270" anchor="ctr" anchorCtr="0">
-          <a:noAutofit/>
-        </a:bodyPr>
-        <a:lstStyle/>
-        <a:p>
-          <a:pPr lvl="0" algn="ctr" defTabSz="711200">
-            <a:lnSpc>
-              <a:spcPct val="90000"/>
-            </a:lnSpc>
-            <a:spcBef>
-              <a:spcPct val="0"/>
-            </a:spcBef>
-            <a:spcAft>
-              <a:spcPct val="35000"/>
-            </a:spcAft>
-          </a:pPr>
-          <a:r>
-            <a:rPr lang="en-US" altLang="zh-CN" sz="1600" kern="1200" dirty="0" smtClean="0"/>
-            <a:t>sessionFactory.sb</a:t>
-          </a:r>
-          <a:endParaRPr lang="zh-CN" altLang="en-US" sz="1600" kern="1200" dirty="0"/>
-        </a:p>
-      </dsp:txBody>
-      <dsp:txXfrm>
-        <a:off x="1375095" y="2323194"/>
-        <a:ext cx="1732060" cy="343126"/>
-      </dsp:txXfrm>
-    </dsp:sp>
-    <dsp:sp modelId="{EB20D304-7600-40CE-AB89-523500D3AA2F}">
-      <dsp:nvSpPr>
-        <dsp:cNvPr id="0" name=""/>
-        <dsp:cNvSpPr/>
-      </dsp:nvSpPr>
-      <dsp:spPr>
-        <a:xfrm>
-          <a:off x="1375095" y="2945206"/>
-          <a:ext cx="1746406" cy="343126"/>
-        </a:xfrm>
-        <a:prstGeom prst="rect">
-          <a:avLst/>
-        </a:prstGeom>
-        <a:gradFill rotWithShape="1">
-          <a:gsLst>
-            <a:gs pos="0">
-              <a:schemeClr val="accent3">
-                <a:shade val="51000"/>
-                <a:satMod val="130000"/>
-              </a:schemeClr>
-            </a:gs>
-            <a:gs pos="80000">
-              <a:schemeClr val="accent3">
-                <a:shade val="93000"/>
-                <a:satMod val="130000"/>
-              </a:schemeClr>
-            </a:gs>
-            <a:gs pos="100000">
-              <a:schemeClr val="accent3">
-                <a:shade val="94000"/>
-                <a:satMod val="135000"/>
-              </a:schemeClr>
-            </a:gs>
-          </a:gsLst>
-          <a:lin ang="16200000" scaled="0"/>
-        </a:gradFill>
-        <a:ln w="9525" cap="flat" cmpd="sng" algn="ctr">
-          <a:solidFill>
-            <a:schemeClr val="accent3">
-              <a:shade val="95000"/>
-              <a:satMod val="105000"/>
-            </a:schemeClr>
-          </a:solidFill>
-          <a:prstDash val="solid"/>
-        </a:ln>
-        <a:effectLst>
-          <a:outerShdw blurRad="40000" dist="23000" dir="5400000" rotWithShape="0">
-            <a:srgbClr val="000000">
-              <a:alpha val="35000"/>
-            </a:srgbClr>
-          </a:outerShdw>
-        </a:effectLst>
-      </dsp:spPr>
-      <dsp:style>
-        <a:lnRef idx="1">
-          <a:schemeClr val="accent3"/>
-        </a:lnRef>
-        <a:fillRef idx="3">
-          <a:schemeClr val="accent3"/>
-        </a:fillRef>
-        <a:effectRef idx="2">
-          <a:schemeClr val="accent3"/>
-        </a:effectRef>
-        <a:fontRef idx="minor">
-          <a:schemeClr val="lt1"/>
-        </a:fontRef>
-      </dsp:style>
-      <dsp:txBody>
-        <a:bodyPr spcFirstLastPara="0" vert="horz" wrap="square" lIns="10160" tIns="10160" rIns="10160" bIns="10160" numCol="1" spcCol="1270" anchor="ctr" anchorCtr="0">
-          <a:noAutofit/>
-        </a:bodyPr>
-        <a:lstStyle/>
-        <a:p>
-          <a:pPr lvl="0" algn="ctr" defTabSz="711200">
-            <a:lnSpc>
-              <a:spcPct val="90000"/>
-            </a:lnSpc>
-            <a:spcBef>
-              <a:spcPct val="0"/>
-            </a:spcBef>
-            <a:spcAft>
-              <a:spcPct val="35000"/>
-            </a:spcAft>
-          </a:pPr>
-          <a:r>
-            <a:rPr lang="en-US" altLang="zh-CN" sz="1600" kern="1200" dirty="0" smtClean="0"/>
-            <a:t>dataSource.sb</a:t>
-          </a:r>
-          <a:endParaRPr lang="zh-CN" altLang="en-US" sz="1600" kern="1200" dirty="0"/>
-        </a:p>
-      </dsp:txBody>
-      <dsp:txXfrm>
-        <a:off x="1375095" y="2945206"/>
-        <a:ext cx="1746406" cy="343126"/>
-      </dsp:txXfrm>
-    </dsp:sp>
   </dsp:spTree>
 </dsp:drawing>
 </file>
@@ -19465,7 +18087,7 @@
             <a:fld id="{53879AFC-AE41-40C8-9BBF-AB63EE91EE4F}" type="datetimeFigureOut">
               <a:rPr lang="zh-CN" altLang="en-US" smtClean="0"/>
               <a:pPr/>
-              <a:t>2014/8/5</a:t>
+              <a:t>2014/8/14</a:t>
             </a:fld>
             <a:endParaRPr lang="zh-CN" altLang="en-US"/>
           </a:p>
@@ -20001,7 +18623,7 @@
             <a:fld id="{530820CF-B880-4189-942D-D702A7CBA730}" type="datetimeFigureOut">
               <a:rPr lang="zh-CN" altLang="en-US" smtClean="0"/>
               <a:pPr/>
-              <a:t>2014/8/5</a:t>
+              <a:t>2014/8/14</a:t>
             </a:fld>
             <a:endParaRPr lang="zh-CN" altLang="en-US"/>
           </a:p>
@@ -20168,7 +18790,7 @@
             <a:fld id="{530820CF-B880-4189-942D-D702A7CBA730}" type="datetimeFigureOut">
               <a:rPr lang="zh-CN" altLang="en-US" smtClean="0"/>
               <a:pPr/>
-              <a:t>2014/8/5</a:t>
+              <a:t>2014/8/14</a:t>
             </a:fld>
             <a:endParaRPr lang="zh-CN" altLang="en-US"/>
           </a:p>
@@ -20345,7 +18967,7 @@
             <a:fld id="{530820CF-B880-4189-942D-D702A7CBA730}" type="datetimeFigureOut">
               <a:rPr lang="zh-CN" altLang="en-US" smtClean="0"/>
               <a:pPr/>
-              <a:t>2014/8/5</a:t>
+              <a:t>2014/8/14</a:t>
             </a:fld>
             <a:endParaRPr lang="zh-CN" altLang="en-US"/>
           </a:p>
@@ -20512,7 +19134,7 @@
             <a:fld id="{530820CF-B880-4189-942D-D702A7CBA730}" type="datetimeFigureOut">
               <a:rPr lang="zh-CN" altLang="en-US" smtClean="0"/>
               <a:pPr/>
-              <a:t>2014/8/5</a:t>
+              <a:t>2014/8/14</a:t>
             </a:fld>
             <a:endParaRPr lang="zh-CN" altLang="en-US"/>
           </a:p>
@@ -20755,7 +19377,7 @@
             <a:fld id="{530820CF-B880-4189-942D-D702A7CBA730}" type="datetimeFigureOut">
               <a:rPr lang="zh-CN" altLang="en-US" smtClean="0"/>
               <a:pPr/>
-              <a:t>2014/8/5</a:t>
+              <a:t>2014/8/14</a:t>
             </a:fld>
             <a:endParaRPr lang="zh-CN" altLang="en-US"/>
           </a:p>
@@ -21040,7 +19662,7 @@
             <a:fld id="{530820CF-B880-4189-942D-D702A7CBA730}" type="datetimeFigureOut">
               <a:rPr lang="zh-CN" altLang="en-US" smtClean="0"/>
               <a:pPr/>
-              <a:t>2014/8/5</a:t>
+              <a:t>2014/8/14</a:t>
             </a:fld>
             <a:endParaRPr lang="zh-CN" altLang="en-US"/>
           </a:p>
@@ -21459,7 +20081,7 @@
             <a:fld id="{530820CF-B880-4189-942D-D702A7CBA730}" type="datetimeFigureOut">
               <a:rPr lang="zh-CN" altLang="en-US" smtClean="0"/>
               <a:pPr/>
-              <a:t>2014/8/5</a:t>
+              <a:t>2014/8/14</a:t>
             </a:fld>
             <a:endParaRPr lang="zh-CN" altLang="en-US"/>
           </a:p>
@@ -21574,7 +20196,7 @@
             <a:fld id="{530820CF-B880-4189-942D-D702A7CBA730}" type="datetimeFigureOut">
               <a:rPr lang="zh-CN" altLang="en-US" smtClean="0"/>
               <a:pPr/>
-              <a:t>2014/8/5</a:t>
+              <a:t>2014/8/14</a:t>
             </a:fld>
             <a:endParaRPr lang="zh-CN" altLang="en-US"/>
           </a:p>
@@ -21666,7 +20288,7 @@
             <a:fld id="{530820CF-B880-4189-942D-D702A7CBA730}" type="datetimeFigureOut">
               <a:rPr lang="zh-CN" altLang="en-US" smtClean="0"/>
               <a:pPr/>
-              <a:t>2014/8/5</a:t>
+              <a:t>2014/8/14</a:t>
             </a:fld>
             <a:endParaRPr lang="zh-CN" altLang="en-US"/>
           </a:p>
@@ -21940,7 +20562,7 @@
             <a:fld id="{530820CF-B880-4189-942D-D702A7CBA730}" type="datetimeFigureOut">
               <a:rPr lang="zh-CN" altLang="en-US" smtClean="0"/>
               <a:pPr/>
-              <a:t>2014/8/5</a:t>
+              <a:t>2014/8/14</a:t>
             </a:fld>
             <a:endParaRPr lang="zh-CN" altLang="en-US"/>
           </a:p>
@@ -22190,7 +20812,7 @@
             <a:fld id="{530820CF-B880-4189-942D-D702A7CBA730}" type="datetimeFigureOut">
               <a:rPr lang="zh-CN" altLang="en-US" smtClean="0"/>
               <a:pPr/>
-              <a:t>2014/8/5</a:t>
+              <a:t>2014/8/14</a:t>
             </a:fld>
             <a:endParaRPr lang="zh-CN" altLang="en-US"/>
           </a:p>
@@ -22400,7 +21022,7 @@
             <a:fld id="{530820CF-B880-4189-942D-D702A7CBA730}" type="datetimeFigureOut">
               <a:rPr lang="zh-CN" altLang="en-US" smtClean="0"/>
               <a:pPr/>
-              <a:t>2014/8/5</a:t>
+              <a:t>2014/8/14</a:t>
             </a:fld>
             <a:endParaRPr lang="zh-CN" altLang="en-US"/>
           </a:p>
@@ -24993,15 +23615,30 @@
             <a:pPr lvl="1"/>
             <a:r>
               <a:rPr lang="zh-CN" altLang="en-US" dirty="0" smtClean="0"/>
-              <a:t>提供了生产环境中的无间断升级。</a:t>
+              <a:t>提供了生产环境中的无间断升级的能力。</a:t>
             </a:r>
             <a:endParaRPr lang="en-US" altLang="zh-CN" dirty="0" smtClean="0"/>
           </a:p>
           <a:p>
             <a:pPr lvl="1"/>
             <a:r>
+              <a:rPr lang="zh-CN" altLang="en-US" dirty="0"/>
+              <a:t>提供了开发过程中</a:t>
+            </a:r>
+            <a:r>
               <a:rPr lang="zh-CN" altLang="en-US" dirty="0" smtClean="0"/>
-              <a:t>开发过程中提供了更改即生效的快速开发模式。传统模式下对某一处理逻辑的更改可能等待数分钟来重启整个应用服务器后才能进行结果的验证。</a:t>
+              <a:t>更改、即生效、即测试的快速开发模式。</a:t>
+            </a:r>
+            <a:r>
+              <a:rPr lang="en-US" altLang="zh-CN" dirty="0" smtClean="0"/>
+              <a:t/>
+            </a:r>
+            <a:br>
+              <a:rPr lang="en-US" altLang="zh-CN" dirty="0" smtClean="0"/>
+            </a:br>
+            <a:r>
+              <a:rPr lang="zh-CN" altLang="en-US" dirty="0" smtClean="0"/>
+              <a:t>相对传统模式下，对某一处理逻辑的更改可能等待数分钟来重启整个应用服务器后才能进行结果的验证。</a:t>
             </a:r>
             <a:endParaRPr lang="en-US" altLang="zh-CN" dirty="0" smtClean="0"/>
           </a:p>
@@ -28659,7 +27296,7 @@
               <a:t>  Path=“/</a:t>
             </a:r>
             <a:r>
-              <a:rPr lang="en-US" altLang="zh-CN" sz="1600" dirty="0">
+              <a:rPr lang="en-US" altLang="zh-CN" sz="1600" dirty="0" smtClean="0">
                 <a:solidFill>
                   <a:schemeClr val="tx1"/>
                 </a:solidFill>
@@ -28667,12 +27304,20 @@
               <a:t>common/</a:t>
             </a:r>
             <a:r>
-              <a:rPr lang="en-US" altLang="zh-CN" sz="1600" dirty="0" err="1">
+              <a:rPr lang="en-US" altLang="zh-CN" sz="1600" dirty="0" err="1" smtClean="0">
                 <a:solidFill>
                   <a:schemeClr val="tx1"/>
                 </a:solidFill>
               </a:rPr>
-              <a:t>DataInitService.pd</a:t>
+              <a:t>DataInitService</a:t>
+            </a:r>
+            <a:r>
+              <a:rPr lang="en-US" altLang="zh-CN" sz="1600" smtClean="0">
+                <a:solidFill>
+                  <a:schemeClr val="tx1"/>
+                </a:solidFill>
+              </a:rPr>
+              <a:t>”</a:t>
             </a:r>
             <a:r>
               <a:rPr lang="en-US" altLang="zh-CN" sz="1600" dirty="0" smtClean="0">
@@ -28680,7 +27325,7 @@
                   <a:schemeClr val="tx1"/>
                 </a:solidFill>
               </a:rPr>
-              <a:t>”</a:t>
+              <a:t/>
             </a:r>
             <a:br>
               <a:rPr lang="en-US" altLang="zh-CN" sz="1600" dirty="0" smtClean="0">

</xml_diff>

<commit_message>
restart it, from 2.0.1-SNAPSHOT
</commit_message>
<xml_diff>
--- a/docs/Pathlet 设计简介.pptx
+++ b/docs/Pathlet 设计简介.pptx
@@ -10,7 +10,7 @@
   <p:sldIdLst>
     <p:sldId id="256" r:id="rId2"/>
     <p:sldId id="278" r:id="rId3"/>
-    <p:sldId id="279" r:id="rId4"/>
+    <p:sldId id="281" r:id="rId4"/>
     <p:sldId id="273" r:id="rId5"/>
     <p:sldId id="274" r:id="rId6"/>
     <p:sldId id="272" r:id="rId7"/>
@@ -3956,10 +3956,24 @@
     <dgm:pt modelId="{07B34F24-4F77-459F-824D-A67101850569}" type="pres">
       <dgm:prSet presAssocID="{D73918FA-C5C0-4D13-A09D-522A5ED06D3F}" presName="conn2-1" presStyleLbl="parChTrans1D3" presStyleIdx="2" presStyleCnt="6"/>
       <dgm:spPr/>
+      <dgm:t>
+        <a:bodyPr/>
+        <a:lstStyle/>
+        <a:p>
+          <a:endParaRPr lang="zh-CN" altLang="en-US"/>
+        </a:p>
+      </dgm:t>
     </dgm:pt>
     <dgm:pt modelId="{C1E9E8A3-6F29-40EE-B281-02C9A1A75369}" type="pres">
       <dgm:prSet presAssocID="{D73918FA-C5C0-4D13-A09D-522A5ED06D3F}" presName="connTx" presStyleLbl="parChTrans1D3" presStyleIdx="2" presStyleCnt="6"/>
       <dgm:spPr/>
+      <dgm:t>
+        <a:bodyPr/>
+        <a:lstStyle/>
+        <a:p>
+          <a:endParaRPr lang="zh-CN" altLang="en-US"/>
+        </a:p>
+      </dgm:t>
     </dgm:pt>
     <dgm:pt modelId="{A63F70E1-5F65-4886-9BAD-0138833B5389}" type="pres">
       <dgm:prSet presAssocID="{07538976-0F4C-4342-8FDC-E82C1EA58CD6}" presName="root2" presStyleCnt="0"/>
@@ -4122,10 +4136,24 @@
     <dgm:pt modelId="{AE08BE88-CE48-4984-96E9-DE27D8EC102B}" type="pres">
       <dgm:prSet presAssocID="{865F1611-AEAB-47D5-B811-56C2588A38A5}" presName="conn2-1" presStyleLbl="parChTrans1D3" presStyleIdx="5" presStyleCnt="6"/>
       <dgm:spPr/>
+      <dgm:t>
+        <a:bodyPr/>
+        <a:lstStyle/>
+        <a:p>
+          <a:endParaRPr lang="zh-CN" altLang="en-US"/>
+        </a:p>
+      </dgm:t>
     </dgm:pt>
     <dgm:pt modelId="{87BDA03F-0015-4903-98B8-148EC667ACD1}" type="pres">
       <dgm:prSet presAssocID="{865F1611-AEAB-47D5-B811-56C2588A38A5}" presName="connTx" presStyleLbl="parChTrans1D3" presStyleIdx="5" presStyleCnt="6"/>
       <dgm:spPr/>
+      <dgm:t>
+        <a:bodyPr/>
+        <a:lstStyle/>
+        <a:p>
+          <a:endParaRPr lang="zh-CN" altLang="en-US"/>
+        </a:p>
+      </dgm:t>
     </dgm:pt>
     <dgm:pt modelId="{64D003E1-04DD-4E97-9362-4E8111721161}" type="pres">
       <dgm:prSet presAssocID="{9DAEE240-5485-48EF-A63D-83B00D883463}" presName="root2" presStyleCnt="0"/>
@@ -4152,45 +4180,45 @@
     </dgm:pt>
   </dgm:ptLst>
   <dgm:cxnLst>
+    <dgm:cxn modelId="{6FBC3801-255A-4FD7-B443-A58882D34DC5}" type="presOf" srcId="{431D98B8-B24A-4490-AA29-402867D60221}" destId="{3F4D243B-79A1-4566-A0BD-F655D00E76C1}" srcOrd="0" destOrd="0" presId="urn:microsoft.com/office/officeart/2005/8/layout/hierarchy2"/>
+    <dgm:cxn modelId="{179CAD59-D45A-4BF8-99D6-326364937B29}" type="presOf" srcId="{09DCDEBB-6616-4EE1-B7A8-9E199F250470}" destId="{D95A19FF-DA87-4264-A10F-A820CD98D342}" srcOrd="0" destOrd="0" presId="urn:microsoft.com/office/officeart/2005/8/layout/hierarchy2"/>
+    <dgm:cxn modelId="{BF1770FC-BC64-4C4D-9428-52DADFC416BA}" type="presOf" srcId="{7043CF0B-5F52-4194-A26B-1C6035F12FAC}" destId="{8F83FAF7-F58D-436B-BA3C-BEFA84893FCE}" srcOrd="0" destOrd="0" presId="urn:microsoft.com/office/officeart/2005/8/layout/hierarchy2"/>
+    <dgm:cxn modelId="{F8752CCF-5951-45ED-BE1A-8D216DD0231E}" srcId="{7043CF0B-5F52-4194-A26B-1C6035F12FAC}" destId="{07538976-0F4C-4342-8FDC-E82C1EA58CD6}" srcOrd="0" destOrd="0" parTransId="{D73918FA-C5C0-4D13-A09D-522A5ED06D3F}" sibTransId="{7FE7EC95-9715-4766-B415-A33C45B3D497}"/>
+    <dgm:cxn modelId="{E331A224-6C3C-4F38-B0FC-89DB7E189B93}" type="presOf" srcId="{57025AFD-65C0-4565-AF79-783C08BE301B}" destId="{AD4680DC-87B7-4418-BBEA-CD49D54C154D}" srcOrd="1" destOrd="0" presId="urn:microsoft.com/office/officeart/2005/8/layout/hierarchy2"/>
+    <dgm:cxn modelId="{C0F9533D-4F62-4779-B8AD-61058327A7D5}" type="presOf" srcId="{D73918FA-C5C0-4D13-A09D-522A5ED06D3F}" destId="{07B34F24-4F77-459F-824D-A67101850569}" srcOrd="0" destOrd="0" presId="urn:microsoft.com/office/officeart/2005/8/layout/hierarchy2"/>
+    <dgm:cxn modelId="{E248D617-7A19-481A-A022-99917E3C4367}" srcId="{60C028EB-4226-4D97-A6DA-8A71BB50F5E7}" destId="{0FED76A3-BE3A-4309-9DBD-053921E993D9}" srcOrd="0" destOrd="0" parTransId="{001F8E5E-4DAB-4088-BA65-A635AC343E55}" sibTransId="{5D207D04-23A7-4EAA-8AF8-4D979F52E7DF}"/>
+    <dgm:cxn modelId="{FEFD1A3B-DF17-4A8A-B8A4-24904BEA164D}" type="presOf" srcId="{CB0EA68D-1C52-4B45-8073-C8F294D0612A}" destId="{A0E278D8-00FE-4760-B985-D9965752C78A}" srcOrd="1" destOrd="0" presId="urn:microsoft.com/office/officeart/2005/8/layout/hierarchy2"/>
+    <dgm:cxn modelId="{E2ECCE49-4BC1-4CE3-9F31-8C57C64E9CAB}" type="presOf" srcId="{78FA30CF-F7F7-427A-851C-E0B03C77DEAD}" destId="{C70DD696-8EF2-4F5C-855D-1031C6880065}" srcOrd="0" destOrd="0" presId="urn:microsoft.com/office/officeart/2005/8/layout/hierarchy2"/>
+    <dgm:cxn modelId="{5E548964-88D2-4536-9281-54B27D010C14}" type="presOf" srcId="{9D3E5DB5-2BCD-4C1E-847C-B490A9F597D4}" destId="{F6653A6B-87D2-4462-A330-757DF79CBEF2}" srcOrd="0" destOrd="0" presId="urn:microsoft.com/office/officeart/2005/8/layout/hierarchy2"/>
+    <dgm:cxn modelId="{B15BF1AA-1CAE-4108-AB11-2E16DEA3672D}" type="presOf" srcId="{60C028EB-4226-4D97-A6DA-8A71BB50F5E7}" destId="{237F03C6-44F5-4ACC-9965-BCAE14A02312}" srcOrd="0" destOrd="0" presId="urn:microsoft.com/office/officeart/2005/8/layout/hierarchy2"/>
+    <dgm:cxn modelId="{E34F950F-D044-42B7-8214-AF4A2AC1EA89}" type="presOf" srcId="{3CF8B261-7FB1-4211-AA20-6C87722C7D49}" destId="{0A821ACB-079C-4AA8-8E64-04069F8B38CC}" srcOrd="0" destOrd="0" presId="urn:microsoft.com/office/officeart/2005/8/layout/hierarchy2"/>
+    <dgm:cxn modelId="{578E1162-3D16-431F-9F94-F089441A030A}" srcId="{7043CF0B-5F52-4194-A26B-1C6035F12FAC}" destId="{C81824DD-00B7-45A8-8A5E-C9804F69D54E}" srcOrd="1" destOrd="0" parTransId="{F966C9A1-62A7-4A58-8732-563828EEE4FB}" sibTransId="{D1C62FA9-2C2C-4F9F-84D0-E631735A67EE}"/>
+    <dgm:cxn modelId="{2A13E8C4-F9A9-4706-BDED-F348EDB35EBC}" type="presOf" srcId="{9D3E5DB5-2BCD-4C1E-847C-B490A9F597D4}" destId="{E377C5A3-0480-4D61-AE6C-8F073734A85C}" srcOrd="1" destOrd="0" presId="urn:microsoft.com/office/officeart/2005/8/layout/hierarchy2"/>
+    <dgm:cxn modelId="{D759E5C9-0B73-4964-8287-4A675A053659}" type="presOf" srcId="{8D4EE063-B0A6-4C76-9FCD-4AC854044413}" destId="{06AC581A-7061-4F57-9D3F-9844C1CFF174}" srcOrd="0" destOrd="0" presId="urn:microsoft.com/office/officeart/2005/8/layout/hierarchy2"/>
+    <dgm:cxn modelId="{B47A421B-07B7-4DC0-9E18-3A751ECA9B90}" type="presOf" srcId="{F966C9A1-62A7-4A58-8732-563828EEE4FB}" destId="{AB121646-9C72-4176-A1C1-268325446FEB}" srcOrd="1" destOrd="0" presId="urn:microsoft.com/office/officeart/2005/8/layout/hierarchy2"/>
+    <dgm:cxn modelId="{DBF5A680-B5CF-495A-8499-0072D1FF958A}" type="presOf" srcId="{3A427AA2-300A-4394-9DC3-6F3B47D42410}" destId="{5978F671-BFC2-4D4E-9F1C-2A2D04E66A6A}" srcOrd="0" destOrd="0" presId="urn:microsoft.com/office/officeart/2005/8/layout/hierarchy2"/>
+    <dgm:cxn modelId="{3EAE473B-BAFA-4F91-B75C-B36A7DA9E198}" type="presOf" srcId="{A4A34430-1123-4E18-82C9-0859361AB1B4}" destId="{97EAAE34-D75B-4BCD-9034-FA9ED5400BAF}" srcOrd="0" destOrd="0" presId="urn:microsoft.com/office/officeart/2005/8/layout/hierarchy2"/>
+    <dgm:cxn modelId="{6DE1CC87-1E12-4536-A8C9-218F9D9EE742}" srcId="{0FED76A3-BE3A-4309-9DBD-053921E993D9}" destId="{431D98B8-B24A-4490-AA29-402867D60221}" srcOrd="0" destOrd="0" parTransId="{F446E0B6-7B0C-4B92-BE98-157E3B7A5A47}" sibTransId="{B19BA0A5-5290-489D-9679-F6FEE950DF36}"/>
+    <dgm:cxn modelId="{D51147C0-D5D5-447B-BC4B-C85655DBFD79}" type="presOf" srcId="{07538976-0F4C-4342-8FDC-E82C1EA58CD6}" destId="{10ECFEB4-C144-4CAB-9EAA-BC4EBBF42578}" srcOrd="0" destOrd="0" presId="urn:microsoft.com/office/officeart/2005/8/layout/hierarchy2"/>
+    <dgm:cxn modelId="{E049F7D3-7E4E-48E1-9EBC-F93BD1848396}" type="presOf" srcId="{57025AFD-65C0-4565-AF79-783C08BE301B}" destId="{CAE939C1-1F50-4515-A49C-BE8A483860C0}" srcOrd="0" destOrd="0" presId="urn:microsoft.com/office/officeart/2005/8/layout/hierarchy2"/>
+    <dgm:cxn modelId="{BFCE27A8-E155-471B-8808-8E49D8AE74A2}" srcId="{A4A34430-1123-4E18-82C9-0859361AB1B4}" destId="{3CF8B261-7FB1-4211-AA20-6C87722C7D49}" srcOrd="0" destOrd="0" parTransId="{9D3E5DB5-2BCD-4C1E-847C-B490A9F597D4}" sibTransId="{C0345E00-954A-406B-BC6F-32BD1D7E7926}"/>
+    <dgm:cxn modelId="{BF0A9688-AA1C-44EE-861C-586C70BDD66F}" srcId="{431D98B8-B24A-4490-AA29-402867D60221}" destId="{8D4EE063-B0A6-4C76-9FCD-4AC854044413}" srcOrd="1" destOrd="0" parTransId="{3A427AA2-300A-4394-9DC3-6F3B47D42410}" sibTransId="{DA8994AF-A045-4967-A7B7-9A2DC3C0AB99}"/>
+    <dgm:cxn modelId="{CE200A29-1AF6-4410-92DA-6FC839625B6C}" type="presOf" srcId="{F446E0B6-7B0C-4B92-BE98-157E3B7A5A47}" destId="{2DB98CB6-EE4F-466A-858A-D097ADE018D8}" srcOrd="1" destOrd="0" presId="urn:microsoft.com/office/officeart/2005/8/layout/hierarchy2"/>
+    <dgm:cxn modelId="{41A85483-7DD7-439A-A790-D63B1D4A8E1E}" srcId="{431D98B8-B24A-4490-AA29-402867D60221}" destId="{09DCDEBB-6616-4EE1-B7A8-9E199F250470}" srcOrd="0" destOrd="0" parTransId="{CB0EA68D-1C52-4B45-8073-C8F294D0612A}" sibTransId="{CAC978FB-2997-4FF6-9B6A-2FBBAC4E258F}"/>
+    <dgm:cxn modelId="{D790CB3D-2E66-4D35-8755-435708193FA7}" type="presOf" srcId="{F966C9A1-62A7-4A58-8732-563828EEE4FB}" destId="{DBD412D3-9BE5-4901-90F2-6166781ACA75}" srcOrd="0" destOrd="0" presId="urn:microsoft.com/office/officeart/2005/8/layout/hierarchy2"/>
+    <dgm:cxn modelId="{475C46F2-50EF-4959-A576-9F8B77924BA6}" type="presOf" srcId="{CB0EA68D-1C52-4B45-8073-C8F294D0612A}" destId="{FE4D4BA6-D933-4636-810B-4071DC750B3C}" srcOrd="0" destOrd="0" presId="urn:microsoft.com/office/officeart/2005/8/layout/hierarchy2"/>
+    <dgm:cxn modelId="{9757EA31-3C08-4FE0-8F1E-89D4092E126D}" type="presOf" srcId="{3A427AA2-300A-4394-9DC3-6F3B47D42410}" destId="{4D061B77-909F-47F9-A9E3-E5A361B2EA17}" srcOrd="1" destOrd="0" presId="urn:microsoft.com/office/officeart/2005/8/layout/hierarchy2"/>
+    <dgm:cxn modelId="{3F9857BD-4015-49DB-B3C7-F3D5F10D6730}" srcId="{A4A34430-1123-4E18-82C9-0859361AB1B4}" destId="{9DAEE240-5485-48EF-A63D-83B00D883463}" srcOrd="1" destOrd="0" parTransId="{865F1611-AEAB-47D5-B811-56C2588A38A5}" sibTransId="{306FB190-D23A-478C-B570-8DF90A8976DF}"/>
+    <dgm:cxn modelId="{1B3531AF-F3A6-4879-A34E-5CDEFCEC69A3}" type="presOf" srcId="{0FED76A3-BE3A-4309-9DBD-053921E993D9}" destId="{A5A31BFC-2F58-48CA-B764-DB3B93463B80}" srcOrd="0" destOrd="0" presId="urn:microsoft.com/office/officeart/2005/8/layout/hierarchy2"/>
+    <dgm:cxn modelId="{062FB59B-1EC3-4AF4-BCAB-6D2DEBA35020}" type="presOf" srcId="{C81824DD-00B7-45A8-8A5E-C9804F69D54E}" destId="{715A27A3-2D4D-44C1-A35C-E3E0B3EAFBA1}" srcOrd="0" destOrd="0" presId="urn:microsoft.com/office/officeart/2005/8/layout/hierarchy2"/>
+    <dgm:cxn modelId="{CBD2E3E9-50B7-440C-8713-CBA71793D384}" type="presOf" srcId="{9DAEE240-5485-48EF-A63D-83B00D883463}" destId="{7AB66274-8C64-45FC-A7B1-664ACD7E105B}" srcOrd="0" destOrd="0" presId="urn:microsoft.com/office/officeart/2005/8/layout/hierarchy2"/>
     <dgm:cxn modelId="{AB787FFD-D5F3-4C00-A8B8-C1975808F413}" type="presOf" srcId="{865F1611-AEAB-47D5-B811-56C2588A38A5}" destId="{87BDA03F-0015-4903-98B8-148EC667ACD1}" srcOrd="1" destOrd="0" presId="urn:microsoft.com/office/officeart/2005/8/layout/hierarchy2"/>
-    <dgm:cxn modelId="{6FBC3801-255A-4FD7-B443-A58882D34DC5}" type="presOf" srcId="{431D98B8-B24A-4490-AA29-402867D60221}" destId="{3F4D243B-79A1-4566-A0BD-F655D00E76C1}" srcOrd="0" destOrd="0" presId="urn:microsoft.com/office/officeart/2005/8/layout/hierarchy2"/>
-    <dgm:cxn modelId="{F8752CCF-5951-45ED-BE1A-8D216DD0231E}" srcId="{7043CF0B-5F52-4194-A26B-1C6035F12FAC}" destId="{07538976-0F4C-4342-8FDC-E82C1EA58CD6}" srcOrd="0" destOrd="0" parTransId="{D73918FA-C5C0-4D13-A09D-522A5ED06D3F}" sibTransId="{7FE7EC95-9715-4766-B415-A33C45B3D497}"/>
-    <dgm:cxn modelId="{6DE1CC87-1E12-4536-A8C9-218F9D9EE742}" srcId="{0FED76A3-BE3A-4309-9DBD-053921E993D9}" destId="{431D98B8-B24A-4490-AA29-402867D60221}" srcOrd="0" destOrd="0" parTransId="{F446E0B6-7B0C-4B92-BE98-157E3B7A5A47}" sibTransId="{B19BA0A5-5290-489D-9679-F6FEE950DF36}"/>
-    <dgm:cxn modelId="{3EAE473B-BAFA-4F91-B75C-B36A7DA9E198}" type="presOf" srcId="{A4A34430-1123-4E18-82C9-0859361AB1B4}" destId="{97EAAE34-D75B-4BCD-9034-FA9ED5400BAF}" srcOrd="0" destOrd="0" presId="urn:microsoft.com/office/officeart/2005/8/layout/hierarchy2"/>
-    <dgm:cxn modelId="{B47A421B-07B7-4DC0-9E18-3A751ECA9B90}" type="presOf" srcId="{F966C9A1-62A7-4A58-8732-563828EEE4FB}" destId="{AB121646-9C72-4176-A1C1-268325446FEB}" srcOrd="1" destOrd="0" presId="urn:microsoft.com/office/officeart/2005/8/layout/hierarchy2"/>
-    <dgm:cxn modelId="{D51147C0-D5D5-447B-BC4B-C85655DBFD79}" type="presOf" srcId="{07538976-0F4C-4342-8FDC-E82C1EA58CD6}" destId="{10ECFEB4-C144-4CAB-9EAA-BC4EBBF42578}" srcOrd="0" destOrd="0" presId="urn:microsoft.com/office/officeart/2005/8/layout/hierarchy2"/>
-    <dgm:cxn modelId="{DBF5A680-B5CF-495A-8499-0072D1FF958A}" type="presOf" srcId="{3A427AA2-300A-4394-9DC3-6F3B47D42410}" destId="{5978F671-BFC2-4D4E-9F1C-2A2D04E66A6A}" srcOrd="0" destOrd="0" presId="urn:microsoft.com/office/officeart/2005/8/layout/hierarchy2"/>
-    <dgm:cxn modelId="{9757EA31-3C08-4FE0-8F1E-89D4092E126D}" type="presOf" srcId="{3A427AA2-300A-4394-9DC3-6F3B47D42410}" destId="{4D061B77-909F-47F9-A9E3-E5A361B2EA17}" srcOrd="1" destOrd="0" presId="urn:microsoft.com/office/officeart/2005/8/layout/hierarchy2"/>
-    <dgm:cxn modelId="{BF1770FC-BC64-4C4D-9428-52DADFC416BA}" type="presOf" srcId="{7043CF0B-5F52-4194-A26B-1C6035F12FAC}" destId="{8F83FAF7-F58D-436B-BA3C-BEFA84893FCE}" srcOrd="0" destOrd="0" presId="urn:microsoft.com/office/officeart/2005/8/layout/hierarchy2"/>
+    <dgm:cxn modelId="{ED43C035-823B-4130-985A-3587AF33AB5B}" srcId="{0FED76A3-BE3A-4309-9DBD-053921E993D9}" destId="{A4A34430-1123-4E18-82C9-0859361AB1B4}" srcOrd="2" destOrd="0" parTransId="{57025AFD-65C0-4565-AF79-783C08BE301B}" sibTransId="{65BA6CDF-B360-4906-8926-DA938F200E34}"/>
+    <dgm:cxn modelId="{842CDCC9-43B5-4AEA-9943-516A7EBDC77A}" type="presOf" srcId="{78FA30CF-F7F7-427A-851C-E0B03C77DEAD}" destId="{F6B6C2FA-DE6E-49B6-B567-9402151CE33E}" srcOrd="1" destOrd="0" presId="urn:microsoft.com/office/officeart/2005/8/layout/hierarchy2"/>
     <dgm:cxn modelId="{0EE47C4A-90E8-4F88-8B7B-8ABF85D4FDE8}" type="presOf" srcId="{D73918FA-C5C0-4D13-A09D-522A5ED06D3F}" destId="{C1E9E8A3-6F29-40EE-B281-02C9A1A75369}" srcOrd="1" destOrd="0" presId="urn:microsoft.com/office/officeart/2005/8/layout/hierarchy2"/>
     <dgm:cxn modelId="{B965BB29-229A-46E2-AB6A-14D75FFCB29A}" type="presOf" srcId="{865F1611-AEAB-47D5-B811-56C2588A38A5}" destId="{AE08BE88-CE48-4984-96E9-DE27D8EC102B}" srcOrd="0" destOrd="0" presId="urn:microsoft.com/office/officeart/2005/8/layout/hierarchy2"/>
-    <dgm:cxn modelId="{B15BF1AA-1CAE-4108-AB11-2E16DEA3672D}" type="presOf" srcId="{60C028EB-4226-4D97-A6DA-8A71BB50F5E7}" destId="{237F03C6-44F5-4ACC-9965-BCAE14A02312}" srcOrd="0" destOrd="0" presId="urn:microsoft.com/office/officeart/2005/8/layout/hierarchy2"/>
-    <dgm:cxn modelId="{41A85483-7DD7-439A-A790-D63B1D4A8E1E}" srcId="{431D98B8-B24A-4490-AA29-402867D60221}" destId="{09DCDEBB-6616-4EE1-B7A8-9E199F250470}" srcOrd="0" destOrd="0" parTransId="{CB0EA68D-1C52-4B45-8073-C8F294D0612A}" sibTransId="{CAC978FB-2997-4FF6-9B6A-2FBBAC4E258F}"/>
-    <dgm:cxn modelId="{C0F9533D-4F62-4779-B8AD-61058327A7D5}" type="presOf" srcId="{D73918FA-C5C0-4D13-A09D-522A5ED06D3F}" destId="{07B34F24-4F77-459F-824D-A67101850569}" srcOrd="0" destOrd="0" presId="urn:microsoft.com/office/officeart/2005/8/layout/hierarchy2"/>
-    <dgm:cxn modelId="{ED43C035-823B-4130-985A-3587AF33AB5B}" srcId="{0FED76A3-BE3A-4309-9DBD-053921E993D9}" destId="{A4A34430-1123-4E18-82C9-0859361AB1B4}" srcOrd="2" destOrd="0" parTransId="{57025AFD-65C0-4565-AF79-783C08BE301B}" sibTransId="{65BA6CDF-B360-4906-8926-DA938F200E34}"/>
-    <dgm:cxn modelId="{578E1162-3D16-431F-9F94-F089441A030A}" srcId="{7043CF0B-5F52-4194-A26B-1C6035F12FAC}" destId="{C81824DD-00B7-45A8-8A5E-C9804F69D54E}" srcOrd="1" destOrd="0" parTransId="{F966C9A1-62A7-4A58-8732-563828EEE4FB}" sibTransId="{D1C62FA9-2C2C-4F9F-84D0-E631735A67EE}"/>
-    <dgm:cxn modelId="{E34F950F-D044-42B7-8214-AF4A2AC1EA89}" type="presOf" srcId="{3CF8B261-7FB1-4211-AA20-6C87722C7D49}" destId="{0A821ACB-079C-4AA8-8E64-04069F8B38CC}" srcOrd="0" destOrd="0" presId="urn:microsoft.com/office/officeart/2005/8/layout/hierarchy2"/>
-    <dgm:cxn modelId="{475C46F2-50EF-4959-A576-9F8B77924BA6}" type="presOf" srcId="{CB0EA68D-1C52-4B45-8073-C8F294D0612A}" destId="{FE4D4BA6-D933-4636-810B-4071DC750B3C}" srcOrd="0" destOrd="0" presId="urn:microsoft.com/office/officeart/2005/8/layout/hierarchy2"/>
-    <dgm:cxn modelId="{FEFD1A3B-DF17-4A8A-B8A4-24904BEA164D}" type="presOf" srcId="{CB0EA68D-1C52-4B45-8073-C8F294D0612A}" destId="{A0E278D8-00FE-4760-B985-D9965752C78A}" srcOrd="1" destOrd="0" presId="urn:microsoft.com/office/officeart/2005/8/layout/hierarchy2"/>
-    <dgm:cxn modelId="{E049F7D3-7E4E-48E1-9EBC-F93BD1848396}" type="presOf" srcId="{57025AFD-65C0-4565-AF79-783C08BE301B}" destId="{CAE939C1-1F50-4515-A49C-BE8A483860C0}" srcOrd="0" destOrd="0" presId="urn:microsoft.com/office/officeart/2005/8/layout/hierarchy2"/>
-    <dgm:cxn modelId="{E248D617-7A19-481A-A022-99917E3C4367}" srcId="{60C028EB-4226-4D97-A6DA-8A71BB50F5E7}" destId="{0FED76A3-BE3A-4309-9DBD-053921E993D9}" srcOrd="0" destOrd="0" parTransId="{001F8E5E-4DAB-4088-BA65-A635AC343E55}" sibTransId="{5D207D04-23A7-4EAA-8AF8-4D979F52E7DF}"/>
-    <dgm:cxn modelId="{2A13E8C4-F9A9-4706-BDED-F348EDB35EBC}" type="presOf" srcId="{9D3E5DB5-2BCD-4C1E-847C-B490A9F597D4}" destId="{E377C5A3-0480-4D61-AE6C-8F073734A85C}" srcOrd="1" destOrd="0" presId="urn:microsoft.com/office/officeart/2005/8/layout/hierarchy2"/>
-    <dgm:cxn modelId="{D790CB3D-2E66-4D35-8755-435708193FA7}" type="presOf" srcId="{F966C9A1-62A7-4A58-8732-563828EEE4FB}" destId="{DBD412D3-9BE5-4901-90F2-6166781ACA75}" srcOrd="0" destOrd="0" presId="urn:microsoft.com/office/officeart/2005/8/layout/hierarchy2"/>
-    <dgm:cxn modelId="{D759E5C9-0B73-4964-8287-4A675A053659}" type="presOf" srcId="{8D4EE063-B0A6-4C76-9FCD-4AC854044413}" destId="{06AC581A-7061-4F57-9D3F-9844C1CFF174}" srcOrd="0" destOrd="0" presId="urn:microsoft.com/office/officeart/2005/8/layout/hierarchy2"/>
-    <dgm:cxn modelId="{BFCE27A8-E155-471B-8808-8E49D8AE74A2}" srcId="{A4A34430-1123-4E18-82C9-0859361AB1B4}" destId="{3CF8B261-7FB1-4211-AA20-6C87722C7D49}" srcOrd="0" destOrd="0" parTransId="{9D3E5DB5-2BCD-4C1E-847C-B490A9F597D4}" sibTransId="{C0345E00-954A-406B-BC6F-32BD1D7E7926}"/>
-    <dgm:cxn modelId="{3F9857BD-4015-49DB-B3C7-F3D5F10D6730}" srcId="{A4A34430-1123-4E18-82C9-0859361AB1B4}" destId="{9DAEE240-5485-48EF-A63D-83B00D883463}" srcOrd="1" destOrd="0" parTransId="{865F1611-AEAB-47D5-B811-56C2588A38A5}" sibTransId="{306FB190-D23A-478C-B570-8DF90A8976DF}"/>
-    <dgm:cxn modelId="{062FB59B-1EC3-4AF4-BCAB-6D2DEBA35020}" type="presOf" srcId="{C81824DD-00B7-45A8-8A5E-C9804F69D54E}" destId="{715A27A3-2D4D-44C1-A35C-E3E0B3EAFBA1}" srcOrd="0" destOrd="0" presId="urn:microsoft.com/office/officeart/2005/8/layout/hierarchy2"/>
-    <dgm:cxn modelId="{E2ECCE49-4BC1-4CE3-9F31-8C57C64E9CAB}" type="presOf" srcId="{78FA30CF-F7F7-427A-851C-E0B03C77DEAD}" destId="{C70DD696-8EF2-4F5C-855D-1031C6880065}" srcOrd="0" destOrd="0" presId="urn:microsoft.com/office/officeart/2005/8/layout/hierarchy2"/>
-    <dgm:cxn modelId="{E331A224-6C3C-4F38-B0FC-89DB7E189B93}" type="presOf" srcId="{57025AFD-65C0-4565-AF79-783C08BE301B}" destId="{AD4680DC-87B7-4418-BBEA-CD49D54C154D}" srcOrd="1" destOrd="0" presId="urn:microsoft.com/office/officeart/2005/8/layout/hierarchy2"/>
+    <dgm:cxn modelId="{A16E59FC-EBC5-41F3-B748-280321B36394}" type="presOf" srcId="{F446E0B6-7B0C-4B92-BE98-157E3B7A5A47}" destId="{3B172838-17E6-46FD-8B5E-FE426CCB9A01}" srcOrd="0" destOrd="0" presId="urn:microsoft.com/office/officeart/2005/8/layout/hierarchy2"/>
     <dgm:cxn modelId="{C2FF233A-48F3-4937-AAF5-AB11BA15E5C1}" srcId="{0FED76A3-BE3A-4309-9DBD-053921E993D9}" destId="{7043CF0B-5F52-4194-A26B-1C6035F12FAC}" srcOrd="1" destOrd="0" parTransId="{78FA30CF-F7F7-427A-851C-E0B03C77DEAD}" sibTransId="{22AB7DC6-5587-4D24-BC15-778E7518E357}"/>
-    <dgm:cxn modelId="{CBD2E3E9-50B7-440C-8713-CBA71793D384}" type="presOf" srcId="{9DAEE240-5485-48EF-A63D-83B00D883463}" destId="{7AB66274-8C64-45FC-A7B1-664ACD7E105B}" srcOrd="0" destOrd="0" presId="urn:microsoft.com/office/officeart/2005/8/layout/hierarchy2"/>
-    <dgm:cxn modelId="{179CAD59-D45A-4BF8-99D6-326364937B29}" type="presOf" srcId="{09DCDEBB-6616-4EE1-B7A8-9E199F250470}" destId="{D95A19FF-DA87-4264-A10F-A820CD98D342}" srcOrd="0" destOrd="0" presId="urn:microsoft.com/office/officeart/2005/8/layout/hierarchy2"/>
-    <dgm:cxn modelId="{1B3531AF-F3A6-4879-A34E-5CDEFCEC69A3}" type="presOf" srcId="{0FED76A3-BE3A-4309-9DBD-053921E993D9}" destId="{A5A31BFC-2F58-48CA-B764-DB3B93463B80}" srcOrd="0" destOrd="0" presId="urn:microsoft.com/office/officeart/2005/8/layout/hierarchy2"/>
-    <dgm:cxn modelId="{842CDCC9-43B5-4AEA-9943-516A7EBDC77A}" type="presOf" srcId="{78FA30CF-F7F7-427A-851C-E0B03C77DEAD}" destId="{F6B6C2FA-DE6E-49B6-B567-9402151CE33E}" srcOrd="1" destOrd="0" presId="urn:microsoft.com/office/officeart/2005/8/layout/hierarchy2"/>
-    <dgm:cxn modelId="{A16E59FC-EBC5-41F3-B748-280321B36394}" type="presOf" srcId="{F446E0B6-7B0C-4B92-BE98-157E3B7A5A47}" destId="{3B172838-17E6-46FD-8B5E-FE426CCB9A01}" srcOrd="0" destOrd="0" presId="urn:microsoft.com/office/officeart/2005/8/layout/hierarchy2"/>
-    <dgm:cxn modelId="{CE200A29-1AF6-4410-92DA-6FC839625B6C}" type="presOf" srcId="{F446E0B6-7B0C-4B92-BE98-157E3B7A5A47}" destId="{2DB98CB6-EE4F-466A-858A-D097ADE018D8}" srcOrd="1" destOrd="0" presId="urn:microsoft.com/office/officeart/2005/8/layout/hierarchy2"/>
-    <dgm:cxn modelId="{BF0A9688-AA1C-44EE-861C-586C70BDD66F}" srcId="{431D98B8-B24A-4490-AA29-402867D60221}" destId="{8D4EE063-B0A6-4C76-9FCD-4AC854044413}" srcOrd="1" destOrd="0" parTransId="{3A427AA2-300A-4394-9DC3-6F3B47D42410}" sibTransId="{DA8994AF-A045-4967-A7B7-9A2DC3C0AB99}"/>
-    <dgm:cxn modelId="{5E548964-88D2-4536-9281-54B27D010C14}" type="presOf" srcId="{9D3E5DB5-2BCD-4C1E-847C-B490A9F597D4}" destId="{F6653A6B-87D2-4462-A330-757DF79CBEF2}" srcOrd="0" destOrd="0" presId="urn:microsoft.com/office/officeart/2005/8/layout/hierarchy2"/>
     <dgm:cxn modelId="{F9018D3C-5B47-421B-A00A-A9DF30E90892}" type="presParOf" srcId="{237F03C6-44F5-4ACC-9965-BCAE14A02312}" destId="{B3DA3AD1-F253-429D-A372-D9D438369994}" srcOrd="0" destOrd="0" presId="urn:microsoft.com/office/officeart/2005/8/layout/hierarchy2"/>
     <dgm:cxn modelId="{B6F355F6-65BF-4926-AC6E-61A070985DB5}" type="presParOf" srcId="{B3DA3AD1-F253-429D-A372-D9D438369994}" destId="{A5A31BFC-2F58-48CA-B764-DB3B93463B80}" srcOrd="0" destOrd="0" presId="urn:microsoft.com/office/officeart/2005/8/layout/hierarchy2"/>
     <dgm:cxn modelId="{0DEFDB00-F72E-46AF-A674-7F772193E9A8}" type="presParOf" srcId="{B3DA3AD1-F253-429D-A372-D9D438369994}" destId="{7FF3D3D9-1F07-49C7-859C-9AA435F8ED4F}" srcOrd="1" destOrd="0" presId="urn:microsoft.com/office/officeart/2005/8/layout/hierarchy2"/>
@@ -4386,14 +4414,35 @@
         </dgm:presLayoutVars>
       </dgm:prSet>
       <dgm:spPr/>
+      <dgm:t>
+        <a:bodyPr/>
+        <a:lstStyle/>
+        <a:p>
+          <a:endParaRPr lang="zh-CN" altLang="en-US"/>
+        </a:p>
+      </dgm:t>
     </dgm:pt>
     <dgm:pt modelId="{A570D424-E3CC-44E8-AD35-18395D63960D}" type="pres">
       <dgm:prSet presAssocID="{6E0867C9-7FA5-4AE5-96CF-E928D765CFF0}" presName="gear1srcNode" presStyleLbl="node1" presStyleIdx="0" presStyleCnt="3"/>
       <dgm:spPr/>
+      <dgm:t>
+        <a:bodyPr/>
+        <a:lstStyle/>
+        <a:p>
+          <a:endParaRPr lang="zh-CN" altLang="en-US"/>
+        </a:p>
+      </dgm:t>
     </dgm:pt>
     <dgm:pt modelId="{C3204493-D6A3-47ED-A252-62219CDCF647}" type="pres">
       <dgm:prSet presAssocID="{6E0867C9-7FA5-4AE5-96CF-E928D765CFF0}" presName="gear1dstNode" presStyleLbl="node1" presStyleIdx="0" presStyleCnt="3"/>
       <dgm:spPr/>
+      <dgm:t>
+        <a:bodyPr/>
+        <a:lstStyle/>
+        <a:p>
+          <a:endParaRPr lang="zh-CN" altLang="en-US"/>
+        </a:p>
+      </dgm:t>
     </dgm:pt>
     <dgm:pt modelId="{87DBF983-7F68-44F6-90B2-21DD191B7335}" type="pres">
       <dgm:prSet presAssocID="{44C7BDC6-2B0C-401A-834C-89ED6FDFD199}" presName="gear2" presStyleLbl="node1" presStyleIdx="1" presStyleCnt="3">
@@ -4403,18 +4452,46 @@
         </dgm:presLayoutVars>
       </dgm:prSet>
       <dgm:spPr/>
+      <dgm:t>
+        <a:bodyPr/>
+        <a:lstStyle/>
+        <a:p>
+          <a:endParaRPr lang="zh-CN" altLang="en-US"/>
+        </a:p>
+      </dgm:t>
     </dgm:pt>
     <dgm:pt modelId="{DCD3FE5A-106F-4428-8306-843BBA5CD7EC}" type="pres">
       <dgm:prSet presAssocID="{44C7BDC6-2B0C-401A-834C-89ED6FDFD199}" presName="gear2srcNode" presStyleLbl="node1" presStyleIdx="1" presStyleCnt="3"/>
       <dgm:spPr/>
+      <dgm:t>
+        <a:bodyPr/>
+        <a:lstStyle/>
+        <a:p>
+          <a:endParaRPr lang="zh-CN" altLang="en-US"/>
+        </a:p>
+      </dgm:t>
     </dgm:pt>
     <dgm:pt modelId="{FD168F9A-CE5F-4D5D-883C-6E9058F9F06C}" type="pres">
       <dgm:prSet presAssocID="{44C7BDC6-2B0C-401A-834C-89ED6FDFD199}" presName="gear2dstNode" presStyleLbl="node1" presStyleIdx="1" presStyleCnt="3"/>
       <dgm:spPr/>
+      <dgm:t>
+        <a:bodyPr/>
+        <a:lstStyle/>
+        <a:p>
+          <a:endParaRPr lang="zh-CN" altLang="en-US"/>
+        </a:p>
+      </dgm:t>
     </dgm:pt>
     <dgm:pt modelId="{0DFBCC03-8C31-420A-AC05-DC473D82D312}" type="pres">
       <dgm:prSet presAssocID="{D842874B-6BEB-4294-AE99-95A806FE0E6E}" presName="gear3" presStyleLbl="node1" presStyleIdx="2" presStyleCnt="3"/>
       <dgm:spPr/>
+      <dgm:t>
+        <a:bodyPr/>
+        <a:lstStyle/>
+        <a:p>
+          <a:endParaRPr lang="zh-CN" altLang="en-US"/>
+        </a:p>
+      </dgm:t>
     </dgm:pt>
     <dgm:pt modelId="{821F2A1A-59EF-4627-87EB-418473C618C4}" type="pres">
       <dgm:prSet presAssocID="{D842874B-6BEB-4294-AE99-95A806FE0E6E}" presName="gear3tx" presStyleLbl="node1" presStyleIdx="2" presStyleCnt="3">
@@ -4424,46 +4501,88 @@
         </dgm:presLayoutVars>
       </dgm:prSet>
       <dgm:spPr/>
+      <dgm:t>
+        <a:bodyPr/>
+        <a:lstStyle/>
+        <a:p>
+          <a:endParaRPr lang="zh-CN" altLang="en-US"/>
+        </a:p>
+      </dgm:t>
     </dgm:pt>
     <dgm:pt modelId="{0E24EA98-44ED-48F2-BED3-2B94329AA1D2}" type="pres">
       <dgm:prSet presAssocID="{D842874B-6BEB-4294-AE99-95A806FE0E6E}" presName="gear3srcNode" presStyleLbl="node1" presStyleIdx="2" presStyleCnt="3"/>
       <dgm:spPr/>
+      <dgm:t>
+        <a:bodyPr/>
+        <a:lstStyle/>
+        <a:p>
+          <a:endParaRPr lang="zh-CN" altLang="en-US"/>
+        </a:p>
+      </dgm:t>
     </dgm:pt>
     <dgm:pt modelId="{24D60FB9-2D57-4A66-A4AA-9A65BCA2D67D}" type="pres">
       <dgm:prSet presAssocID="{D842874B-6BEB-4294-AE99-95A806FE0E6E}" presName="gear3dstNode" presStyleLbl="node1" presStyleIdx="2" presStyleCnt="3"/>
       <dgm:spPr/>
+      <dgm:t>
+        <a:bodyPr/>
+        <a:lstStyle/>
+        <a:p>
+          <a:endParaRPr lang="zh-CN" altLang="en-US"/>
+        </a:p>
+      </dgm:t>
     </dgm:pt>
     <dgm:pt modelId="{E109EA82-1B47-4E6E-A0ED-CEC700DB4757}" type="pres">
       <dgm:prSet presAssocID="{EB947E7F-CDBF-402E-B36B-66D470CEEC8E}" presName="connector1" presStyleLbl="sibTrans2D1" presStyleIdx="0" presStyleCnt="3"/>
       <dgm:spPr/>
+      <dgm:t>
+        <a:bodyPr/>
+        <a:lstStyle/>
+        <a:p>
+          <a:endParaRPr lang="zh-CN" altLang="en-US"/>
+        </a:p>
+      </dgm:t>
     </dgm:pt>
     <dgm:pt modelId="{2D8A94CC-6751-4C2E-9C0B-1D9411D372E7}" type="pres">
       <dgm:prSet presAssocID="{8F031268-C10F-46BC-92A1-F38CC916BF16}" presName="connector2" presStyleLbl="sibTrans2D1" presStyleIdx="1" presStyleCnt="3"/>
       <dgm:spPr/>
+      <dgm:t>
+        <a:bodyPr/>
+        <a:lstStyle/>
+        <a:p>
+          <a:endParaRPr lang="zh-CN" altLang="en-US"/>
+        </a:p>
+      </dgm:t>
     </dgm:pt>
     <dgm:pt modelId="{6F427BDC-87E4-4FE5-A5A3-A4FBABB25647}" type="pres">
       <dgm:prSet presAssocID="{641EE935-78D7-443C-92AF-4961CB3FEEBB}" presName="connector3" presStyleLbl="sibTrans2D1" presStyleIdx="2" presStyleCnt="3"/>
       <dgm:spPr/>
+      <dgm:t>
+        <a:bodyPr/>
+        <a:lstStyle/>
+        <a:p>
+          <a:endParaRPr lang="zh-CN" altLang="en-US"/>
+        </a:p>
+      </dgm:t>
     </dgm:pt>
   </dgm:ptLst>
   <dgm:cxnLst>
+    <dgm:cxn modelId="{EBD95265-CD5E-4168-A698-7925B4C188D6}" type="presOf" srcId="{D842874B-6BEB-4294-AE99-95A806FE0E6E}" destId="{0DFBCC03-8C31-420A-AC05-DC473D82D312}" srcOrd="0" destOrd="0" presId="urn:microsoft.com/office/officeart/2005/8/layout/gear1"/>
+    <dgm:cxn modelId="{1840DD23-8CEA-4A85-8691-BDF85633CF72}" srcId="{0D46B2AD-2895-4EF8-B01C-656A9FBCD3A0}" destId="{D842874B-6BEB-4294-AE99-95A806FE0E6E}" srcOrd="2" destOrd="0" parTransId="{56C64DB9-5CCA-47C6-9424-18F9B27407EE}" sibTransId="{641EE935-78D7-443C-92AF-4961CB3FEEBB}"/>
+    <dgm:cxn modelId="{8CBE618A-F417-41BE-9268-10C20DEE5EC5}" type="presOf" srcId="{44C7BDC6-2B0C-401A-834C-89ED6FDFD199}" destId="{FD168F9A-CE5F-4D5D-883C-6E9058F9F06C}" srcOrd="2" destOrd="0" presId="urn:microsoft.com/office/officeart/2005/8/layout/gear1"/>
+    <dgm:cxn modelId="{F842DC6F-157E-4F8A-B75C-4B2A006DF184}" type="presOf" srcId="{6E0867C9-7FA5-4AE5-96CF-E928D765CFF0}" destId="{A570D424-E3CC-44E8-AD35-18395D63960D}" srcOrd="1" destOrd="0" presId="urn:microsoft.com/office/officeart/2005/8/layout/gear1"/>
+    <dgm:cxn modelId="{441227B2-8385-46D8-8605-94B96C462478}" type="presOf" srcId="{44C7BDC6-2B0C-401A-834C-89ED6FDFD199}" destId="{87DBF983-7F68-44F6-90B2-21DD191B7335}" srcOrd="0" destOrd="0" presId="urn:microsoft.com/office/officeart/2005/8/layout/gear1"/>
+    <dgm:cxn modelId="{EDAACD08-EAEE-4064-8E01-D2E9924D8E86}" type="presOf" srcId="{D842874B-6BEB-4294-AE99-95A806FE0E6E}" destId="{24D60FB9-2D57-4A66-A4AA-9A65BCA2D67D}" srcOrd="3" destOrd="0" presId="urn:microsoft.com/office/officeart/2005/8/layout/gear1"/>
+    <dgm:cxn modelId="{681BB114-A96E-4A16-91D7-E8AF055F7BDD}" type="presOf" srcId="{6E0867C9-7FA5-4AE5-96CF-E928D765CFF0}" destId="{9E67497B-A858-4943-92EF-CCF907C5DF3F}" srcOrd="0" destOrd="0" presId="urn:microsoft.com/office/officeart/2005/8/layout/gear1"/>
+    <dgm:cxn modelId="{4C1DBB42-3FF7-49EF-A4D2-6FE558FA863E}" type="presOf" srcId="{D842874B-6BEB-4294-AE99-95A806FE0E6E}" destId="{821F2A1A-59EF-4627-87EB-418473C618C4}" srcOrd="1" destOrd="0" presId="urn:microsoft.com/office/officeart/2005/8/layout/gear1"/>
+    <dgm:cxn modelId="{C1D405FC-EE4F-4DFC-A9EE-140EA5FBA413}" type="presOf" srcId="{44C7BDC6-2B0C-401A-834C-89ED6FDFD199}" destId="{DCD3FE5A-106F-4428-8306-843BBA5CD7EC}" srcOrd="1" destOrd="0" presId="urn:microsoft.com/office/officeart/2005/8/layout/gear1"/>
     <dgm:cxn modelId="{F1A2ABE6-FCC4-4F1C-B8B1-BE8053475110}" type="presOf" srcId="{6E0867C9-7FA5-4AE5-96CF-E928D765CFF0}" destId="{C3204493-D6A3-47ED-A252-62219CDCF647}" srcOrd="2" destOrd="0" presId="urn:microsoft.com/office/officeart/2005/8/layout/gear1"/>
     <dgm:cxn modelId="{E1C82195-201E-4004-BBFC-F4FB87E8F3F1}" type="presOf" srcId="{8F031268-C10F-46BC-92A1-F38CC916BF16}" destId="{2D8A94CC-6751-4C2E-9C0B-1D9411D372E7}" srcOrd="0" destOrd="0" presId="urn:microsoft.com/office/officeart/2005/8/layout/gear1"/>
-    <dgm:cxn modelId="{681BB114-A96E-4A16-91D7-E8AF055F7BDD}" type="presOf" srcId="{6E0867C9-7FA5-4AE5-96CF-E928D765CFF0}" destId="{9E67497B-A858-4943-92EF-CCF907C5DF3F}" srcOrd="0" destOrd="0" presId="urn:microsoft.com/office/officeart/2005/8/layout/gear1"/>
+    <dgm:cxn modelId="{CEEE954E-7F33-433F-9FE6-17D24B0BC329}" type="presOf" srcId="{EB947E7F-CDBF-402E-B36B-66D470CEEC8E}" destId="{E109EA82-1B47-4E6E-A0ED-CEC700DB4757}" srcOrd="0" destOrd="0" presId="urn:microsoft.com/office/officeart/2005/8/layout/gear1"/>
+    <dgm:cxn modelId="{BF689BA4-0780-4156-9A73-087351DCB0FD}" srcId="{0D46B2AD-2895-4EF8-B01C-656A9FBCD3A0}" destId="{44C7BDC6-2B0C-401A-834C-89ED6FDFD199}" srcOrd="1" destOrd="0" parTransId="{45C1DE54-E3F7-42E8-A404-0157EA93EFA6}" sibTransId="{8F031268-C10F-46BC-92A1-F38CC916BF16}"/>
     <dgm:cxn modelId="{5964BC4C-D7D7-4923-B779-A9C70D022187}" type="presOf" srcId="{641EE935-78D7-443C-92AF-4961CB3FEEBB}" destId="{6F427BDC-87E4-4FE5-A5A3-A4FBABB25647}" srcOrd="0" destOrd="0" presId="urn:microsoft.com/office/officeart/2005/8/layout/gear1"/>
+    <dgm:cxn modelId="{F1511482-583B-4885-8278-9C56F63DDD07}" type="presOf" srcId="{0D46B2AD-2895-4EF8-B01C-656A9FBCD3A0}" destId="{57BB5DB5-0179-4079-B189-F4B7564EA685}" srcOrd="0" destOrd="0" presId="urn:microsoft.com/office/officeart/2005/8/layout/gear1"/>
+    <dgm:cxn modelId="{0B0D39BB-2058-44C6-89AC-A5051AD732C8}" srcId="{0D46B2AD-2895-4EF8-B01C-656A9FBCD3A0}" destId="{6E0867C9-7FA5-4AE5-96CF-E928D765CFF0}" srcOrd="0" destOrd="0" parTransId="{11420C56-F3B1-4EC4-B5F3-08CB01BE1351}" sibTransId="{EB947E7F-CDBF-402E-B36B-66D470CEEC8E}"/>
     <dgm:cxn modelId="{C013CF42-0217-4182-8D8D-0A4B6E711280}" type="presOf" srcId="{D842874B-6BEB-4294-AE99-95A806FE0E6E}" destId="{0E24EA98-44ED-48F2-BED3-2B94329AA1D2}" srcOrd="2" destOrd="0" presId="urn:microsoft.com/office/officeart/2005/8/layout/gear1"/>
-    <dgm:cxn modelId="{C1D405FC-EE4F-4DFC-A9EE-140EA5FBA413}" type="presOf" srcId="{44C7BDC6-2B0C-401A-834C-89ED6FDFD199}" destId="{DCD3FE5A-106F-4428-8306-843BBA5CD7EC}" srcOrd="1" destOrd="0" presId="urn:microsoft.com/office/officeart/2005/8/layout/gear1"/>
-    <dgm:cxn modelId="{EBD95265-CD5E-4168-A698-7925B4C188D6}" type="presOf" srcId="{D842874B-6BEB-4294-AE99-95A806FE0E6E}" destId="{0DFBCC03-8C31-420A-AC05-DC473D82D312}" srcOrd="0" destOrd="0" presId="urn:microsoft.com/office/officeart/2005/8/layout/gear1"/>
-    <dgm:cxn modelId="{EDAACD08-EAEE-4064-8E01-D2E9924D8E86}" type="presOf" srcId="{D842874B-6BEB-4294-AE99-95A806FE0E6E}" destId="{24D60FB9-2D57-4A66-A4AA-9A65BCA2D67D}" srcOrd="3" destOrd="0" presId="urn:microsoft.com/office/officeart/2005/8/layout/gear1"/>
-    <dgm:cxn modelId="{0B0D39BB-2058-44C6-89AC-A5051AD732C8}" srcId="{0D46B2AD-2895-4EF8-B01C-656A9FBCD3A0}" destId="{6E0867C9-7FA5-4AE5-96CF-E928D765CFF0}" srcOrd="0" destOrd="0" parTransId="{11420C56-F3B1-4EC4-B5F3-08CB01BE1351}" sibTransId="{EB947E7F-CDBF-402E-B36B-66D470CEEC8E}"/>
-    <dgm:cxn modelId="{F842DC6F-157E-4F8A-B75C-4B2A006DF184}" type="presOf" srcId="{6E0867C9-7FA5-4AE5-96CF-E928D765CFF0}" destId="{A570D424-E3CC-44E8-AD35-18395D63960D}" srcOrd="1" destOrd="0" presId="urn:microsoft.com/office/officeart/2005/8/layout/gear1"/>
-    <dgm:cxn modelId="{CEEE954E-7F33-433F-9FE6-17D24B0BC329}" type="presOf" srcId="{EB947E7F-CDBF-402E-B36B-66D470CEEC8E}" destId="{E109EA82-1B47-4E6E-A0ED-CEC700DB4757}" srcOrd="0" destOrd="0" presId="urn:microsoft.com/office/officeart/2005/8/layout/gear1"/>
-    <dgm:cxn modelId="{4C1DBB42-3FF7-49EF-A4D2-6FE558FA863E}" type="presOf" srcId="{D842874B-6BEB-4294-AE99-95A806FE0E6E}" destId="{821F2A1A-59EF-4627-87EB-418473C618C4}" srcOrd="1" destOrd="0" presId="urn:microsoft.com/office/officeart/2005/8/layout/gear1"/>
-    <dgm:cxn modelId="{BF689BA4-0780-4156-9A73-087351DCB0FD}" srcId="{0D46B2AD-2895-4EF8-B01C-656A9FBCD3A0}" destId="{44C7BDC6-2B0C-401A-834C-89ED6FDFD199}" srcOrd="1" destOrd="0" parTransId="{45C1DE54-E3F7-42E8-A404-0157EA93EFA6}" sibTransId="{8F031268-C10F-46BC-92A1-F38CC916BF16}"/>
-    <dgm:cxn modelId="{1840DD23-8CEA-4A85-8691-BDF85633CF72}" srcId="{0D46B2AD-2895-4EF8-B01C-656A9FBCD3A0}" destId="{D842874B-6BEB-4294-AE99-95A806FE0E6E}" srcOrd="2" destOrd="0" parTransId="{56C64DB9-5CCA-47C6-9424-18F9B27407EE}" sibTransId="{641EE935-78D7-443C-92AF-4961CB3FEEBB}"/>
-    <dgm:cxn modelId="{8CBE618A-F417-41BE-9268-10C20DEE5EC5}" type="presOf" srcId="{44C7BDC6-2B0C-401A-834C-89ED6FDFD199}" destId="{FD168F9A-CE5F-4D5D-883C-6E9058F9F06C}" srcOrd="2" destOrd="0" presId="urn:microsoft.com/office/officeart/2005/8/layout/gear1"/>
-    <dgm:cxn modelId="{441227B2-8385-46D8-8605-94B96C462478}" type="presOf" srcId="{44C7BDC6-2B0C-401A-834C-89ED6FDFD199}" destId="{87DBF983-7F68-44F6-90B2-21DD191B7335}" srcOrd="0" destOrd="0" presId="urn:microsoft.com/office/officeart/2005/8/layout/gear1"/>
-    <dgm:cxn modelId="{F1511482-583B-4885-8278-9C56F63DDD07}" type="presOf" srcId="{0D46B2AD-2895-4EF8-B01C-656A9FBCD3A0}" destId="{57BB5DB5-0179-4079-B189-F4B7564EA685}" srcOrd="0" destOrd="0" presId="urn:microsoft.com/office/officeart/2005/8/layout/gear1"/>
     <dgm:cxn modelId="{EC6038BB-69F9-435A-9ECA-5661D0D287DF}" type="presParOf" srcId="{57BB5DB5-0179-4079-B189-F4B7564EA685}" destId="{9E67497B-A858-4943-92EF-CCF907C5DF3F}" srcOrd="0" destOrd="0" presId="urn:microsoft.com/office/officeart/2005/8/layout/gear1"/>
     <dgm:cxn modelId="{53067B45-2B5B-43F3-B9CF-6486C222AC61}" type="presParOf" srcId="{57BB5DB5-0179-4079-B189-F4B7564EA685}" destId="{A570D424-E3CC-44E8-AD35-18395D63960D}" srcOrd="1" destOrd="0" presId="urn:microsoft.com/office/officeart/2005/8/layout/gear1"/>
     <dgm:cxn modelId="{362A9514-F761-48F2-A989-7799C72D41B6}" type="presParOf" srcId="{57BB5DB5-0179-4079-B189-F4B7564EA685}" destId="{C3204493-D6A3-47ED-A252-62219CDCF647}" srcOrd="2" destOrd="0" presId="urn:microsoft.com/office/officeart/2005/8/layout/gear1"/>
@@ -19465,7 +19584,7 @@
             <a:fld id="{53879AFC-AE41-40C8-9BBF-AB63EE91EE4F}" type="datetimeFigureOut">
               <a:rPr lang="zh-CN" altLang="en-US" smtClean="0"/>
               <a:pPr/>
-              <a:t>2014/8/5</a:t>
+              <a:t>2018/1/19</a:t>
             </a:fld>
             <a:endParaRPr lang="zh-CN" altLang="en-US"/>
           </a:p>
@@ -20001,7 +20120,7 @@
             <a:fld id="{530820CF-B880-4189-942D-D702A7CBA730}" type="datetimeFigureOut">
               <a:rPr lang="zh-CN" altLang="en-US" smtClean="0"/>
               <a:pPr/>
-              <a:t>2014/8/5</a:t>
+              <a:t>2018/1/19</a:t>
             </a:fld>
             <a:endParaRPr lang="zh-CN" altLang="en-US"/>
           </a:p>
@@ -20168,7 +20287,7 @@
             <a:fld id="{530820CF-B880-4189-942D-D702A7CBA730}" type="datetimeFigureOut">
               <a:rPr lang="zh-CN" altLang="en-US" smtClean="0"/>
               <a:pPr/>
-              <a:t>2014/8/5</a:t>
+              <a:t>2018/1/19</a:t>
             </a:fld>
             <a:endParaRPr lang="zh-CN" altLang="en-US"/>
           </a:p>
@@ -20345,7 +20464,7 @@
             <a:fld id="{530820CF-B880-4189-942D-D702A7CBA730}" type="datetimeFigureOut">
               <a:rPr lang="zh-CN" altLang="en-US" smtClean="0"/>
               <a:pPr/>
-              <a:t>2014/8/5</a:t>
+              <a:t>2018/1/19</a:t>
             </a:fld>
             <a:endParaRPr lang="zh-CN" altLang="en-US"/>
           </a:p>
@@ -20512,7 +20631,7 @@
             <a:fld id="{530820CF-B880-4189-942D-D702A7CBA730}" type="datetimeFigureOut">
               <a:rPr lang="zh-CN" altLang="en-US" smtClean="0"/>
               <a:pPr/>
-              <a:t>2014/8/5</a:t>
+              <a:t>2018/1/19</a:t>
             </a:fld>
             <a:endParaRPr lang="zh-CN" altLang="en-US"/>
           </a:p>
@@ -20755,7 +20874,7 @@
             <a:fld id="{530820CF-B880-4189-942D-D702A7CBA730}" type="datetimeFigureOut">
               <a:rPr lang="zh-CN" altLang="en-US" smtClean="0"/>
               <a:pPr/>
-              <a:t>2014/8/5</a:t>
+              <a:t>2018/1/19</a:t>
             </a:fld>
             <a:endParaRPr lang="zh-CN" altLang="en-US"/>
           </a:p>
@@ -21040,7 +21159,7 @@
             <a:fld id="{530820CF-B880-4189-942D-D702A7CBA730}" type="datetimeFigureOut">
               <a:rPr lang="zh-CN" altLang="en-US" smtClean="0"/>
               <a:pPr/>
-              <a:t>2014/8/5</a:t>
+              <a:t>2018/1/19</a:t>
             </a:fld>
             <a:endParaRPr lang="zh-CN" altLang="en-US"/>
           </a:p>
@@ -21459,7 +21578,7 @@
             <a:fld id="{530820CF-B880-4189-942D-D702A7CBA730}" type="datetimeFigureOut">
               <a:rPr lang="zh-CN" altLang="en-US" smtClean="0"/>
               <a:pPr/>
-              <a:t>2014/8/5</a:t>
+              <a:t>2018/1/19</a:t>
             </a:fld>
             <a:endParaRPr lang="zh-CN" altLang="en-US"/>
           </a:p>
@@ -21574,7 +21693,7 @@
             <a:fld id="{530820CF-B880-4189-942D-D702A7CBA730}" type="datetimeFigureOut">
               <a:rPr lang="zh-CN" altLang="en-US" smtClean="0"/>
               <a:pPr/>
-              <a:t>2014/8/5</a:t>
+              <a:t>2018/1/19</a:t>
             </a:fld>
             <a:endParaRPr lang="zh-CN" altLang="en-US"/>
           </a:p>
@@ -21666,7 +21785,7 @@
             <a:fld id="{530820CF-B880-4189-942D-D702A7CBA730}" type="datetimeFigureOut">
               <a:rPr lang="zh-CN" altLang="en-US" smtClean="0"/>
               <a:pPr/>
-              <a:t>2014/8/5</a:t>
+              <a:t>2018/1/19</a:t>
             </a:fld>
             <a:endParaRPr lang="zh-CN" altLang="en-US"/>
           </a:p>
@@ -21940,7 +22059,7 @@
             <a:fld id="{530820CF-B880-4189-942D-D702A7CBA730}" type="datetimeFigureOut">
               <a:rPr lang="zh-CN" altLang="en-US" smtClean="0"/>
               <a:pPr/>
-              <a:t>2014/8/5</a:t>
+              <a:t>2018/1/19</a:t>
             </a:fld>
             <a:endParaRPr lang="zh-CN" altLang="en-US"/>
           </a:p>
@@ -22190,7 +22309,7 @@
             <a:fld id="{530820CF-B880-4189-942D-D702A7CBA730}" type="datetimeFigureOut">
               <a:rPr lang="zh-CN" altLang="en-US" smtClean="0"/>
               <a:pPr/>
-              <a:t>2014/8/5</a:t>
+              <a:t>2018/1/19</a:t>
             </a:fld>
             <a:endParaRPr lang="zh-CN" altLang="en-US"/>
           </a:p>
@@ -22400,7 +22519,7 @@
             <a:fld id="{530820CF-B880-4189-942D-D702A7CBA730}" type="datetimeFigureOut">
               <a:rPr lang="zh-CN" altLang="en-US" smtClean="0"/>
               <a:pPr/>
-              <a:t>2014/8/5</a:t>
+              <a:t>2018/1/19</a:t>
             </a:fld>
             <a:endParaRPr lang="zh-CN" altLang="en-US"/>
           </a:p>
@@ -24985,7 +25104,7 @@
           <a:p>
             <a:r>
               <a:rPr lang="zh-CN" altLang="en-US" dirty="0" smtClean="0"/>
-              <a:t>万达项目中营销管理工程和任务调度工程中实现模块热部署</a:t>
+              <a:t>在某上市影院企业和家装龙头企业中成功实施了营销管理工程和任务调度工程中实现模块热部署</a:t>
             </a:r>
             <a:endParaRPr lang="en-US" altLang="zh-CN" dirty="0" smtClean="0"/>
           </a:p>
@@ -24993,15 +25112,30 @@
             <a:pPr lvl="1"/>
             <a:r>
               <a:rPr lang="zh-CN" altLang="en-US" dirty="0" smtClean="0"/>
-              <a:t>提供了生产环境中的无间断升级。</a:t>
+              <a:t>提供了生产环境中的无间断升级的能力。</a:t>
             </a:r>
             <a:endParaRPr lang="en-US" altLang="zh-CN" dirty="0" smtClean="0"/>
           </a:p>
           <a:p>
             <a:pPr lvl="1"/>
             <a:r>
+              <a:rPr lang="zh-CN" altLang="en-US" dirty="0"/>
+              <a:t>提供了开发过程中</a:t>
+            </a:r>
+            <a:r>
               <a:rPr lang="zh-CN" altLang="en-US" dirty="0" smtClean="0"/>
-              <a:t>开发过程中提供了更改即生效的快速开发模式。传统模式下对某一处理逻辑的更改可能等待数分钟来重启整个应用服务器后才能进行结果的验证。</a:t>
+              <a:t>更改、即生效、即测试的快速开发模式。</a:t>
+            </a:r>
+            <a:r>
+              <a:rPr lang="en-US" altLang="zh-CN" dirty="0" smtClean="0"/>
+              <a:t/>
+            </a:r>
+            <a:br>
+              <a:rPr lang="en-US" altLang="zh-CN" dirty="0" smtClean="0"/>
+            </a:br>
+            <a:r>
+              <a:rPr lang="zh-CN" altLang="en-US" dirty="0" smtClean="0"/>
+              <a:t>相对传统模式下，对某一处理逻辑的更改可能等待数分钟来重启整个应用服务器后才能进行结果的验证。</a:t>
             </a:r>
             <a:endParaRPr lang="en-US" altLang="zh-CN" dirty="0" smtClean="0"/>
           </a:p>
@@ -25010,7 +25144,7 @@
     </p:spTree>
     <p:extLst>
       <p:ext uri="{BB962C8B-B14F-4D97-AF65-F5344CB8AC3E}">
-        <p14:creationId xmlns:p14="http://schemas.microsoft.com/office/powerpoint/2010/main" val="3383289089"/>
+        <p14:creationId xmlns:p14="http://schemas.microsoft.com/office/powerpoint/2010/main" val="1687639870"/>
       </p:ext>
     </p:extLst>
   </p:cSld>

</xml_diff>